<commit_message>
Added more analysis for 5 clusters data
</commit_message>
<xml_diff>
--- a/RFM Analysis of Results.pptx
+++ b/RFM Analysis of Results.pptx
@@ -6,11 +6,15 @@
   </p:sldMasterIdLst>
   <p:sldIdLst>
     <p:sldId id="256" r:id="rId5"/>
-    <p:sldId id="258" r:id="rId6"/>
-    <p:sldId id="257" r:id="rId7"/>
-    <p:sldId id="261" r:id="rId8"/>
-    <p:sldId id="259" r:id="rId9"/>
-    <p:sldId id="260" r:id="rId10"/>
+    <p:sldId id="262" r:id="rId6"/>
+    <p:sldId id="258" r:id="rId7"/>
+    <p:sldId id="257" r:id="rId8"/>
+    <p:sldId id="263" r:id="rId9"/>
+    <p:sldId id="264" r:id="rId10"/>
+    <p:sldId id="261" r:id="rId11"/>
+    <p:sldId id="259" r:id="rId12"/>
+    <p:sldId id="260" r:id="rId13"/>
+    <p:sldId id="265" r:id="rId14"/>
   </p:sldIdLst>
   <p:sldSz cx="12192000" cy="6858000"/>
   <p:notesSz cx="6858000" cy="9144000"/>
@@ -120,7 +124,7 @@
 <file path=ppt/revisionInfo.xml><?xml version="1.0" encoding="utf-8"?>
 <p1510:revInfo xmlns:a="http://schemas.openxmlformats.org/drawingml/2006/main" xmlns:r="http://schemas.openxmlformats.org/officeDocument/2006/relationships" xmlns:p1510="http://schemas.microsoft.com/office/powerpoint/2015/10/main">
   <p1510:revLst>
-    <p1510:client id="{ECD254F5-8452-483E-B5C3-D5A628E50987}" v="2" dt="2024-02-22T12:05:35.716"/>
+    <p1510:client id="{ECD254F5-8452-483E-B5C3-D5A628E50987}" v="3" dt="2024-02-22T13:16:58.435"/>
   </p1510:revLst>
 </p1510:revInfo>
 </file>
@@ -129,13 +133,13 @@
 <pc:chgInfo xmlns:a="http://schemas.openxmlformats.org/drawingml/2006/main" xmlns:r="http://schemas.openxmlformats.org/officeDocument/2006/relationships" xmlns:ac="http://schemas.microsoft.com/office/drawing/2013/main/command" xmlns:pc="http://schemas.microsoft.com/office/powerpoint/2013/main/command">
   <pc:docChgLst>
     <pc:chgData name="Don Joseph" userId="01aadf7fde9797fb" providerId="LiveId" clId="{ECD254F5-8452-483E-B5C3-D5A628E50987}"/>
-    <pc:docChg chg="undo custSel addSld modSld sldOrd">
-      <pc:chgData name="Don Joseph" userId="01aadf7fde9797fb" providerId="LiveId" clId="{ECD254F5-8452-483E-B5C3-D5A628E50987}" dt="2024-02-22T12:38:20.655" v="76" actId="5793"/>
+    <pc:docChg chg="undo custSel addSld delSld modSld sldOrd">
+      <pc:chgData name="Don Joseph" userId="01aadf7fde9797fb" providerId="LiveId" clId="{ECD254F5-8452-483E-B5C3-D5A628E50987}" dt="2024-02-22T13:40:38.155" v="1292" actId="20577"/>
       <pc:docMkLst>
         <pc:docMk/>
       </pc:docMkLst>
       <pc:sldChg chg="addSp modSp mod">
-        <pc:chgData name="Don Joseph" userId="01aadf7fde9797fb" providerId="LiveId" clId="{ECD254F5-8452-483E-B5C3-D5A628E50987}" dt="2024-02-22T12:05:45.200" v="16" actId="1076"/>
+        <pc:chgData name="Don Joseph" userId="01aadf7fde9797fb" providerId="LiveId" clId="{ECD254F5-8452-483E-B5C3-D5A628E50987}" dt="2024-02-22T13:15:51.691" v="132" actId="20577"/>
         <pc:sldMkLst>
           <pc:docMk/>
           <pc:sldMk cId="2247572789" sldId="256"/>
@@ -164,6 +168,14 @@
             <ac:spMk id="4" creationId="{039FC588-B5CC-92C0-1A00-D5C6432E0900}"/>
           </ac:spMkLst>
         </pc:spChg>
+        <pc:spChg chg="mod">
+          <ac:chgData name="Don Joseph" userId="01aadf7fde9797fb" providerId="LiveId" clId="{ECD254F5-8452-483E-B5C3-D5A628E50987}" dt="2024-02-22T13:15:51.691" v="132" actId="20577"/>
+          <ac:spMkLst>
+            <pc:docMk/>
+            <pc:sldMk cId="2247572789" sldId="256"/>
+            <ac:spMk id="6" creationId="{82399533-CF94-A139-F2FC-278F96C80036}"/>
+          </ac:spMkLst>
+        </pc:spChg>
         <pc:picChg chg="mod">
           <ac:chgData name="Don Joseph" userId="01aadf7fde9797fb" providerId="LiveId" clId="{ECD254F5-8452-483E-B5C3-D5A628E50987}" dt="2024-02-22T12:05:37.540" v="14" actId="1076"/>
           <ac:picMkLst>
@@ -180,12 +192,35 @@
           <pc:sldMk cId="226510830" sldId="258"/>
         </pc:sldMkLst>
       </pc:sldChg>
+      <pc:sldChg chg="modSp mod">
+        <pc:chgData name="Don Joseph" userId="01aadf7fde9797fb" providerId="LiveId" clId="{ECD254F5-8452-483E-B5C3-D5A628E50987}" dt="2024-02-22T13:40:16.621" v="1265" actId="20577"/>
+        <pc:sldMkLst>
+          <pc:docMk/>
+          <pc:sldMk cId="2041890761" sldId="260"/>
+        </pc:sldMkLst>
+        <pc:spChg chg="mod">
+          <ac:chgData name="Don Joseph" userId="01aadf7fde9797fb" providerId="LiveId" clId="{ECD254F5-8452-483E-B5C3-D5A628E50987}" dt="2024-02-22T13:40:16.621" v="1265" actId="20577"/>
+          <ac:spMkLst>
+            <pc:docMk/>
+            <pc:sldMk cId="2041890761" sldId="260"/>
+            <ac:spMk id="6" creationId="{82399533-CF94-A139-F2FC-278F96C80036}"/>
+          </ac:spMkLst>
+        </pc:spChg>
+      </pc:sldChg>
       <pc:sldChg chg="addSp delSp modSp add mod">
-        <pc:chgData name="Don Joseph" userId="01aadf7fde9797fb" providerId="LiveId" clId="{ECD254F5-8452-483E-B5C3-D5A628E50987}" dt="2024-02-22T12:38:20.655" v="76" actId="5793"/>
+        <pc:chgData name="Don Joseph" userId="01aadf7fde9797fb" providerId="LiveId" clId="{ECD254F5-8452-483E-B5C3-D5A628E50987}" dt="2024-02-22T13:40:38.155" v="1292" actId="20577"/>
         <pc:sldMkLst>
           <pc:docMk/>
           <pc:sldMk cId="3961428113" sldId="261"/>
         </pc:sldMkLst>
+        <pc:spChg chg="add mod">
+          <ac:chgData name="Don Joseph" userId="01aadf7fde9797fb" providerId="LiveId" clId="{ECD254F5-8452-483E-B5C3-D5A628E50987}" dt="2024-02-22T13:40:38.155" v="1292" actId="20577"/>
+          <ac:spMkLst>
+            <pc:docMk/>
+            <pc:sldMk cId="3961428113" sldId="261"/>
+            <ac:spMk id="2" creationId="{C0A6A4AE-127D-DFA1-612E-B4834CFE853F}"/>
+          </ac:spMkLst>
+        </pc:spChg>
         <pc:spChg chg="mod">
           <ac:chgData name="Don Joseph" userId="01aadf7fde9797fb" providerId="LiveId" clId="{ECD254F5-8452-483E-B5C3-D5A628E50987}" dt="2024-02-22T12:05:02.369" v="4" actId="20577"/>
           <ac:spMkLst>
@@ -202,12 +237,36 @@
             <ac:spMk id="11" creationId="{55796F3B-8240-346E-FCE9-81EF397A4281}"/>
           </ac:spMkLst>
         </pc:spChg>
-        <pc:picChg chg="add mod">
-          <ac:chgData name="Don Joseph" userId="01aadf7fde9797fb" providerId="LiveId" clId="{ECD254F5-8452-483E-B5C3-D5A628E50987}" dt="2024-02-22T12:37:49.451" v="19" actId="1076"/>
+        <pc:picChg chg="add del mod">
+          <ac:chgData name="Don Joseph" userId="01aadf7fde9797fb" providerId="LiveId" clId="{ECD254F5-8452-483E-B5C3-D5A628E50987}" dt="2024-02-22T13:25:58.268" v="373" actId="478"/>
           <ac:picMkLst>
             <pc:docMk/>
             <pc:sldMk cId="3961428113" sldId="261"/>
             <ac:picMk id="3" creationId="{85ECC05F-0BD2-F7A5-E9A9-A7C0904BEEDC}"/>
+          </ac:picMkLst>
+        </pc:picChg>
+        <pc:picChg chg="add del mod">
+          <ac:chgData name="Don Joseph" userId="01aadf7fde9797fb" providerId="LiveId" clId="{ECD254F5-8452-483E-B5C3-D5A628E50987}" dt="2024-02-22T13:18:05.897" v="241" actId="478"/>
+          <ac:picMkLst>
+            <pc:docMk/>
+            <pc:sldMk cId="3961428113" sldId="261"/>
+            <ac:picMk id="5" creationId="{7E6CB3BD-4E52-9D78-AC8E-6C47B581A306}"/>
+          </ac:picMkLst>
+        </pc:picChg>
+        <pc:picChg chg="add del mod">
+          <ac:chgData name="Don Joseph" userId="01aadf7fde9797fb" providerId="LiveId" clId="{ECD254F5-8452-483E-B5C3-D5A628E50987}" dt="2024-02-22T13:28:12.381" v="596" actId="478"/>
+          <ac:picMkLst>
+            <pc:docMk/>
+            <pc:sldMk cId="3961428113" sldId="261"/>
+            <ac:picMk id="8" creationId="{1F3279E7-ADF4-39A2-42B8-2EF2866A56E3}"/>
+          </ac:picMkLst>
+        </pc:picChg>
+        <pc:picChg chg="add mod">
+          <ac:chgData name="Don Joseph" userId="01aadf7fde9797fb" providerId="LiveId" clId="{ECD254F5-8452-483E-B5C3-D5A628E50987}" dt="2024-02-22T13:28:15.201" v="599" actId="1076"/>
+          <ac:picMkLst>
+            <pc:docMk/>
+            <pc:sldMk cId="3961428113" sldId="261"/>
+            <ac:picMk id="10" creationId="{BD4E3860-5280-76E2-AE40-CD81F35F5DED}"/>
           </ac:picMkLst>
         </pc:picChg>
         <pc:picChg chg="del">
@@ -216,6 +275,177 @@
             <pc:docMk/>
             <pc:sldMk cId="3961428113" sldId="261"/>
             <ac:picMk id="10" creationId="{FABC31AD-FC75-DB22-74E3-8B17B0F25A0F}"/>
+          </ac:picMkLst>
+        </pc:picChg>
+      </pc:sldChg>
+      <pc:sldChg chg="new del">
+        <pc:chgData name="Don Joseph" userId="01aadf7fde9797fb" providerId="LiveId" clId="{ECD254F5-8452-483E-B5C3-D5A628E50987}" dt="2024-02-22T13:15:54.512" v="134" actId="680"/>
+        <pc:sldMkLst>
+          <pc:docMk/>
+          <pc:sldMk cId="14560013" sldId="262"/>
+        </pc:sldMkLst>
+      </pc:sldChg>
+      <pc:sldChg chg="addSp delSp modSp add mod">
+        <pc:chgData name="Don Joseph" userId="01aadf7fde9797fb" providerId="LiveId" clId="{ECD254F5-8452-483E-B5C3-D5A628E50987}" dt="2024-02-22T13:16:43.668" v="166" actId="1076"/>
+        <pc:sldMkLst>
+          <pc:docMk/>
+          <pc:sldMk cId="1305278635" sldId="262"/>
+        </pc:sldMkLst>
+        <pc:spChg chg="del">
+          <ac:chgData name="Don Joseph" userId="01aadf7fde9797fb" providerId="LiveId" clId="{ECD254F5-8452-483E-B5C3-D5A628E50987}" dt="2024-02-22T13:16:16.703" v="162" actId="478"/>
+          <ac:spMkLst>
+            <pc:docMk/>
+            <pc:sldMk cId="1305278635" sldId="262"/>
+            <ac:spMk id="2" creationId="{A7386B6C-1E10-3F7C-A9F9-45B24322CC6C}"/>
+          </ac:spMkLst>
+        </pc:spChg>
+        <pc:spChg chg="del">
+          <ac:chgData name="Don Joseph" userId="01aadf7fde9797fb" providerId="LiveId" clId="{ECD254F5-8452-483E-B5C3-D5A628E50987}" dt="2024-02-22T13:16:16.703" v="162" actId="478"/>
+          <ac:spMkLst>
+            <pc:docMk/>
+            <pc:sldMk cId="1305278635" sldId="262"/>
+            <ac:spMk id="3" creationId="{1630F132-533A-296F-57E4-6D2FE3233471}"/>
+          </ac:spMkLst>
+        </pc:spChg>
+        <pc:spChg chg="del">
+          <ac:chgData name="Don Joseph" userId="01aadf7fde9797fb" providerId="LiveId" clId="{ECD254F5-8452-483E-B5C3-D5A628E50987}" dt="2024-02-22T13:16:16.703" v="162" actId="478"/>
+          <ac:spMkLst>
+            <pc:docMk/>
+            <pc:sldMk cId="1305278635" sldId="262"/>
+            <ac:spMk id="4" creationId="{039FC588-B5CC-92C0-1A00-D5C6432E0900}"/>
+          </ac:spMkLst>
+        </pc:spChg>
+        <pc:spChg chg="mod">
+          <ac:chgData name="Don Joseph" userId="01aadf7fde9797fb" providerId="LiveId" clId="{ECD254F5-8452-483E-B5C3-D5A628E50987}" dt="2024-02-22T13:16:12.334" v="161" actId="20577"/>
+          <ac:spMkLst>
+            <pc:docMk/>
+            <pc:sldMk cId="1305278635" sldId="262"/>
+            <ac:spMk id="6" creationId="{82399533-CF94-A139-F2FC-278F96C80036}"/>
+          </ac:spMkLst>
+        </pc:spChg>
+        <pc:picChg chg="add mod">
+          <ac:chgData name="Don Joseph" userId="01aadf7fde9797fb" providerId="LiveId" clId="{ECD254F5-8452-483E-B5C3-D5A628E50987}" dt="2024-02-22T13:16:43.668" v="166" actId="1076"/>
+          <ac:picMkLst>
+            <pc:docMk/>
+            <pc:sldMk cId="1305278635" sldId="262"/>
+            <ac:picMk id="7" creationId="{35973134-EA02-BD77-A7CA-6A534D78AA31}"/>
+          </ac:picMkLst>
+        </pc:picChg>
+        <pc:picChg chg="del">
+          <ac:chgData name="Don Joseph" userId="01aadf7fde9797fb" providerId="LiveId" clId="{ECD254F5-8452-483E-B5C3-D5A628E50987}" dt="2024-02-22T13:16:16.703" v="162" actId="478"/>
+          <ac:picMkLst>
+            <pc:docMk/>
+            <pc:sldMk cId="1305278635" sldId="262"/>
+            <ac:picMk id="8" creationId="{A0E479A2-DF16-BE5E-9899-9F7D4EA56A9D}"/>
+          </ac:picMkLst>
+        </pc:picChg>
+      </pc:sldChg>
+      <pc:sldChg chg="addSp delSp modSp add mod ord">
+        <pc:chgData name="Don Joseph" userId="01aadf7fde9797fb" providerId="LiveId" clId="{ECD254F5-8452-483E-B5C3-D5A628E50987}" dt="2024-02-22T13:39:11.713" v="1183" actId="1076"/>
+        <pc:sldMkLst>
+          <pc:docMk/>
+          <pc:sldMk cId="1340266221" sldId="263"/>
+        </pc:sldMkLst>
+        <pc:spChg chg="mod">
+          <ac:chgData name="Don Joseph" userId="01aadf7fde9797fb" providerId="LiveId" clId="{ECD254F5-8452-483E-B5C3-D5A628E50987}" dt="2024-02-22T13:39:11.713" v="1183" actId="1076"/>
+          <ac:spMkLst>
+            <pc:docMk/>
+            <pc:sldMk cId="1340266221" sldId="263"/>
+            <ac:spMk id="2" creationId="{C0A6A4AE-127D-DFA1-612E-B4834CFE853F}"/>
+          </ac:spMkLst>
+        </pc:spChg>
+        <pc:spChg chg="mod">
+          <ac:chgData name="Don Joseph" userId="01aadf7fde9797fb" providerId="LiveId" clId="{ECD254F5-8452-483E-B5C3-D5A628E50987}" dt="2024-02-22T13:39:09.583" v="1182" actId="1076"/>
+          <ac:spMkLst>
+            <pc:docMk/>
+            <pc:sldMk cId="1340266221" sldId="263"/>
+            <ac:spMk id="11" creationId="{55796F3B-8240-346E-FCE9-81EF397A4281}"/>
+          </ac:spMkLst>
+        </pc:spChg>
+        <pc:picChg chg="del">
+          <ac:chgData name="Don Joseph" userId="01aadf7fde9797fb" providerId="LiveId" clId="{ECD254F5-8452-483E-B5C3-D5A628E50987}" dt="2024-02-22T13:24:25.541" v="243" actId="478"/>
+          <ac:picMkLst>
+            <pc:docMk/>
+            <pc:sldMk cId="1340266221" sldId="263"/>
+            <ac:picMk id="3" creationId="{85ECC05F-0BD2-F7A5-E9A9-A7C0904BEEDC}"/>
+          </ac:picMkLst>
+        </pc:picChg>
+        <pc:picChg chg="add del mod">
+          <ac:chgData name="Don Joseph" userId="01aadf7fde9797fb" providerId="LiveId" clId="{ECD254F5-8452-483E-B5C3-D5A628E50987}" dt="2024-02-22T13:38:56.490" v="1176" actId="478"/>
+          <ac:picMkLst>
+            <pc:docMk/>
+            <pc:sldMk cId="1340266221" sldId="263"/>
+            <ac:picMk id="5" creationId="{542EBEA6-C001-1633-6E71-654B4EC2632D}"/>
+          </ac:picMkLst>
+        </pc:picChg>
+        <pc:picChg chg="add mod">
+          <ac:chgData name="Don Joseph" userId="01aadf7fde9797fb" providerId="LiveId" clId="{ECD254F5-8452-483E-B5C3-D5A628E50987}" dt="2024-02-22T13:39:01.040" v="1180" actId="1076"/>
+          <ac:picMkLst>
+            <pc:docMk/>
+            <pc:sldMk cId="1340266221" sldId="263"/>
+            <ac:picMk id="8" creationId="{21350F2D-D224-91D5-543D-72C51A9FEBD5}"/>
+          </ac:picMkLst>
+        </pc:picChg>
+      </pc:sldChg>
+      <pc:sldChg chg="addSp delSp modSp add mod">
+        <pc:chgData name="Don Joseph" userId="01aadf7fde9797fb" providerId="LiveId" clId="{ECD254F5-8452-483E-B5C3-D5A628E50987}" dt="2024-02-22T13:39:42.383" v="1250" actId="20577"/>
+        <pc:sldMkLst>
+          <pc:docMk/>
+          <pc:sldMk cId="4220258668" sldId="264"/>
+        </pc:sldMkLst>
+        <pc:spChg chg="mod">
+          <ac:chgData name="Don Joseph" userId="01aadf7fde9797fb" providerId="LiveId" clId="{ECD254F5-8452-483E-B5C3-D5A628E50987}" dt="2024-02-22T13:39:42.383" v="1250" actId="20577"/>
+          <ac:spMkLst>
+            <pc:docMk/>
+            <pc:sldMk cId="4220258668" sldId="264"/>
+            <ac:spMk id="2" creationId="{C0A6A4AE-127D-DFA1-612E-B4834CFE853F}"/>
+          </ac:spMkLst>
+        </pc:spChg>
+        <pc:picChg chg="add mod">
+          <ac:chgData name="Don Joseph" userId="01aadf7fde9797fb" providerId="LiveId" clId="{ECD254F5-8452-483E-B5C3-D5A628E50987}" dt="2024-02-22T13:39:15.848" v="1184" actId="1076"/>
+          <ac:picMkLst>
+            <pc:docMk/>
+            <pc:sldMk cId="4220258668" sldId="264"/>
+            <ac:picMk id="4" creationId="{ED5E8741-A463-1BD5-4FCE-A0BD279975F4}"/>
+          </ac:picMkLst>
+        </pc:picChg>
+        <pc:picChg chg="del">
+          <ac:chgData name="Don Joseph" userId="01aadf7fde9797fb" providerId="LiveId" clId="{ECD254F5-8452-483E-B5C3-D5A628E50987}" dt="2024-02-22T13:28:57.434" v="601" actId="478"/>
+          <ac:picMkLst>
+            <pc:docMk/>
+            <pc:sldMk cId="4220258668" sldId="264"/>
+            <ac:picMk id="5" creationId="{542EBEA6-C001-1633-6E71-654B4EC2632D}"/>
+          </ac:picMkLst>
+        </pc:picChg>
+      </pc:sldChg>
+      <pc:sldChg chg="addSp delSp modSp add mod">
+        <pc:chgData name="Don Joseph" userId="01aadf7fde9797fb" providerId="LiveId" clId="{ECD254F5-8452-483E-B5C3-D5A628E50987}" dt="2024-02-22T13:40:28.692" v="1284" actId="20577"/>
+        <pc:sldMkLst>
+          <pc:docMk/>
+          <pc:sldMk cId="1135089603" sldId="265"/>
+        </pc:sldMkLst>
+        <pc:spChg chg="mod">
+          <ac:chgData name="Don Joseph" userId="01aadf7fde9797fb" providerId="LiveId" clId="{ECD254F5-8452-483E-B5C3-D5A628E50987}" dt="2024-02-22T13:40:28.692" v="1284" actId="20577"/>
+          <ac:spMkLst>
+            <pc:docMk/>
+            <pc:sldMk cId="1135089603" sldId="265"/>
+            <ac:spMk id="6" creationId="{82399533-CF94-A139-F2FC-278F96C80036}"/>
+          </ac:spMkLst>
+        </pc:spChg>
+        <pc:picChg chg="add mod">
+          <ac:chgData name="Don Joseph" userId="01aadf7fde9797fb" providerId="LiveId" clId="{ECD254F5-8452-483E-B5C3-D5A628E50987}" dt="2024-02-22T13:40:25.273" v="1270" actId="1076"/>
+          <ac:picMkLst>
+            <pc:docMk/>
+            <pc:sldMk cId="1135089603" sldId="265"/>
+            <ac:picMk id="3" creationId="{3A896A68-633D-5E20-6A04-3CA136241A91}"/>
+          </ac:picMkLst>
+        </pc:picChg>
+        <pc:picChg chg="del">
+          <ac:chgData name="Don Joseph" userId="01aadf7fde9797fb" providerId="LiveId" clId="{ECD254F5-8452-483E-B5C3-D5A628E50987}" dt="2024-02-22T13:40:22.806" v="1268" actId="478"/>
+          <ac:picMkLst>
+            <pc:docMk/>
+            <pc:sldMk cId="1135089603" sldId="265"/>
+            <ac:picMk id="4" creationId="{5D1DCE3F-AE6E-9A79-D862-1E256A1F8657}"/>
           </ac:picMkLst>
         </pc:picChg>
       </pc:sldChg>
@@ -3694,7 +3924,7 @@
         <p:spPr>
           <a:xfrm>
             <a:off x="811763" y="317240"/>
-            <a:ext cx="2033955" cy="369332"/>
+            <a:ext cx="3525645" cy="369332"/>
           </a:xfrm>
           <a:prstGeom prst="rect">
             <a:avLst/>
@@ -3709,7 +3939,7 @@
           <a:p>
             <a:r>
               <a:rPr lang="en-GB" b="1" u="sng" dirty="0"/>
-              <a:t>K-Means Clustering</a:t>
+              <a:t>Clustering Evaluation – Elbow plots</a:t>
             </a:r>
           </a:p>
         </p:txBody>
@@ -3913,7 +4143,197 @@
 </p:sld>
 </file>
 
+<file path=ppt/slides/slide10.xml><?xml version="1.0" encoding="utf-8"?>
+<p:sld xmlns:a="http://schemas.openxmlformats.org/drawingml/2006/main" xmlns:r="http://schemas.openxmlformats.org/officeDocument/2006/relationships" xmlns:p="http://schemas.openxmlformats.org/presentationml/2006/main">
+  <p:cSld>
+    <p:spTree>
+      <p:nvGrpSpPr>
+        <p:cNvPr id="1" name=""/>
+        <p:cNvGrpSpPr/>
+        <p:nvPr/>
+      </p:nvGrpSpPr>
+      <p:grpSpPr>
+        <a:xfrm>
+          <a:off x="0" y="0"/>
+          <a:ext cx="0" cy="0"/>
+          <a:chOff x="0" y="0"/>
+          <a:chExt cx="0" cy="0"/>
+        </a:xfrm>
+      </p:grpSpPr>
+      <p:sp>
+        <p:nvSpPr>
+          <p:cNvPr id="6" name="TextBox 5">
+            <a:extLst>
+              <a:ext uri="{FF2B5EF4-FFF2-40B4-BE49-F238E27FC236}">
+                <a16:creationId xmlns:a16="http://schemas.microsoft.com/office/drawing/2014/main" id="{82399533-CF94-A139-F2FC-278F96C80036}"/>
+              </a:ext>
+            </a:extLst>
+          </p:cNvPr>
+          <p:cNvSpPr txBox="1"/>
+          <p:nvPr/>
+        </p:nvSpPr>
+        <p:spPr>
+          <a:xfrm>
+            <a:off x="811763" y="317240"/>
+            <a:ext cx="5945217" cy="369332"/>
+          </a:xfrm>
+          <a:prstGeom prst="rect">
+            <a:avLst/>
+          </a:prstGeom>
+          <a:noFill/>
+        </p:spPr>
+        <p:txBody>
+          <a:bodyPr wrap="none" rtlCol="0">
+            <a:spAutoFit/>
+          </a:bodyPr>
+          <a:lstStyle/>
+          <a:p>
+            <a:r>
+              <a:rPr lang="en-GB" b="1" u="sng" dirty="0"/>
+              <a:t>Spending behaviours for each customer segment – 5 clusters</a:t>
+            </a:r>
+          </a:p>
+        </p:txBody>
+      </p:sp>
+      <p:pic>
+        <p:nvPicPr>
+          <p:cNvPr id="3" name="Picture 2">
+            <a:extLst>
+              <a:ext uri="{FF2B5EF4-FFF2-40B4-BE49-F238E27FC236}">
+                <a16:creationId xmlns:a16="http://schemas.microsoft.com/office/drawing/2014/main" id="{3A896A68-633D-5E20-6A04-3CA136241A91}"/>
+              </a:ext>
+            </a:extLst>
+          </p:cNvPr>
+          <p:cNvPicPr>
+            <a:picLocks noChangeAspect="1"/>
+          </p:cNvPicPr>
+          <p:nvPr/>
+        </p:nvPicPr>
+        <p:blipFill>
+          <a:blip r:embed="rId2"/>
+          <a:stretch>
+            <a:fillRect/>
+          </a:stretch>
+        </p:blipFill>
+        <p:spPr>
+          <a:xfrm>
+            <a:off x="546375" y="1439883"/>
+            <a:ext cx="11099249" cy="4754224"/>
+          </a:xfrm>
+          <a:prstGeom prst="rect">
+            <a:avLst/>
+          </a:prstGeom>
+        </p:spPr>
+      </p:pic>
+    </p:spTree>
+    <p:extLst>
+      <p:ext uri="{BB962C8B-B14F-4D97-AF65-F5344CB8AC3E}">
+        <p14:creationId xmlns:p14="http://schemas.microsoft.com/office/powerpoint/2010/main" val="1135089603"/>
+      </p:ext>
+    </p:extLst>
+  </p:cSld>
+  <p:clrMapOvr>
+    <a:masterClrMapping/>
+  </p:clrMapOvr>
+</p:sld>
+</file>
+
 <file path=ppt/slides/slide2.xml><?xml version="1.0" encoding="utf-8"?>
+<p:sld xmlns:a="http://schemas.openxmlformats.org/drawingml/2006/main" xmlns:r="http://schemas.openxmlformats.org/officeDocument/2006/relationships" xmlns:p="http://schemas.openxmlformats.org/presentationml/2006/main">
+  <p:cSld>
+    <p:spTree>
+      <p:nvGrpSpPr>
+        <p:cNvPr id="1" name=""/>
+        <p:cNvGrpSpPr/>
+        <p:nvPr/>
+      </p:nvGrpSpPr>
+      <p:grpSpPr>
+        <a:xfrm>
+          <a:off x="0" y="0"/>
+          <a:ext cx="0" cy="0"/>
+          <a:chOff x="0" y="0"/>
+          <a:chExt cx="0" cy="0"/>
+        </a:xfrm>
+      </p:grpSpPr>
+      <p:sp>
+        <p:nvSpPr>
+          <p:cNvPr id="6" name="TextBox 5">
+            <a:extLst>
+              <a:ext uri="{FF2B5EF4-FFF2-40B4-BE49-F238E27FC236}">
+                <a16:creationId xmlns:a16="http://schemas.microsoft.com/office/drawing/2014/main" id="{82399533-CF94-A139-F2FC-278F96C80036}"/>
+              </a:ext>
+            </a:extLst>
+          </p:cNvPr>
+          <p:cNvSpPr txBox="1"/>
+          <p:nvPr/>
+        </p:nvSpPr>
+        <p:spPr>
+          <a:xfrm>
+            <a:off x="811763" y="317240"/>
+            <a:ext cx="3944862" cy="369332"/>
+          </a:xfrm>
+          <a:prstGeom prst="rect">
+            <a:avLst/>
+          </a:prstGeom>
+          <a:noFill/>
+        </p:spPr>
+        <p:txBody>
+          <a:bodyPr wrap="none" rtlCol="0">
+            <a:spAutoFit/>
+          </a:bodyPr>
+          <a:lstStyle/>
+          <a:p>
+            <a:r>
+              <a:rPr lang="en-GB" b="1" u="sng" dirty="0"/>
+              <a:t>Clustering Evaluation – Silhouette score</a:t>
+            </a:r>
+          </a:p>
+        </p:txBody>
+      </p:sp>
+      <p:pic>
+        <p:nvPicPr>
+          <p:cNvPr id="7" name="Picture 6">
+            <a:extLst>
+              <a:ext uri="{FF2B5EF4-FFF2-40B4-BE49-F238E27FC236}">
+                <a16:creationId xmlns:a16="http://schemas.microsoft.com/office/drawing/2014/main" id="{35973134-EA02-BD77-A7CA-6A534D78AA31}"/>
+              </a:ext>
+            </a:extLst>
+          </p:cNvPr>
+          <p:cNvPicPr>
+            <a:picLocks noChangeAspect="1"/>
+          </p:cNvPicPr>
+          <p:nvPr/>
+        </p:nvPicPr>
+        <p:blipFill>
+          <a:blip r:embed="rId2"/>
+          <a:stretch>
+            <a:fillRect/>
+          </a:stretch>
+        </p:blipFill>
+        <p:spPr>
+          <a:xfrm>
+            <a:off x="2782467" y="1355174"/>
+            <a:ext cx="6380194" cy="4958756"/>
+          </a:xfrm>
+          <a:prstGeom prst="rect">
+            <a:avLst/>
+          </a:prstGeom>
+        </p:spPr>
+      </p:pic>
+    </p:spTree>
+    <p:extLst>
+      <p:ext uri="{BB962C8B-B14F-4D97-AF65-F5344CB8AC3E}">
+        <p14:creationId xmlns:p14="http://schemas.microsoft.com/office/powerpoint/2010/main" val="1305278635"/>
+      </p:ext>
+    </p:extLst>
+  </p:cSld>
+  <p:clrMapOvr>
+    <a:masterClrMapping/>
+  </p:clrMapOvr>
+</p:sld>
+</file>
+
+<file path=ppt/slides/slide3.xml><?xml version="1.0" encoding="utf-8"?>
 <p:sld xmlns:a="http://schemas.openxmlformats.org/drawingml/2006/main" xmlns:r="http://schemas.openxmlformats.org/officeDocument/2006/relationships" xmlns:p="http://schemas.openxmlformats.org/presentationml/2006/main">
   <p:cSld>
     <p:spTree>
@@ -4008,7 +4428,7 @@
 </p:sld>
 </file>
 
-<file path=ppt/slides/slide3.xml><?xml version="1.0" encoding="utf-8"?>
+<file path=ppt/slides/slide4.xml><?xml version="1.0" encoding="utf-8"?>
 <p:sld xmlns:a="http://schemas.openxmlformats.org/drawingml/2006/main" xmlns:r="http://schemas.openxmlformats.org/officeDocument/2006/relationships" xmlns:p="http://schemas.openxmlformats.org/presentationml/2006/main">
   <p:cSld>
     <p:spTree>
@@ -4200,7 +4620,7 @@
 </p:sld>
 </file>
 
-<file path=ppt/slides/slide4.xml><?xml version="1.0" encoding="utf-8"?>
+<file path=ppt/slides/slide5.xml><?xml version="1.0" encoding="utf-8"?>
 <p:sld xmlns:a="http://schemas.openxmlformats.org/drawingml/2006/main" xmlns:r="http://schemas.openxmlformats.org/officeDocument/2006/relationships" xmlns:p="http://schemas.openxmlformats.org/presentationml/2006/main">
   <p:cSld>
     <p:spTree>
@@ -4266,7 +4686,7 @@
         </p:nvSpPr>
         <p:spPr>
           <a:xfrm>
-            <a:off x="7377580" y="606206"/>
+            <a:off x="7265820" y="929371"/>
             <a:ext cx="4492367" cy="646331"/>
           </a:xfrm>
           <a:prstGeom prst="rect">
@@ -4291,12 +4711,99 @@
           </a:p>
         </p:txBody>
       </p:sp>
+      <p:sp>
+        <p:nvSpPr>
+          <p:cNvPr id="2" name="TextBox 1">
+            <a:extLst>
+              <a:ext uri="{FF2B5EF4-FFF2-40B4-BE49-F238E27FC236}">
+                <a16:creationId xmlns:a16="http://schemas.microsoft.com/office/drawing/2014/main" id="{C0A6A4AE-127D-DFA1-612E-B4834CFE853F}"/>
+              </a:ext>
+            </a:extLst>
+          </p:cNvPr>
+          <p:cNvSpPr txBox="1"/>
+          <p:nvPr/>
+        </p:nvSpPr>
+        <p:spPr>
+          <a:xfrm>
+            <a:off x="7265820" y="1081771"/>
+            <a:ext cx="4492367" cy="2031325"/>
+          </a:xfrm>
+          <a:prstGeom prst="rect">
+            <a:avLst/>
+          </a:prstGeom>
+          <a:noFill/>
+        </p:spPr>
+        <p:txBody>
+          <a:bodyPr wrap="square" rtlCol="0">
+            <a:spAutoFit/>
+          </a:bodyPr>
+          <a:lstStyle/>
+          <a:p>
+            <a:pPr marL="285750" indent="-285750">
+              <a:buFont typeface="Arial" panose="020B0604020202020204" pitchFamily="34" charset="0"/>
+              <a:buChar char="•"/>
+            </a:pPr>
+            <a:r>
+              <a:rPr lang="en-GB" dirty="0"/>
+              <a:t>Most individuals in core clusters 0, 2 and 3.</a:t>
+            </a:r>
+          </a:p>
+          <a:p>
+            <a:pPr marL="285750" indent="-285750">
+              <a:buFont typeface="Arial" panose="020B0604020202020204" pitchFamily="34" charset="0"/>
+              <a:buChar char="•"/>
+            </a:pPr>
+            <a:endParaRPr lang="en-GB" dirty="0"/>
+          </a:p>
+          <a:p>
+            <a:pPr marL="285750" indent="-285750">
+              <a:buFont typeface="Arial" panose="020B0604020202020204" pitchFamily="34" charset="0"/>
+              <a:buChar char="•"/>
+            </a:pPr>
+            <a:r>
+              <a:rPr lang="en-GB" dirty="0"/>
+              <a:t>Minor clusters in 2 and 4.</a:t>
+            </a:r>
+          </a:p>
+          <a:p>
+            <a:pPr marL="285750" indent="-285750">
+              <a:buFont typeface="Arial" panose="020B0604020202020204" pitchFamily="34" charset="0"/>
+              <a:buChar char="•"/>
+            </a:pPr>
+            <a:endParaRPr lang="en-GB" dirty="0"/>
+          </a:p>
+          <a:p>
+            <a:pPr marL="285750" indent="-285750">
+              <a:buFont typeface="Arial" panose="020B0604020202020204" pitchFamily="34" charset="0"/>
+              <a:buChar char="•"/>
+            </a:pPr>
+            <a:r>
+              <a:rPr lang="en-GB" dirty="0"/>
+              <a:t>2 core clusters and 2 minor clusters.</a:t>
+            </a:r>
+          </a:p>
+          <a:p>
+            <a:pPr marL="285750" indent="-285750">
+              <a:buFont typeface="Arial" panose="020B0604020202020204" pitchFamily="34" charset="0"/>
+              <a:buChar char="•"/>
+            </a:pPr>
+            <a:endParaRPr lang="en-GB" dirty="0"/>
+          </a:p>
+          <a:p>
+            <a:pPr marL="285750" indent="-285750">
+              <a:buFont typeface="Arial" panose="020B0604020202020204" pitchFamily="34" charset="0"/>
+              <a:buChar char="•"/>
+            </a:pPr>
+            <a:endParaRPr lang="en-GB" dirty="0"/>
+          </a:p>
+        </p:txBody>
+      </p:sp>
       <p:pic>
         <p:nvPicPr>
-          <p:cNvPr id="3" name="Picture 2">
-            <a:extLst>
-              <a:ext uri="{FF2B5EF4-FFF2-40B4-BE49-F238E27FC236}">
-                <a16:creationId xmlns:a16="http://schemas.microsoft.com/office/drawing/2014/main" id="{85ECC05F-0BD2-F7A5-E9A9-A7C0904BEEDC}"/>
+          <p:cNvPr id="8" name="Picture 7">
+            <a:extLst>
+              <a:ext uri="{FF2B5EF4-FFF2-40B4-BE49-F238E27FC236}">
+                <a16:creationId xmlns:a16="http://schemas.microsoft.com/office/drawing/2014/main" id="{21350F2D-D224-91D5-543D-72C51A9FEBD5}"/>
               </a:ext>
             </a:extLst>
           </p:cNvPr>
@@ -4313,7 +4820,514 @@
         </p:blipFill>
         <p:spPr>
           <a:xfrm>
-            <a:off x="396940" y="1373835"/>
+            <a:off x="636735" y="1371599"/>
+            <a:ext cx="5894240" cy="4585335"/>
+          </a:xfrm>
+          <a:prstGeom prst="rect">
+            <a:avLst/>
+          </a:prstGeom>
+        </p:spPr>
+      </p:pic>
+    </p:spTree>
+    <p:extLst>
+      <p:ext uri="{BB962C8B-B14F-4D97-AF65-F5344CB8AC3E}">
+        <p14:creationId xmlns:p14="http://schemas.microsoft.com/office/powerpoint/2010/main" val="1340266221"/>
+      </p:ext>
+    </p:extLst>
+  </p:cSld>
+  <p:clrMapOvr>
+    <a:masterClrMapping/>
+  </p:clrMapOvr>
+</p:sld>
+</file>
+
+<file path=ppt/slides/slide6.xml><?xml version="1.0" encoding="utf-8"?>
+<p:sld xmlns:a="http://schemas.openxmlformats.org/drawingml/2006/main" xmlns:r="http://schemas.openxmlformats.org/officeDocument/2006/relationships" xmlns:p="http://schemas.openxmlformats.org/presentationml/2006/main">
+  <p:cSld>
+    <p:spTree>
+      <p:nvGrpSpPr>
+        <p:cNvPr id="1" name=""/>
+        <p:cNvGrpSpPr/>
+        <p:nvPr/>
+      </p:nvGrpSpPr>
+      <p:grpSpPr>
+        <a:xfrm>
+          <a:off x="0" y="0"/>
+          <a:ext cx="0" cy="0"/>
+          <a:chOff x="0" y="0"/>
+          <a:chExt cx="0" cy="0"/>
+        </a:xfrm>
+      </p:grpSpPr>
+      <p:sp>
+        <p:nvSpPr>
+          <p:cNvPr id="6" name="TextBox 5">
+            <a:extLst>
+              <a:ext uri="{FF2B5EF4-FFF2-40B4-BE49-F238E27FC236}">
+                <a16:creationId xmlns:a16="http://schemas.microsoft.com/office/drawing/2014/main" id="{82399533-CF94-A139-F2FC-278F96C80036}"/>
+              </a:ext>
+            </a:extLst>
+          </p:cNvPr>
+          <p:cNvSpPr txBox="1"/>
+          <p:nvPr/>
+        </p:nvSpPr>
+        <p:spPr>
+          <a:xfrm>
+            <a:off x="811763" y="317240"/>
+            <a:ext cx="1107804" cy="369332"/>
+          </a:xfrm>
+          <a:prstGeom prst="rect">
+            <a:avLst/>
+          </a:prstGeom>
+          <a:noFill/>
+        </p:spPr>
+        <p:txBody>
+          <a:bodyPr wrap="none" rtlCol="0">
+            <a:spAutoFit/>
+          </a:bodyPr>
+          <a:lstStyle/>
+          <a:p>
+            <a:r>
+              <a:rPr lang="en-GB" b="1" u="sng" dirty="0"/>
+              <a:t>5 Clusters</a:t>
+            </a:r>
+          </a:p>
+        </p:txBody>
+      </p:sp>
+      <p:sp>
+        <p:nvSpPr>
+          <p:cNvPr id="11" name="TextBox 10">
+            <a:extLst>
+              <a:ext uri="{FF2B5EF4-FFF2-40B4-BE49-F238E27FC236}">
+                <a16:creationId xmlns:a16="http://schemas.microsoft.com/office/drawing/2014/main" id="{55796F3B-8240-346E-FCE9-81EF397A4281}"/>
+              </a:ext>
+            </a:extLst>
+          </p:cNvPr>
+          <p:cNvSpPr txBox="1"/>
+          <p:nvPr/>
+        </p:nvSpPr>
+        <p:spPr>
+          <a:xfrm>
+            <a:off x="7377580" y="606206"/>
+            <a:ext cx="4492367" cy="646331"/>
+          </a:xfrm>
+          <a:prstGeom prst="rect">
+            <a:avLst/>
+          </a:prstGeom>
+          <a:noFill/>
+        </p:spPr>
+        <p:txBody>
+          <a:bodyPr wrap="square" rtlCol="0">
+            <a:spAutoFit/>
+          </a:bodyPr>
+          <a:lstStyle/>
+          <a:p>
+            <a:endParaRPr lang="en-GB" dirty="0"/>
+          </a:p>
+          <a:p>
+            <a:pPr marL="285750" indent="-285750">
+              <a:buFont typeface="Arial" panose="020B0604020202020204" pitchFamily="34" charset="0"/>
+              <a:buChar char="•"/>
+            </a:pPr>
+            <a:endParaRPr lang="en-GB" dirty="0"/>
+          </a:p>
+        </p:txBody>
+      </p:sp>
+      <p:sp>
+        <p:nvSpPr>
+          <p:cNvPr id="2" name="TextBox 1">
+            <a:extLst>
+              <a:ext uri="{FF2B5EF4-FFF2-40B4-BE49-F238E27FC236}">
+                <a16:creationId xmlns:a16="http://schemas.microsoft.com/office/drawing/2014/main" id="{C0A6A4AE-127D-DFA1-612E-B4834CFE853F}"/>
+              </a:ext>
+            </a:extLst>
+          </p:cNvPr>
+          <p:cNvSpPr txBox="1"/>
+          <p:nvPr/>
+        </p:nvSpPr>
+        <p:spPr>
+          <a:xfrm>
+            <a:off x="7023546" y="1001511"/>
+            <a:ext cx="4846401" cy="3139321"/>
+          </a:xfrm>
+          <a:prstGeom prst="rect">
+            <a:avLst/>
+          </a:prstGeom>
+          <a:noFill/>
+        </p:spPr>
+        <p:txBody>
+          <a:bodyPr wrap="square" rtlCol="0">
+            <a:spAutoFit/>
+          </a:bodyPr>
+          <a:lstStyle/>
+          <a:p>
+            <a:pPr marL="285750" indent="-285750">
+              <a:buFont typeface="Arial" panose="020B0604020202020204" pitchFamily="34" charset="0"/>
+              <a:buChar char="•"/>
+            </a:pPr>
+            <a:r>
+              <a:rPr lang="en-GB" dirty="0"/>
+              <a:t>Low spread around monetary spend.</a:t>
+            </a:r>
+          </a:p>
+          <a:p>
+            <a:pPr marL="285750" indent="-285750">
+              <a:buFont typeface="Arial" panose="020B0604020202020204" pitchFamily="34" charset="0"/>
+              <a:buChar char="•"/>
+            </a:pPr>
+            <a:endParaRPr lang="en-GB" dirty="0"/>
+          </a:p>
+          <a:p>
+            <a:pPr marL="285750" indent="-285750">
+              <a:buFont typeface="Arial" panose="020B0604020202020204" pitchFamily="34" charset="0"/>
+              <a:buChar char="•"/>
+            </a:pPr>
+            <a:r>
+              <a:rPr lang="en-GB" dirty="0"/>
+              <a:t>Many customers are relatively infrequent spenders with one cluster where frequency of transactions is high.</a:t>
+            </a:r>
+          </a:p>
+          <a:p>
+            <a:pPr marL="285750" indent="-285750">
+              <a:buFont typeface="Arial" panose="020B0604020202020204" pitchFamily="34" charset="0"/>
+              <a:buChar char="•"/>
+            </a:pPr>
+            <a:endParaRPr lang="en-GB" dirty="0"/>
+          </a:p>
+          <a:p>
+            <a:pPr marL="285750" indent="-285750">
+              <a:buFont typeface="Arial" panose="020B0604020202020204" pitchFamily="34" charset="0"/>
+              <a:buChar char="•"/>
+            </a:pPr>
+            <a:r>
+              <a:rPr lang="en-GB" dirty="0"/>
+              <a:t>2 Clusters with highly above average recency – spending very close up until the end of the year. </a:t>
+            </a:r>
+          </a:p>
+          <a:p>
+            <a:pPr marL="285750" indent="-285750">
+              <a:buFont typeface="Arial" panose="020B0604020202020204" pitchFamily="34" charset="0"/>
+              <a:buChar char="•"/>
+            </a:pPr>
+            <a:endParaRPr lang="en-GB" dirty="0"/>
+          </a:p>
+          <a:p>
+            <a:pPr marL="285750" indent="-285750">
+              <a:buFont typeface="Arial" panose="020B0604020202020204" pitchFamily="34" charset="0"/>
+              <a:buChar char="•"/>
+            </a:pPr>
+            <a:endParaRPr lang="en-GB" dirty="0"/>
+          </a:p>
+        </p:txBody>
+      </p:sp>
+      <p:pic>
+        <p:nvPicPr>
+          <p:cNvPr id="4" name="Picture 3">
+            <a:extLst>
+              <a:ext uri="{FF2B5EF4-FFF2-40B4-BE49-F238E27FC236}">
+                <a16:creationId xmlns:a16="http://schemas.microsoft.com/office/drawing/2014/main" id="{ED5E8741-A463-1BD5-4FCE-A0BD279975F4}"/>
+              </a:ext>
+            </a:extLst>
+          </p:cNvPr>
+          <p:cNvPicPr>
+            <a:picLocks noChangeAspect="1"/>
+          </p:cNvPicPr>
+          <p:nvPr/>
+        </p:nvPicPr>
+        <p:blipFill>
+          <a:blip r:embed="rId2"/>
+          <a:stretch>
+            <a:fillRect/>
+          </a:stretch>
+        </p:blipFill>
+        <p:spPr>
+          <a:xfrm>
+            <a:off x="322053" y="1934873"/>
+            <a:ext cx="6057900" cy="2105025"/>
+          </a:xfrm>
+          <a:prstGeom prst="rect">
+            <a:avLst/>
+          </a:prstGeom>
+        </p:spPr>
+      </p:pic>
+    </p:spTree>
+    <p:extLst>
+      <p:ext uri="{BB962C8B-B14F-4D97-AF65-F5344CB8AC3E}">
+        <p14:creationId xmlns:p14="http://schemas.microsoft.com/office/powerpoint/2010/main" val="4220258668"/>
+      </p:ext>
+    </p:extLst>
+  </p:cSld>
+  <p:clrMapOvr>
+    <a:masterClrMapping/>
+  </p:clrMapOvr>
+</p:sld>
+</file>
+
+<file path=ppt/slides/slide7.xml><?xml version="1.0" encoding="utf-8"?>
+<p:sld xmlns:a="http://schemas.openxmlformats.org/drawingml/2006/main" xmlns:r="http://schemas.openxmlformats.org/officeDocument/2006/relationships" xmlns:p="http://schemas.openxmlformats.org/presentationml/2006/main">
+  <p:cSld>
+    <p:spTree>
+      <p:nvGrpSpPr>
+        <p:cNvPr id="1" name=""/>
+        <p:cNvGrpSpPr/>
+        <p:nvPr/>
+      </p:nvGrpSpPr>
+      <p:grpSpPr>
+        <a:xfrm>
+          <a:off x="0" y="0"/>
+          <a:ext cx="0" cy="0"/>
+          <a:chOff x="0" y="0"/>
+          <a:chExt cx="0" cy="0"/>
+        </a:xfrm>
+      </p:grpSpPr>
+      <p:sp>
+        <p:nvSpPr>
+          <p:cNvPr id="6" name="TextBox 5">
+            <a:extLst>
+              <a:ext uri="{FF2B5EF4-FFF2-40B4-BE49-F238E27FC236}">
+                <a16:creationId xmlns:a16="http://schemas.microsoft.com/office/drawing/2014/main" id="{82399533-CF94-A139-F2FC-278F96C80036}"/>
+              </a:ext>
+            </a:extLst>
+          </p:cNvPr>
+          <p:cNvSpPr txBox="1"/>
+          <p:nvPr/>
+        </p:nvSpPr>
+        <p:spPr>
+          <a:xfrm>
+            <a:off x="811763" y="317240"/>
+            <a:ext cx="1107804" cy="369332"/>
+          </a:xfrm>
+          <a:prstGeom prst="rect">
+            <a:avLst/>
+          </a:prstGeom>
+          <a:noFill/>
+        </p:spPr>
+        <p:txBody>
+          <a:bodyPr wrap="none" rtlCol="0">
+            <a:spAutoFit/>
+          </a:bodyPr>
+          <a:lstStyle/>
+          <a:p>
+            <a:r>
+              <a:rPr lang="en-GB" b="1" u="sng" dirty="0"/>
+              <a:t>5 Clusters</a:t>
+            </a:r>
+          </a:p>
+        </p:txBody>
+      </p:sp>
+      <p:sp>
+        <p:nvSpPr>
+          <p:cNvPr id="11" name="TextBox 10">
+            <a:extLst>
+              <a:ext uri="{FF2B5EF4-FFF2-40B4-BE49-F238E27FC236}">
+                <a16:creationId xmlns:a16="http://schemas.microsoft.com/office/drawing/2014/main" id="{55796F3B-8240-346E-FCE9-81EF397A4281}"/>
+              </a:ext>
+            </a:extLst>
+          </p:cNvPr>
+          <p:cNvSpPr txBox="1"/>
+          <p:nvPr/>
+        </p:nvSpPr>
+        <p:spPr>
+          <a:xfrm>
+            <a:off x="7377580" y="606206"/>
+            <a:ext cx="4492367" cy="646331"/>
+          </a:xfrm>
+          <a:prstGeom prst="rect">
+            <a:avLst/>
+          </a:prstGeom>
+          <a:noFill/>
+        </p:spPr>
+        <p:txBody>
+          <a:bodyPr wrap="square" rtlCol="0">
+            <a:spAutoFit/>
+          </a:bodyPr>
+          <a:lstStyle/>
+          <a:p>
+            <a:endParaRPr lang="en-GB" dirty="0"/>
+          </a:p>
+          <a:p>
+            <a:pPr marL="285750" indent="-285750">
+              <a:buFont typeface="Arial" panose="020B0604020202020204" pitchFamily="34" charset="0"/>
+              <a:buChar char="•"/>
+            </a:pPr>
+            <a:endParaRPr lang="en-GB" dirty="0"/>
+          </a:p>
+        </p:txBody>
+      </p:sp>
+      <p:sp>
+        <p:nvSpPr>
+          <p:cNvPr id="2" name="TextBox 1">
+            <a:extLst>
+              <a:ext uri="{FF2B5EF4-FFF2-40B4-BE49-F238E27FC236}">
+                <a16:creationId xmlns:a16="http://schemas.microsoft.com/office/drawing/2014/main" id="{C0A6A4AE-127D-DFA1-612E-B4834CFE853F}"/>
+              </a:ext>
+            </a:extLst>
+          </p:cNvPr>
+          <p:cNvSpPr txBox="1"/>
+          <p:nvPr/>
+        </p:nvSpPr>
+        <p:spPr>
+          <a:xfrm>
+            <a:off x="7093000" y="1084586"/>
+            <a:ext cx="4492367" cy="4708981"/>
+          </a:xfrm>
+          <a:prstGeom prst="rect">
+            <a:avLst/>
+          </a:prstGeom>
+          <a:noFill/>
+        </p:spPr>
+        <p:txBody>
+          <a:bodyPr wrap="square" rtlCol="0">
+            <a:spAutoFit/>
+          </a:bodyPr>
+          <a:lstStyle/>
+          <a:p>
+            <a:r>
+              <a:rPr lang="en-GB" sz="1500" b="1" u="sng" dirty="0"/>
+              <a:t>Major clusters (0,1,3)</a:t>
+            </a:r>
+          </a:p>
+          <a:p>
+            <a:endParaRPr lang="en-GB" sz="1500" b="1" dirty="0"/>
+          </a:p>
+          <a:p>
+            <a:pPr marL="285750" indent="-285750">
+              <a:buFont typeface="Arial" panose="020B0604020202020204" pitchFamily="34" charset="0"/>
+              <a:buChar char="•"/>
+            </a:pPr>
+            <a:r>
+              <a:rPr lang="en-GB" sz="1500" b="1" dirty="0"/>
+              <a:t>0</a:t>
+            </a:r>
+            <a:r>
+              <a:rPr lang="en-GB" sz="1500" dirty="0"/>
+              <a:t>: Below average on all metrics.</a:t>
+            </a:r>
+          </a:p>
+          <a:p>
+            <a:pPr marL="285750" indent="-285750">
+              <a:buFont typeface="Arial" panose="020B0604020202020204" pitchFamily="34" charset="0"/>
+              <a:buChar char="•"/>
+            </a:pPr>
+            <a:r>
+              <a:rPr lang="en-GB" sz="1500" b="1" dirty="0"/>
+              <a:t>1</a:t>
+            </a:r>
+            <a:r>
+              <a:rPr lang="en-GB" sz="1500" dirty="0"/>
+              <a:t>: Above average frequency and monetary spend, low recency.</a:t>
+            </a:r>
+          </a:p>
+          <a:p>
+            <a:pPr marL="285750" indent="-285750">
+              <a:buFont typeface="Arial" panose="020B0604020202020204" pitchFamily="34" charset="0"/>
+              <a:buChar char="•"/>
+            </a:pPr>
+            <a:r>
+              <a:rPr lang="en-GB" sz="1500" b="1" dirty="0"/>
+              <a:t>3</a:t>
+            </a:r>
+            <a:r>
+              <a:rPr lang="en-GB" sz="1500" dirty="0"/>
+              <a:t>: Below average recency and frequency and average/slightly above average monetary spend.</a:t>
+            </a:r>
+          </a:p>
+          <a:p>
+            <a:endParaRPr lang="en-GB" sz="1500" dirty="0"/>
+          </a:p>
+          <a:p>
+            <a:r>
+              <a:rPr lang="en-GB" sz="1500" dirty="0"/>
+              <a:t>Very large group of people.</a:t>
+            </a:r>
+          </a:p>
+          <a:p>
+            <a:endParaRPr lang="en-GB" sz="1500" dirty="0"/>
+          </a:p>
+          <a:p>
+            <a:r>
+              <a:rPr lang="en-GB" sz="1500" b="1" u="sng" dirty="0"/>
+              <a:t>Minor </a:t>
+            </a:r>
+            <a:r>
+              <a:rPr lang="en-GB" sz="1500" b="1" u="sng"/>
+              <a:t>clusters (2,4)</a:t>
+            </a:r>
+            <a:endParaRPr lang="en-GB" sz="1500" b="1" u="sng" dirty="0"/>
+          </a:p>
+          <a:p>
+            <a:endParaRPr lang="en-GB" sz="1500" dirty="0"/>
+          </a:p>
+          <a:p>
+            <a:pPr marL="285750" indent="-285750">
+              <a:buFont typeface="Arial" panose="020B0604020202020204" pitchFamily="34" charset="0"/>
+              <a:buChar char="•"/>
+            </a:pPr>
+            <a:r>
+              <a:rPr lang="en-GB" sz="1500" b="1" dirty="0"/>
+              <a:t>2</a:t>
+            </a:r>
+            <a:r>
+              <a:rPr lang="en-GB" sz="1500" dirty="0"/>
+              <a:t>: Below-average frequency, average monetary spend </a:t>
+            </a:r>
+            <a:r>
+              <a:rPr lang="en-GB" sz="1500" i="1" dirty="0"/>
+              <a:t>and high recency.</a:t>
+            </a:r>
+          </a:p>
+          <a:p>
+            <a:pPr marL="285750" indent="-285750">
+              <a:buFont typeface="Arial" panose="020B0604020202020204" pitchFamily="34" charset="0"/>
+              <a:buChar char="•"/>
+            </a:pPr>
+            <a:r>
+              <a:rPr lang="en-GB" sz="1500" b="1" dirty="0"/>
+              <a:t>4: </a:t>
+            </a:r>
+            <a:r>
+              <a:rPr lang="en-GB" sz="1500" dirty="0"/>
+              <a:t>Below average frequency, average monetary spend </a:t>
+            </a:r>
+            <a:r>
+              <a:rPr lang="en-GB" sz="1500" i="1" dirty="0"/>
+              <a:t>but low recency.</a:t>
+            </a:r>
+            <a:endParaRPr lang="en-GB" sz="1500" b="1" i="1" dirty="0"/>
+          </a:p>
+          <a:p>
+            <a:endParaRPr lang="en-GB" sz="1500" dirty="0"/>
+          </a:p>
+          <a:p>
+            <a:r>
+              <a:rPr lang="en-GB" sz="1500" dirty="0"/>
+              <a:t>Minor clusters are quite similar apart from the fact that they differ on how recently they have made transactions.</a:t>
+            </a:r>
+          </a:p>
+        </p:txBody>
+      </p:sp>
+      <p:pic>
+        <p:nvPicPr>
+          <p:cNvPr id="10" name="Picture 9">
+            <a:extLst>
+              <a:ext uri="{FF2B5EF4-FFF2-40B4-BE49-F238E27FC236}">
+                <a16:creationId xmlns:a16="http://schemas.microsoft.com/office/drawing/2014/main" id="{BD4E3860-5280-76E2-AE40-CD81F35F5DED}"/>
+              </a:ext>
+            </a:extLst>
+          </p:cNvPr>
+          <p:cNvPicPr>
+            <a:picLocks noChangeAspect="1"/>
+          </p:cNvPicPr>
+          <p:nvPr/>
+        </p:nvPicPr>
+        <p:blipFill>
+          <a:blip r:embed="rId2"/>
+          <a:stretch>
+            <a:fillRect/>
+          </a:stretch>
+        </p:blipFill>
+        <p:spPr>
+          <a:xfrm>
+            <a:off x="322053" y="1084586"/>
             <a:ext cx="6210300" cy="4352925"/>
           </a:xfrm>
           <a:prstGeom prst="rect">
@@ -4334,7 +5348,7 @@
 </p:sld>
 </file>
 
-<file path=ppt/slides/slide5.xml><?xml version="1.0" encoding="utf-8"?>
+<file path=ppt/slides/slide8.xml><?xml version="1.0" encoding="utf-8"?>
 <p:sld xmlns:a="http://schemas.openxmlformats.org/drawingml/2006/main" xmlns:r="http://schemas.openxmlformats.org/officeDocument/2006/relationships" xmlns:p="http://schemas.openxmlformats.org/presentationml/2006/main">
   <p:cSld>
     <p:spTree>
@@ -4429,7 +5443,7 @@
 </p:sld>
 </file>
 
-<file path=ppt/slides/slide6.xml><?xml version="1.0" encoding="utf-8"?>
+<file path=ppt/slides/slide9.xml><?xml version="1.0" encoding="utf-8"?>
 <p:sld xmlns:a="http://schemas.openxmlformats.org/drawingml/2006/main" xmlns:r="http://schemas.openxmlformats.org/officeDocument/2006/relationships" xmlns:p="http://schemas.openxmlformats.org/presentationml/2006/main">
   <p:cSld>
     <p:spTree>
@@ -4461,7 +5475,7 @@
         <p:spPr>
           <a:xfrm>
             <a:off x="811763" y="317240"/>
-            <a:ext cx="4826514" cy="369332"/>
+            <a:ext cx="5945217" cy="369332"/>
           </a:xfrm>
           <a:prstGeom prst="rect">
             <a:avLst/>
@@ -4476,7 +5490,7 @@
           <a:p>
             <a:r>
               <a:rPr lang="en-GB" b="1" u="sng" dirty="0"/>
-              <a:t>Spending behaviours for each customer segment</a:t>
+              <a:t>Spending behaviours for each customer segment – 4 clusters</a:t>
             </a:r>
           </a:p>
         </p:txBody>
@@ -4820,23 +5834,6 @@
 </file>
 
 <file path=customXml/item1.xml><?xml version="1.0" encoding="utf-8"?>
-<p:properties xmlns:p="http://schemas.microsoft.com/office/2006/metadata/properties" xmlns:xsi="http://www.w3.org/2001/XMLSchema-instance" xmlns:pc="http://schemas.microsoft.com/office/infopath/2007/PartnerControls">
-  <documentManagement>
-    <_activity xmlns="d727c9a1-4cc8-4dae-b26f-3016540a6122" xsi:nil="true"/>
-  </documentManagement>
-</p:properties>
-</file>
-
-<file path=customXml/item2.xml><?xml version="1.0" encoding="utf-8"?>
-<?mso-contentType ?>
-<FormTemplates xmlns="http://schemas.microsoft.com/sharepoint/v3/contenttype/forms">
-  <Display>DocumentLibraryForm</Display>
-  <Edit>DocumentLibraryForm</Edit>
-  <New>DocumentLibraryForm</New>
-</FormTemplates>
-</file>
-
-<file path=customXml/item3.xml><?xml version="1.0" encoding="utf-8"?>
 <ct:contentTypeSchema xmlns:ct="http://schemas.microsoft.com/office/2006/metadata/contentType" xmlns:ma="http://schemas.microsoft.com/office/2006/metadata/properties/metaAttributes" ct:_="" ma:_="" ma:contentTypeName="Document" ma:contentTypeID="0x01010029DDE852DE9DAB4A97E6F8A357786F31" ma:contentTypeVersion="16" ma:contentTypeDescription="Create a new document." ma:contentTypeScope="" ma:versionID="edbe17029275bc321119e343b4a1c8ce">
   <xsd:schema xmlns:xsd="http://www.w3.org/2001/XMLSchema" xmlns:xs="http://www.w3.org/2001/XMLSchema" xmlns:p="http://schemas.microsoft.com/office/2006/metadata/properties" xmlns:ns3="d727c9a1-4cc8-4dae-b26f-3016540a6122" xmlns:ns4="4843f6d6-50bc-4979-bebb-2e9e902adf18" targetNamespace="http://schemas.microsoft.com/office/2006/metadata/properties" ma:root="true" ma:fieldsID="e65c90bde7c6b9821291a0ba3a2a0498" ns3:_="" ns4:_="">
     <xsd:import namespace="d727c9a1-4cc8-4dae-b26f-3016540a6122"/>
@@ -5077,32 +6074,24 @@
 </ct:contentTypeSchema>
 </file>
 
-<file path=customXml/itemProps1.xml><?xml version="1.0" encoding="utf-8"?>
-<ds:datastoreItem xmlns:ds="http://schemas.openxmlformats.org/officeDocument/2006/customXml" ds:itemID="{B5DE8817-F03C-49C7-8044-3B3F3F2BC66E}">
-  <ds:schemaRefs>
-    <ds:schemaRef ds:uri="d727c9a1-4cc8-4dae-b26f-3016540a6122"/>
-    <ds:schemaRef ds:uri="http://purl.org/dc/dcmitype/"/>
-    <ds:schemaRef ds:uri="http://purl.org/dc/elements/1.1/"/>
-    <ds:schemaRef ds:uri="http://schemas.microsoft.com/office/2006/metadata/properties"/>
-    <ds:schemaRef ds:uri="http://purl.org/dc/terms/"/>
-    <ds:schemaRef ds:uri="http://schemas.microsoft.com/office/2006/documentManagement/types"/>
-    <ds:schemaRef ds:uri="http://schemas.microsoft.com/office/infopath/2007/PartnerControls"/>
-    <ds:schemaRef ds:uri="http://schemas.openxmlformats.org/package/2006/metadata/core-properties"/>
-    <ds:schemaRef ds:uri="4843f6d6-50bc-4979-bebb-2e9e902adf18"/>
-    <ds:schemaRef ds:uri="http://www.w3.org/XML/1998/namespace"/>
-  </ds:schemaRefs>
-</ds:datastoreItem>
+<file path=customXml/item2.xml><?xml version="1.0" encoding="utf-8"?>
+<?mso-contentType ?>
+<FormTemplates xmlns="http://schemas.microsoft.com/sharepoint/v3/contenttype/forms">
+  <Display>DocumentLibraryForm</Display>
+  <Edit>DocumentLibraryForm</Edit>
+  <New>DocumentLibraryForm</New>
+</FormTemplates>
 </file>
 
-<file path=customXml/itemProps2.xml><?xml version="1.0" encoding="utf-8"?>
-<ds:datastoreItem xmlns:ds="http://schemas.openxmlformats.org/officeDocument/2006/customXml" ds:itemID="{43285F8E-73FA-4723-92C7-3AC049FD41DE}">
-  <ds:schemaRefs>
-    <ds:schemaRef ds:uri="http://schemas.microsoft.com/sharepoint/v3/contenttype/forms"/>
-  </ds:schemaRefs>
-</ds:datastoreItem>
+<file path=customXml/item3.xml><?xml version="1.0" encoding="utf-8"?>
+<p:properties xmlns:p="http://schemas.microsoft.com/office/2006/metadata/properties" xmlns:xsi="http://www.w3.org/2001/XMLSchema-instance" xmlns:pc="http://schemas.microsoft.com/office/infopath/2007/PartnerControls">
+  <documentManagement>
+    <_activity xmlns="d727c9a1-4cc8-4dae-b26f-3016540a6122" xsi:nil="true"/>
+  </documentManagement>
+</p:properties>
 </file>
 
-<file path=customXml/itemProps3.xml><?xml version="1.0" encoding="utf-8"?>
+<file path=customXml/itemProps1.xml><?xml version="1.0" encoding="utf-8"?>
 <ds:datastoreItem xmlns:ds="http://schemas.openxmlformats.org/officeDocument/2006/customXml" ds:itemID="{77F9B306-1F2F-4886-A740-26896DD4F80E}">
   <ds:schemaRefs>
     <ds:schemaRef ds:uri="http://schemas.microsoft.com/office/2006/metadata/contentType"/>
@@ -5119,4 +6108,29 @@
     <ds:schemaRef ds:uri="http://schemas.microsoft.com/internal/obd"/>
   </ds:schemaRefs>
 </ds:datastoreItem>
+</file>
+
+<file path=customXml/itemProps2.xml><?xml version="1.0" encoding="utf-8"?>
+<ds:datastoreItem xmlns:ds="http://schemas.openxmlformats.org/officeDocument/2006/customXml" ds:itemID="{43285F8E-73FA-4723-92C7-3AC049FD41DE}">
+  <ds:schemaRefs>
+    <ds:schemaRef ds:uri="http://schemas.microsoft.com/sharepoint/v3/contenttype/forms"/>
+  </ds:schemaRefs>
+</ds:datastoreItem>
+</file>
+
+<file path=customXml/itemProps3.xml><?xml version="1.0" encoding="utf-8"?>
+<ds:datastoreItem xmlns:ds="http://schemas.openxmlformats.org/officeDocument/2006/customXml" ds:itemID="{B5DE8817-F03C-49C7-8044-3B3F3F2BC66E}">
+  <ds:schemaRefs>
+    <ds:schemaRef ds:uri="d727c9a1-4cc8-4dae-b26f-3016540a6122"/>
+    <ds:schemaRef ds:uri="http://purl.org/dc/dcmitype/"/>
+    <ds:schemaRef ds:uri="http://purl.org/dc/elements/1.1/"/>
+    <ds:schemaRef ds:uri="http://schemas.microsoft.com/office/2006/metadata/properties"/>
+    <ds:schemaRef ds:uri="http://purl.org/dc/terms/"/>
+    <ds:schemaRef ds:uri="http://schemas.microsoft.com/office/2006/documentManagement/types"/>
+    <ds:schemaRef ds:uri="http://schemas.microsoft.com/office/infopath/2007/PartnerControls"/>
+    <ds:schemaRef ds:uri="http://schemas.openxmlformats.org/package/2006/metadata/core-properties"/>
+    <ds:schemaRef ds:uri="4843f6d6-50bc-4979-bebb-2e9e902adf18"/>
+    <ds:schemaRef ds:uri="http://www.w3.org/XML/1998/namespace"/>
+  </ds:schemaRefs>
+</ds:datastoreItem>
 </file>
</xml_diff>

<commit_message>
Created features representing average spend per merchant category for each account id/individual
</commit_message>
<xml_diff>
--- a/RFM Analysis of Results.pptx
+++ b/RFM Analysis of Results.pptx
@@ -124,7 +124,7 @@
 <file path=ppt/revisionInfo.xml><?xml version="1.0" encoding="utf-8"?>
 <p1510:revInfo xmlns:a="http://schemas.openxmlformats.org/drawingml/2006/main" xmlns:r="http://schemas.openxmlformats.org/officeDocument/2006/relationships" xmlns:p1510="http://schemas.microsoft.com/office/powerpoint/2015/10/main">
   <p1510:revLst>
-    <p1510:client id="{ECD254F5-8452-483E-B5C3-D5A628E50987}" v="3" dt="2024-02-22T13:16:58.435"/>
+    <p1510:client id="{ECD254F5-8452-483E-B5C3-D5A628E50987}" v="6" dt="2024-02-22T17:19:26.087"/>
   </p1510:revLst>
 </p1510:revInfo>
 </file>
@@ -134,18 +134,18 @@
   <pc:docChgLst>
     <pc:chgData name="Don Joseph" userId="01aadf7fde9797fb" providerId="LiveId" clId="{ECD254F5-8452-483E-B5C3-D5A628E50987}"/>
     <pc:docChg chg="undo custSel addSld delSld modSld sldOrd">
-      <pc:chgData name="Don Joseph" userId="01aadf7fde9797fb" providerId="LiveId" clId="{ECD254F5-8452-483E-B5C3-D5A628E50987}" dt="2024-02-22T13:40:38.155" v="1292" actId="20577"/>
+      <pc:chgData name="Don Joseph" userId="01aadf7fde9797fb" providerId="LiveId" clId="{ECD254F5-8452-483E-B5C3-D5A628E50987}" dt="2024-02-22T17:20:53.471" v="1631" actId="1076"/>
       <pc:docMkLst>
         <pc:docMk/>
       </pc:docMkLst>
       <pc:sldChg chg="addSp modSp mod">
-        <pc:chgData name="Don Joseph" userId="01aadf7fde9797fb" providerId="LiveId" clId="{ECD254F5-8452-483E-B5C3-D5A628E50987}" dt="2024-02-22T13:15:51.691" v="132" actId="20577"/>
+        <pc:chgData name="Don Joseph" userId="01aadf7fde9797fb" providerId="LiveId" clId="{ECD254F5-8452-483E-B5C3-D5A628E50987}" dt="2024-02-22T17:18:20.881" v="1429" actId="20577"/>
         <pc:sldMkLst>
           <pc:docMk/>
           <pc:sldMk cId="2247572789" sldId="256"/>
         </pc:sldMkLst>
         <pc:spChg chg="add mod">
-          <ac:chgData name="Don Joseph" userId="01aadf7fde9797fb" providerId="LiveId" clId="{ECD254F5-8452-483E-B5C3-D5A628E50987}" dt="2024-02-22T12:05:32.961" v="10" actId="1582"/>
+          <ac:chgData name="Don Joseph" userId="01aadf7fde9797fb" providerId="LiveId" clId="{ECD254F5-8452-483E-B5C3-D5A628E50987}" dt="2024-02-22T17:16:46.682" v="1293" actId="164"/>
           <ac:spMkLst>
             <pc:docMk/>
             <pc:sldMk cId="2247572789" sldId="256"/>
@@ -153,7 +153,7 @@
           </ac:spMkLst>
         </pc:spChg>
         <pc:spChg chg="add mod">
-          <ac:chgData name="Don Joseph" userId="01aadf7fde9797fb" providerId="LiveId" clId="{ECD254F5-8452-483E-B5C3-D5A628E50987}" dt="2024-02-22T12:05:45.200" v="16" actId="1076"/>
+          <ac:chgData name="Don Joseph" userId="01aadf7fde9797fb" providerId="LiveId" clId="{ECD254F5-8452-483E-B5C3-D5A628E50987}" dt="2024-02-22T17:16:46.682" v="1293" actId="164"/>
           <ac:spMkLst>
             <pc:docMk/>
             <pc:sldMk cId="2247572789" sldId="256"/>
@@ -161,7 +161,7 @@
           </ac:spMkLst>
         </pc:spChg>
         <pc:spChg chg="add mod">
-          <ac:chgData name="Don Joseph" userId="01aadf7fde9797fb" providerId="LiveId" clId="{ECD254F5-8452-483E-B5C3-D5A628E50987}" dt="2024-02-22T12:05:41.886" v="15" actId="1076"/>
+          <ac:chgData name="Don Joseph" userId="01aadf7fde9797fb" providerId="LiveId" clId="{ECD254F5-8452-483E-B5C3-D5A628E50987}" dt="2024-02-22T17:16:46.682" v="1293" actId="164"/>
           <ac:spMkLst>
             <pc:docMk/>
             <pc:sldMk cId="2247572789" sldId="256"/>
@@ -176,8 +176,24 @@
             <ac:spMk id="6" creationId="{82399533-CF94-A139-F2FC-278F96C80036}"/>
           </ac:spMkLst>
         </pc:spChg>
+        <pc:spChg chg="add mod">
+          <ac:chgData name="Don Joseph" userId="01aadf7fde9797fb" providerId="LiveId" clId="{ECD254F5-8452-483E-B5C3-D5A628E50987}" dt="2024-02-22T17:18:20.881" v="1429" actId="20577"/>
+          <ac:spMkLst>
+            <pc:docMk/>
+            <pc:sldMk cId="2247572789" sldId="256"/>
+            <ac:spMk id="7" creationId="{91207C77-A6BD-DDA8-F8D8-74BC85FC8093}"/>
+          </ac:spMkLst>
+        </pc:spChg>
+        <pc:grpChg chg="add mod">
+          <ac:chgData name="Don Joseph" userId="01aadf7fde9797fb" providerId="LiveId" clId="{ECD254F5-8452-483E-B5C3-D5A628E50987}" dt="2024-02-22T17:16:53.021" v="1297" actId="1076"/>
+          <ac:grpSpMkLst>
+            <pc:docMk/>
+            <pc:sldMk cId="2247572789" sldId="256"/>
+            <ac:grpSpMk id="5" creationId="{47791A88-5136-7B99-AF8D-7B7163E3FA3A}"/>
+          </ac:grpSpMkLst>
+        </pc:grpChg>
         <pc:picChg chg="mod">
-          <ac:chgData name="Don Joseph" userId="01aadf7fde9797fb" providerId="LiveId" clId="{ECD254F5-8452-483E-B5C3-D5A628E50987}" dt="2024-02-22T12:05:37.540" v="14" actId="1076"/>
+          <ac:chgData name="Don Joseph" userId="01aadf7fde9797fb" providerId="LiveId" clId="{ECD254F5-8452-483E-B5C3-D5A628E50987}" dt="2024-02-22T17:16:46.682" v="1293" actId="164"/>
           <ac:picMkLst>
             <pc:docMk/>
             <pc:sldMk cId="2247572789" sldId="256"/>
@@ -286,7 +302,7 @@
         </pc:sldMkLst>
       </pc:sldChg>
       <pc:sldChg chg="addSp delSp modSp add mod">
-        <pc:chgData name="Don Joseph" userId="01aadf7fde9797fb" providerId="LiveId" clId="{ECD254F5-8452-483E-B5C3-D5A628E50987}" dt="2024-02-22T13:16:43.668" v="166" actId="1076"/>
+        <pc:chgData name="Don Joseph" userId="01aadf7fde9797fb" providerId="LiveId" clId="{ECD254F5-8452-483E-B5C3-D5A628E50987}" dt="2024-02-22T17:20:27.427" v="1627" actId="20577"/>
         <pc:sldMkLst>
           <pc:docMk/>
           <pc:sldMk cId="1305278635" sldId="262"/>
@@ -297,6 +313,14 @@
             <pc:docMk/>
             <pc:sldMk cId="1305278635" sldId="262"/>
             <ac:spMk id="2" creationId="{A7386B6C-1E10-3F7C-A9F9-45B24322CC6C}"/>
+          </ac:spMkLst>
+        </pc:spChg>
+        <pc:spChg chg="add mod">
+          <ac:chgData name="Don Joseph" userId="01aadf7fde9797fb" providerId="LiveId" clId="{ECD254F5-8452-483E-B5C3-D5A628E50987}" dt="2024-02-22T17:20:27.427" v="1627" actId="20577"/>
+          <ac:spMkLst>
+            <pc:docMk/>
+            <pc:sldMk cId="1305278635" sldId="262"/>
+            <ac:spMk id="2" creationId="{D20C6C1B-3F2A-A938-F512-0ADD2B878896}"/>
           </ac:spMkLst>
         </pc:spChg>
         <pc:spChg chg="del">
@@ -324,7 +348,7 @@
           </ac:spMkLst>
         </pc:spChg>
         <pc:picChg chg="add mod">
-          <ac:chgData name="Don Joseph" userId="01aadf7fde9797fb" providerId="LiveId" clId="{ECD254F5-8452-483E-B5C3-D5A628E50987}" dt="2024-02-22T13:16:43.668" v="166" actId="1076"/>
+          <ac:chgData name="Don Joseph" userId="01aadf7fde9797fb" providerId="LiveId" clId="{ECD254F5-8452-483E-B5C3-D5A628E50987}" dt="2024-02-22T17:19:21.348" v="1430" actId="1076"/>
           <ac:picMkLst>
             <pc:docMk/>
             <pc:sldMk cId="1305278635" sldId="262"/>
@@ -388,7 +412,7 @@
         </pc:picChg>
       </pc:sldChg>
       <pc:sldChg chg="addSp delSp modSp add mod">
-        <pc:chgData name="Don Joseph" userId="01aadf7fde9797fb" providerId="LiveId" clId="{ECD254F5-8452-483E-B5C3-D5A628E50987}" dt="2024-02-22T13:39:42.383" v="1250" actId="20577"/>
+        <pc:chgData name="Don Joseph" userId="01aadf7fde9797fb" providerId="LiveId" clId="{ECD254F5-8452-483E-B5C3-D5A628E50987}" dt="2024-02-22T17:20:53.471" v="1631" actId="1076"/>
         <pc:sldMkLst>
           <pc:docMk/>
           <pc:sldMk cId="4220258668" sldId="264"/>
@@ -402,7 +426,7 @@
           </ac:spMkLst>
         </pc:spChg>
         <pc:picChg chg="add mod">
-          <ac:chgData name="Don Joseph" userId="01aadf7fde9797fb" providerId="LiveId" clId="{ECD254F5-8452-483E-B5C3-D5A628E50987}" dt="2024-02-22T13:39:15.848" v="1184" actId="1076"/>
+          <ac:chgData name="Don Joseph" userId="01aadf7fde9797fb" providerId="LiveId" clId="{ECD254F5-8452-483E-B5C3-D5A628E50987}" dt="2024-02-22T17:20:53.471" v="1631" actId="1076"/>
           <ac:picMkLst>
             <pc:docMk/>
             <pc:sldMk cId="4220258668" sldId="264"/>
@@ -3944,189 +3968,334 @@
           </a:p>
         </p:txBody>
       </p:sp>
-      <p:pic>
-        <p:nvPicPr>
-          <p:cNvPr id="8" name="Picture 7">
-            <a:extLst>
-              <a:ext uri="{FF2B5EF4-FFF2-40B4-BE49-F238E27FC236}">
-                <a16:creationId xmlns:a16="http://schemas.microsoft.com/office/drawing/2014/main" id="{A0E479A2-DF16-BE5E-9899-9F7D4EA56A9D}"/>
-              </a:ext>
-            </a:extLst>
-          </p:cNvPr>
-          <p:cNvPicPr>
-            <a:picLocks noChangeAspect="1"/>
-          </p:cNvPicPr>
+      <p:grpSp>
+        <p:nvGrpSpPr>
+          <p:cNvPr id="5" name="Group 4">
+            <a:extLst>
+              <a:ext uri="{FF2B5EF4-FFF2-40B4-BE49-F238E27FC236}">
+                <a16:creationId xmlns:a16="http://schemas.microsoft.com/office/drawing/2014/main" id="{47791A88-5136-7B99-AF8D-7B7163E3FA3A}"/>
+              </a:ext>
+            </a:extLst>
+          </p:cNvPr>
+          <p:cNvGrpSpPr/>
           <p:nvPr/>
-        </p:nvPicPr>
-        <p:blipFill>
-          <a:blip r:embed="rId2"/>
-          <a:stretch>
-            <a:fillRect/>
-          </a:stretch>
-        </p:blipFill>
+        </p:nvGrpSpPr>
+        <p:grpSpPr>
+          <a:xfrm>
+            <a:off x="634364" y="1271588"/>
+            <a:ext cx="5654470" cy="4494732"/>
+            <a:chOff x="2845718" y="1262257"/>
+            <a:chExt cx="6519765" cy="5057283"/>
+          </a:xfrm>
+        </p:grpSpPr>
+        <p:pic>
+          <p:nvPicPr>
+            <p:cNvPr id="8" name="Picture 7">
+              <a:extLst>
+                <a:ext uri="{FF2B5EF4-FFF2-40B4-BE49-F238E27FC236}">
+                  <a16:creationId xmlns:a16="http://schemas.microsoft.com/office/drawing/2014/main" id="{A0E479A2-DF16-BE5E-9899-9F7D4EA56A9D}"/>
+                </a:ext>
+              </a:extLst>
+            </p:cNvPr>
+            <p:cNvPicPr>
+              <a:picLocks noChangeAspect="1"/>
+            </p:cNvPicPr>
+            <p:nvPr/>
+          </p:nvPicPr>
+          <p:blipFill>
+            <a:blip r:embed="rId2"/>
+            <a:stretch>
+              <a:fillRect/>
+            </a:stretch>
+          </p:blipFill>
+          <p:spPr>
+            <a:xfrm>
+              <a:off x="2845718" y="1262257"/>
+              <a:ext cx="6519765" cy="5057283"/>
+            </a:xfrm>
+            <a:prstGeom prst="rect">
+              <a:avLst/>
+            </a:prstGeom>
+          </p:spPr>
+        </p:pic>
+        <p:sp>
+          <p:nvSpPr>
+            <p:cNvPr id="2" name="Oval 1">
+              <a:extLst>
+                <a:ext uri="{FF2B5EF4-FFF2-40B4-BE49-F238E27FC236}">
+                  <a16:creationId xmlns:a16="http://schemas.microsoft.com/office/drawing/2014/main" id="{A7386B6C-1E10-3F7C-A9F9-45B24322CC6C}"/>
+                </a:ext>
+              </a:extLst>
+            </p:cNvPr>
+            <p:cNvSpPr/>
+            <p:nvPr/>
+          </p:nvSpPr>
+          <p:spPr>
+            <a:xfrm>
+              <a:off x="4842588" y="4217437"/>
+              <a:ext cx="475861" cy="429208"/>
+            </a:xfrm>
+            <a:prstGeom prst="ellipse">
+              <a:avLst/>
+            </a:prstGeom>
+            <a:noFill/>
+            <a:ln w="28575">
+              <a:solidFill>
+                <a:srgbClr val="FF0000"/>
+              </a:solidFill>
+            </a:ln>
+          </p:spPr>
+          <p:style>
+            <a:lnRef idx="2">
+              <a:schemeClr val="accent1">
+                <a:shade val="15000"/>
+              </a:schemeClr>
+            </a:lnRef>
+            <a:fillRef idx="1">
+              <a:schemeClr val="accent1"/>
+            </a:fillRef>
+            <a:effectRef idx="0">
+              <a:schemeClr val="accent1"/>
+            </a:effectRef>
+            <a:fontRef idx="minor">
+              <a:schemeClr val="lt1"/>
+            </a:fontRef>
+          </p:style>
+          <p:txBody>
+            <a:bodyPr rtlCol="0" anchor="ctr"/>
+            <a:lstStyle/>
+            <a:p>
+              <a:pPr algn="ctr"/>
+              <a:endParaRPr lang="en-GB"/>
+            </a:p>
+          </p:txBody>
+        </p:sp>
+        <p:sp>
+          <p:nvSpPr>
+            <p:cNvPr id="3" name="Oval 2">
+              <a:extLst>
+                <a:ext uri="{FF2B5EF4-FFF2-40B4-BE49-F238E27FC236}">
+                  <a16:creationId xmlns:a16="http://schemas.microsoft.com/office/drawing/2014/main" id="{1630F132-533A-296F-57E4-6D2FE3233471}"/>
+                </a:ext>
+              </a:extLst>
+            </p:cNvPr>
+            <p:cNvSpPr/>
+            <p:nvPr/>
+          </p:nvSpPr>
+          <p:spPr>
+            <a:xfrm>
+              <a:off x="5405535" y="4584441"/>
+              <a:ext cx="475861" cy="429208"/>
+            </a:xfrm>
+            <a:prstGeom prst="ellipse">
+              <a:avLst/>
+            </a:prstGeom>
+            <a:noFill/>
+            <a:ln w="28575">
+              <a:solidFill>
+                <a:srgbClr val="FF0000"/>
+              </a:solidFill>
+            </a:ln>
+          </p:spPr>
+          <p:style>
+            <a:lnRef idx="2">
+              <a:schemeClr val="accent1">
+                <a:shade val="15000"/>
+              </a:schemeClr>
+            </a:lnRef>
+            <a:fillRef idx="1">
+              <a:schemeClr val="accent1"/>
+            </a:fillRef>
+            <a:effectRef idx="0">
+              <a:schemeClr val="accent1"/>
+            </a:effectRef>
+            <a:fontRef idx="minor">
+              <a:schemeClr val="lt1"/>
+            </a:fontRef>
+          </p:style>
+          <p:txBody>
+            <a:bodyPr rtlCol="0" anchor="ctr"/>
+            <a:lstStyle/>
+            <a:p>
+              <a:pPr algn="ctr"/>
+              <a:endParaRPr lang="en-GB"/>
+            </a:p>
+          </p:txBody>
+        </p:sp>
+        <p:sp>
+          <p:nvSpPr>
+            <p:cNvPr id="4" name="Oval 3">
+              <a:extLst>
+                <a:ext uri="{FF2B5EF4-FFF2-40B4-BE49-F238E27FC236}">
+                  <a16:creationId xmlns:a16="http://schemas.microsoft.com/office/drawing/2014/main" id="{039FC588-B5CC-92C0-1A00-D5C6432E0900}"/>
+                </a:ext>
+              </a:extLst>
+            </p:cNvPr>
+            <p:cNvSpPr/>
+            <p:nvPr/>
+          </p:nvSpPr>
+          <p:spPr>
+            <a:xfrm>
+              <a:off x="5968481" y="4799045"/>
+              <a:ext cx="475861" cy="429208"/>
+            </a:xfrm>
+            <a:prstGeom prst="ellipse">
+              <a:avLst/>
+            </a:prstGeom>
+            <a:noFill/>
+            <a:ln w="28575">
+              <a:solidFill>
+                <a:srgbClr val="FF0000"/>
+              </a:solidFill>
+            </a:ln>
+          </p:spPr>
+          <p:style>
+            <a:lnRef idx="2">
+              <a:schemeClr val="accent1">
+                <a:shade val="15000"/>
+              </a:schemeClr>
+            </a:lnRef>
+            <a:fillRef idx="1">
+              <a:schemeClr val="accent1"/>
+            </a:fillRef>
+            <a:effectRef idx="0">
+              <a:schemeClr val="accent1"/>
+            </a:effectRef>
+            <a:fontRef idx="minor">
+              <a:schemeClr val="lt1"/>
+            </a:fontRef>
+          </p:style>
+          <p:txBody>
+            <a:bodyPr rtlCol="0" anchor="ctr"/>
+            <a:lstStyle/>
+            <a:p>
+              <a:pPr algn="ctr"/>
+              <a:endParaRPr lang="en-GB"/>
+            </a:p>
+          </p:txBody>
+        </p:sp>
+      </p:grpSp>
+      <p:sp>
+        <p:nvSpPr>
+          <p:cNvPr id="7" name="TextBox 6">
+            <a:extLst>
+              <a:ext uri="{FF2B5EF4-FFF2-40B4-BE49-F238E27FC236}">
+                <a16:creationId xmlns:a16="http://schemas.microsoft.com/office/drawing/2014/main" id="{91207C77-A6BD-DDA8-F8D8-74BC85FC8093}"/>
+              </a:ext>
+            </a:extLst>
+          </p:cNvPr>
+          <p:cNvSpPr txBox="1"/>
+          <p:nvPr/>
+        </p:nvSpPr>
         <p:spPr>
           <a:xfrm>
-            <a:off x="2845718" y="1262257"/>
-            <a:ext cx="6519765" cy="5057283"/>
+            <a:off x="7100596" y="1352939"/>
+            <a:ext cx="4618653" cy="1938992"/>
           </a:xfrm>
           <a:prstGeom prst="rect">
             <a:avLst/>
           </a:prstGeom>
+          <a:noFill/>
         </p:spPr>
-      </p:pic>
-      <p:sp>
-        <p:nvSpPr>
-          <p:cNvPr id="2" name="Oval 1">
-            <a:extLst>
-              <a:ext uri="{FF2B5EF4-FFF2-40B4-BE49-F238E27FC236}">
-                <a16:creationId xmlns:a16="http://schemas.microsoft.com/office/drawing/2014/main" id="{A7386B6C-1E10-3F7C-A9F9-45B24322CC6C}"/>
-              </a:ext>
-            </a:extLst>
-          </p:cNvPr>
-          <p:cNvSpPr/>
-          <p:nvPr/>
-        </p:nvSpPr>
-        <p:spPr>
-          <a:xfrm>
-            <a:off x="4842588" y="4217437"/>
-            <a:ext cx="475861" cy="429208"/>
-          </a:xfrm>
-          <a:prstGeom prst="ellipse">
-            <a:avLst/>
-          </a:prstGeom>
-          <a:noFill/>
-          <a:ln w="28575">
-            <a:solidFill>
-              <a:srgbClr val="FF0000"/>
-            </a:solidFill>
-          </a:ln>
-        </p:spPr>
-        <p:style>
-          <a:lnRef idx="2">
-            <a:schemeClr val="accent1">
-              <a:shade val="15000"/>
-            </a:schemeClr>
-          </a:lnRef>
-          <a:fillRef idx="1">
-            <a:schemeClr val="accent1"/>
-          </a:fillRef>
-          <a:effectRef idx="0">
-            <a:schemeClr val="accent1"/>
-          </a:effectRef>
-          <a:fontRef idx="minor">
-            <a:schemeClr val="lt1"/>
-          </a:fontRef>
-        </p:style>
-        <p:txBody>
-          <a:bodyPr rtlCol="0" anchor="ctr"/>
-          <a:lstStyle/>
-          <a:p>
-            <a:pPr algn="ctr"/>
-            <a:endParaRPr lang="en-GB"/>
-          </a:p>
-        </p:txBody>
-      </p:sp>
-      <p:sp>
-        <p:nvSpPr>
-          <p:cNvPr id="3" name="Oval 2">
-            <a:extLst>
-              <a:ext uri="{FF2B5EF4-FFF2-40B4-BE49-F238E27FC236}">
-                <a16:creationId xmlns:a16="http://schemas.microsoft.com/office/drawing/2014/main" id="{1630F132-533A-296F-57E4-6D2FE3233471}"/>
-              </a:ext>
-            </a:extLst>
-          </p:cNvPr>
-          <p:cNvSpPr/>
-          <p:nvPr/>
-        </p:nvSpPr>
-        <p:spPr>
-          <a:xfrm>
-            <a:off x="5405535" y="4584441"/>
-            <a:ext cx="475861" cy="429208"/>
-          </a:xfrm>
-          <a:prstGeom prst="ellipse">
-            <a:avLst/>
-          </a:prstGeom>
-          <a:noFill/>
-          <a:ln w="28575">
-            <a:solidFill>
-              <a:srgbClr val="FF0000"/>
-            </a:solidFill>
-          </a:ln>
-        </p:spPr>
-        <p:style>
-          <a:lnRef idx="2">
-            <a:schemeClr val="accent1">
-              <a:shade val="15000"/>
-            </a:schemeClr>
-          </a:lnRef>
-          <a:fillRef idx="1">
-            <a:schemeClr val="accent1"/>
-          </a:fillRef>
-          <a:effectRef idx="0">
-            <a:schemeClr val="accent1"/>
-          </a:effectRef>
-          <a:fontRef idx="minor">
-            <a:schemeClr val="lt1"/>
-          </a:fontRef>
-        </p:style>
-        <p:txBody>
-          <a:bodyPr rtlCol="0" anchor="ctr"/>
-          <a:lstStyle/>
-          <a:p>
-            <a:pPr algn="ctr"/>
-            <a:endParaRPr lang="en-GB"/>
-          </a:p>
-        </p:txBody>
-      </p:sp>
-      <p:sp>
-        <p:nvSpPr>
-          <p:cNvPr id="4" name="Oval 3">
-            <a:extLst>
-              <a:ext uri="{FF2B5EF4-FFF2-40B4-BE49-F238E27FC236}">
-                <a16:creationId xmlns:a16="http://schemas.microsoft.com/office/drawing/2014/main" id="{039FC588-B5CC-92C0-1A00-D5C6432E0900}"/>
-              </a:ext>
-            </a:extLst>
-          </p:cNvPr>
-          <p:cNvSpPr/>
-          <p:nvPr/>
-        </p:nvSpPr>
-        <p:spPr>
-          <a:xfrm>
-            <a:off x="5968481" y="4799045"/>
-            <a:ext cx="475861" cy="429208"/>
-          </a:xfrm>
-          <a:prstGeom prst="ellipse">
-            <a:avLst/>
-          </a:prstGeom>
-          <a:noFill/>
-          <a:ln w="28575">
-            <a:solidFill>
-              <a:srgbClr val="FF0000"/>
-            </a:solidFill>
-          </a:ln>
-        </p:spPr>
-        <p:style>
-          <a:lnRef idx="2">
-            <a:schemeClr val="accent1">
-              <a:shade val="15000"/>
-            </a:schemeClr>
-          </a:lnRef>
-          <a:fillRef idx="1">
-            <a:schemeClr val="accent1"/>
-          </a:fillRef>
-          <a:effectRef idx="0">
-            <a:schemeClr val="accent1"/>
-          </a:effectRef>
-          <a:fontRef idx="minor">
-            <a:schemeClr val="lt1"/>
-          </a:fontRef>
-        </p:style>
-        <p:txBody>
-          <a:bodyPr rtlCol="0" anchor="ctr"/>
-          <a:lstStyle/>
-          <a:p>
-            <a:pPr algn="ctr"/>
-            <a:endParaRPr lang="en-GB"/>
+        <p:txBody>
+          <a:bodyPr wrap="square" rtlCol="0">
+            <a:spAutoFit/>
+          </a:bodyPr>
+          <a:lstStyle/>
+          <a:p>
+            <a:pPr marL="285750" indent="-285750">
+              <a:buFont typeface="Arial" panose="020B0604020202020204" pitchFamily="34" charset="0"/>
+              <a:buChar char="•"/>
+            </a:pPr>
+            <a:r>
+              <a:rPr lang="en-GB" sz="1500" i="0" dirty="0">
+                <a:solidFill>
+                  <a:srgbClr val="000000"/>
+                </a:solidFill>
+                <a:effectLst/>
+                <a:latin typeface="Arial" panose="020B0604020202020204" pitchFamily="34" charset="0"/>
+                <a:cs typeface="Arial" panose="020B0604020202020204" pitchFamily="34" charset="0"/>
+              </a:rPr>
+              <a:t>Optimal clusters are at the point in which the knee "bends" or in </a:t>
+            </a:r>
+            <a:r>
+              <a:rPr lang="en-GB" sz="1500" i="0" dirty="0" err="1">
+                <a:solidFill>
+                  <a:srgbClr val="000000"/>
+                </a:solidFill>
+                <a:effectLst/>
+                <a:latin typeface="Arial" panose="020B0604020202020204" pitchFamily="34" charset="0"/>
+                <a:cs typeface="Arial" panose="020B0604020202020204" pitchFamily="34" charset="0"/>
+              </a:rPr>
+              <a:t>mathemetical</a:t>
+            </a:r>
+            <a:r>
+              <a:rPr lang="en-GB" sz="1500" i="0" dirty="0">
+                <a:solidFill>
+                  <a:srgbClr val="000000"/>
+                </a:solidFill>
+                <a:effectLst/>
+                <a:latin typeface="Arial" panose="020B0604020202020204" pitchFamily="34" charset="0"/>
+                <a:cs typeface="Arial" panose="020B0604020202020204" pitchFamily="34" charset="0"/>
+              </a:rPr>
+              <a:t> terms when the marginal total within sum of squares ("</a:t>
+            </a:r>
+            <a:r>
+              <a:rPr lang="en-GB" sz="1500" i="0" dirty="0" err="1">
+                <a:solidFill>
+                  <a:srgbClr val="000000"/>
+                </a:solidFill>
+                <a:effectLst/>
+                <a:latin typeface="Arial" panose="020B0604020202020204" pitchFamily="34" charset="0"/>
+                <a:cs typeface="Arial" panose="020B0604020202020204" pitchFamily="34" charset="0"/>
+              </a:rPr>
+              <a:t>wss</a:t>
+            </a:r>
+            <a:r>
+              <a:rPr lang="en-GB" sz="1500" i="0" dirty="0">
+                <a:solidFill>
+                  <a:srgbClr val="000000"/>
+                </a:solidFill>
+                <a:effectLst/>
+                <a:latin typeface="Arial" panose="020B0604020202020204" pitchFamily="34" charset="0"/>
+                <a:cs typeface="Arial" panose="020B0604020202020204" pitchFamily="34" charset="0"/>
+              </a:rPr>
+              <a:t>") for an additional cluster begins to decrease at a linear rate.</a:t>
+            </a:r>
+          </a:p>
+          <a:p>
+            <a:pPr marL="285750" indent="-285750">
+              <a:buFont typeface="Arial" panose="020B0604020202020204" pitchFamily="34" charset="0"/>
+              <a:buChar char="•"/>
+            </a:pPr>
+            <a:endParaRPr lang="en-GB" sz="1500" i="0" dirty="0">
+              <a:solidFill>
+                <a:srgbClr val="000000"/>
+              </a:solidFill>
+              <a:effectLst/>
+              <a:latin typeface="Arial" panose="020B0604020202020204" pitchFamily="34" charset="0"/>
+              <a:cs typeface="Arial" panose="020B0604020202020204" pitchFamily="34" charset="0"/>
+            </a:endParaRPr>
+          </a:p>
+          <a:p>
+            <a:pPr marL="285750" indent="-285750">
+              <a:buFont typeface="Arial" panose="020B0604020202020204" pitchFamily="34" charset="0"/>
+              <a:buChar char="•"/>
+            </a:pPr>
+            <a:r>
+              <a:rPr lang="en-GB" sz="1500" dirty="0">
+                <a:solidFill>
+                  <a:srgbClr val="000000"/>
+                </a:solidFill>
+                <a:latin typeface="Arial" panose="020B0604020202020204" pitchFamily="34" charset="0"/>
+                <a:cs typeface="Arial" panose="020B0604020202020204" pitchFamily="34" charset="0"/>
+              </a:rPr>
+              <a:t>Probably not 3 clusters, but after 4-5 clusters the inertias do seem to decrease linearly.</a:t>
+            </a:r>
+            <a:endParaRPr lang="en-GB" sz="1500" dirty="0">
+              <a:latin typeface="Arial" panose="020B0604020202020204" pitchFamily="34" charset="0"/>
+              <a:cs typeface="Arial" panose="020B0604020202020204" pitchFamily="34" charset="0"/>
+            </a:endParaRPr>
           </a:p>
         </p:txBody>
       </p:sp>
@@ -4312,7 +4481,7 @@
         </p:blipFill>
         <p:spPr>
           <a:xfrm>
-            <a:off x="2782467" y="1355174"/>
+            <a:off x="655087" y="1140570"/>
             <a:ext cx="6380194" cy="4958756"/>
           </a:xfrm>
           <a:prstGeom prst="rect">
@@ -4320,6 +4489,86 @@
           </a:prstGeom>
         </p:spPr>
       </p:pic>
+      <p:sp>
+        <p:nvSpPr>
+          <p:cNvPr id="2" name="TextBox 1">
+            <a:extLst>
+              <a:ext uri="{FF2B5EF4-FFF2-40B4-BE49-F238E27FC236}">
+                <a16:creationId xmlns:a16="http://schemas.microsoft.com/office/drawing/2014/main" id="{D20C6C1B-3F2A-A938-F512-0ADD2B878896}"/>
+              </a:ext>
+            </a:extLst>
+          </p:cNvPr>
+          <p:cNvSpPr txBox="1"/>
+          <p:nvPr/>
+        </p:nvSpPr>
+        <p:spPr>
+          <a:xfrm>
+            <a:off x="7333863" y="1352939"/>
+            <a:ext cx="4432040" cy="1477328"/>
+          </a:xfrm>
+          <a:prstGeom prst="rect">
+            <a:avLst/>
+          </a:prstGeom>
+          <a:noFill/>
+        </p:spPr>
+        <p:txBody>
+          <a:bodyPr wrap="square" rtlCol="0">
+            <a:spAutoFit/>
+          </a:bodyPr>
+          <a:lstStyle/>
+          <a:p>
+            <a:pPr marL="285750" indent="-285750">
+              <a:buFont typeface="Arial" panose="020B0604020202020204" pitchFamily="34" charset="0"/>
+              <a:buChar char="•"/>
+            </a:pPr>
+            <a:r>
+              <a:rPr lang="en-GB" sz="1500" i="0" dirty="0">
+                <a:solidFill>
+                  <a:srgbClr val="000000"/>
+                </a:solidFill>
+                <a:effectLst/>
+                <a:latin typeface="Arial" panose="020B0604020202020204" pitchFamily="34" charset="0"/>
+                <a:cs typeface="Arial" panose="020B0604020202020204" pitchFamily="34" charset="0"/>
+              </a:rPr>
+              <a:t>Ratio of intra-cluster distances to inter-cluster distances.</a:t>
+            </a:r>
+          </a:p>
+          <a:p>
+            <a:pPr marL="285750" indent="-285750">
+              <a:buFont typeface="Arial" panose="020B0604020202020204" pitchFamily="34" charset="0"/>
+              <a:buChar char="•"/>
+            </a:pPr>
+            <a:endParaRPr lang="en-GB" sz="1500" i="0" dirty="0">
+              <a:solidFill>
+                <a:srgbClr val="000000"/>
+              </a:solidFill>
+              <a:effectLst/>
+              <a:latin typeface="Arial" panose="020B0604020202020204" pitchFamily="34" charset="0"/>
+              <a:cs typeface="Arial" panose="020B0604020202020204" pitchFamily="34" charset="0"/>
+            </a:endParaRPr>
+          </a:p>
+          <a:p>
+            <a:pPr marL="285750" indent="-285750">
+              <a:buFont typeface="Arial" panose="020B0604020202020204" pitchFamily="34" charset="0"/>
+              <a:buChar char="•"/>
+            </a:pPr>
+            <a:r>
+              <a:rPr lang="en-GB" sz="1500" dirty="0">
+                <a:solidFill>
+                  <a:srgbClr val="000000"/>
+                </a:solidFill>
+                <a:latin typeface="Arial" panose="020B0604020202020204" pitchFamily="34" charset="0"/>
+                <a:cs typeface="Arial" panose="020B0604020202020204" pitchFamily="34" charset="0"/>
+              </a:rPr>
+              <a:t>Silhouette indices closer to 1 indicate points are well-matched and similar to other points in the cluster.</a:t>
+            </a:r>
+            <a:endParaRPr lang="en-GB" sz="1500" dirty="0">
+              <a:latin typeface="Arial" panose="020B0604020202020204" pitchFamily="34" charset="0"/>
+              <a:cs typeface="Arial" panose="020B0604020202020204" pitchFamily="34" charset="0"/>
+            </a:endParaRPr>
+          </a:p>
+        </p:txBody>
+      </p:sp>
     </p:spTree>
     <p:extLst>
       <p:ext uri="{BB962C8B-B14F-4D97-AF65-F5344CB8AC3E}">
@@ -5041,8 +5290,8 @@
         </p:blipFill>
         <p:spPr>
           <a:xfrm>
-            <a:off x="322053" y="1934873"/>
-            <a:ext cx="6057900" cy="2105025"/>
+            <a:off x="322053" y="1953534"/>
+            <a:ext cx="6051151" cy="2102680"/>
           </a:xfrm>
           <a:prstGeom prst="rect">
             <a:avLst/>
@@ -5834,6 +6083,23 @@
 </file>
 
 <file path=customXml/item1.xml><?xml version="1.0" encoding="utf-8"?>
+<p:properties xmlns:p="http://schemas.microsoft.com/office/2006/metadata/properties" xmlns:xsi="http://www.w3.org/2001/XMLSchema-instance" xmlns:pc="http://schemas.microsoft.com/office/infopath/2007/PartnerControls">
+  <documentManagement>
+    <_activity xmlns="d727c9a1-4cc8-4dae-b26f-3016540a6122" xsi:nil="true"/>
+  </documentManagement>
+</p:properties>
+</file>
+
+<file path=customXml/item2.xml><?xml version="1.0" encoding="utf-8"?>
+<?mso-contentType ?>
+<FormTemplates xmlns="http://schemas.microsoft.com/sharepoint/v3/contenttype/forms">
+  <Display>DocumentLibraryForm</Display>
+  <Edit>DocumentLibraryForm</Edit>
+  <New>DocumentLibraryForm</New>
+</FormTemplates>
+</file>
+
+<file path=customXml/item3.xml><?xml version="1.0" encoding="utf-8"?>
 <ct:contentTypeSchema xmlns:ct="http://schemas.microsoft.com/office/2006/metadata/contentType" xmlns:ma="http://schemas.microsoft.com/office/2006/metadata/properties/metaAttributes" ct:_="" ma:_="" ma:contentTypeName="Document" ma:contentTypeID="0x01010029DDE852DE9DAB4A97E6F8A357786F31" ma:contentTypeVersion="16" ma:contentTypeDescription="Create a new document." ma:contentTypeScope="" ma:versionID="edbe17029275bc321119e343b4a1c8ce">
   <xsd:schema xmlns:xsd="http://www.w3.org/2001/XMLSchema" xmlns:xs="http://www.w3.org/2001/XMLSchema" xmlns:p="http://schemas.microsoft.com/office/2006/metadata/properties" xmlns:ns3="d727c9a1-4cc8-4dae-b26f-3016540a6122" xmlns:ns4="4843f6d6-50bc-4979-bebb-2e9e902adf18" targetNamespace="http://schemas.microsoft.com/office/2006/metadata/properties" ma:root="true" ma:fieldsID="e65c90bde7c6b9821291a0ba3a2a0498" ns3:_="" ns4:_="">
     <xsd:import namespace="d727c9a1-4cc8-4dae-b26f-3016540a6122"/>
@@ -6074,24 +6340,32 @@
 </ct:contentTypeSchema>
 </file>
 
-<file path=customXml/item2.xml><?xml version="1.0" encoding="utf-8"?>
-<?mso-contentType ?>
-<FormTemplates xmlns="http://schemas.microsoft.com/sharepoint/v3/contenttype/forms">
-  <Display>DocumentLibraryForm</Display>
-  <Edit>DocumentLibraryForm</Edit>
-  <New>DocumentLibraryForm</New>
-</FormTemplates>
+<file path=customXml/itemProps1.xml><?xml version="1.0" encoding="utf-8"?>
+<ds:datastoreItem xmlns:ds="http://schemas.openxmlformats.org/officeDocument/2006/customXml" ds:itemID="{B5DE8817-F03C-49C7-8044-3B3F3F2BC66E}">
+  <ds:schemaRefs>
+    <ds:schemaRef ds:uri="d727c9a1-4cc8-4dae-b26f-3016540a6122"/>
+    <ds:schemaRef ds:uri="http://purl.org/dc/dcmitype/"/>
+    <ds:schemaRef ds:uri="http://purl.org/dc/elements/1.1/"/>
+    <ds:schemaRef ds:uri="http://schemas.microsoft.com/office/2006/metadata/properties"/>
+    <ds:schemaRef ds:uri="http://purl.org/dc/terms/"/>
+    <ds:schemaRef ds:uri="http://schemas.microsoft.com/office/2006/documentManagement/types"/>
+    <ds:schemaRef ds:uri="http://schemas.microsoft.com/office/infopath/2007/PartnerControls"/>
+    <ds:schemaRef ds:uri="http://schemas.openxmlformats.org/package/2006/metadata/core-properties"/>
+    <ds:schemaRef ds:uri="4843f6d6-50bc-4979-bebb-2e9e902adf18"/>
+    <ds:schemaRef ds:uri="http://www.w3.org/XML/1998/namespace"/>
+  </ds:schemaRefs>
+</ds:datastoreItem>
 </file>
 
-<file path=customXml/item3.xml><?xml version="1.0" encoding="utf-8"?>
-<p:properties xmlns:p="http://schemas.microsoft.com/office/2006/metadata/properties" xmlns:xsi="http://www.w3.org/2001/XMLSchema-instance" xmlns:pc="http://schemas.microsoft.com/office/infopath/2007/PartnerControls">
-  <documentManagement>
-    <_activity xmlns="d727c9a1-4cc8-4dae-b26f-3016540a6122" xsi:nil="true"/>
-  </documentManagement>
-</p:properties>
+<file path=customXml/itemProps2.xml><?xml version="1.0" encoding="utf-8"?>
+<ds:datastoreItem xmlns:ds="http://schemas.openxmlformats.org/officeDocument/2006/customXml" ds:itemID="{43285F8E-73FA-4723-92C7-3AC049FD41DE}">
+  <ds:schemaRefs>
+    <ds:schemaRef ds:uri="http://schemas.microsoft.com/sharepoint/v3/contenttype/forms"/>
+  </ds:schemaRefs>
+</ds:datastoreItem>
 </file>
 
-<file path=customXml/itemProps1.xml><?xml version="1.0" encoding="utf-8"?>
+<file path=customXml/itemProps3.xml><?xml version="1.0" encoding="utf-8"?>
 <ds:datastoreItem xmlns:ds="http://schemas.openxmlformats.org/officeDocument/2006/customXml" ds:itemID="{77F9B306-1F2F-4886-A740-26896DD4F80E}">
   <ds:schemaRefs>
     <ds:schemaRef ds:uri="http://schemas.microsoft.com/office/2006/metadata/contentType"/>
@@ -6108,29 +6382,4 @@
     <ds:schemaRef ds:uri="http://schemas.microsoft.com/internal/obd"/>
   </ds:schemaRefs>
 </ds:datastoreItem>
-</file>
-
-<file path=customXml/itemProps2.xml><?xml version="1.0" encoding="utf-8"?>
-<ds:datastoreItem xmlns:ds="http://schemas.openxmlformats.org/officeDocument/2006/customXml" ds:itemID="{43285F8E-73FA-4723-92C7-3AC049FD41DE}">
-  <ds:schemaRefs>
-    <ds:schemaRef ds:uri="http://schemas.microsoft.com/sharepoint/v3/contenttype/forms"/>
-  </ds:schemaRefs>
-</ds:datastoreItem>
-</file>
-
-<file path=customXml/itemProps3.xml><?xml version="1.0" encoding="utf-8"?>
-<ds:datastoreItem xmlns:ds="http://schemas.openxmlformats.org/officeDocument/2006/customXml" ds:itemID="{B5DE8817-F03C-49C7-8044-3B3F3F2BC66E}">
-  <ds:schemaRefs>
-    <ds:schemaRef ds:uri="d727c9a1-4cc8-4dae-b26f-3016540a6122"/>
-    <ds:schemaRef ds:uri="http://purl.org/dc/dcmitype/"/>
-    <ds:schemaRef ds:uri="http://purl.org/dc/elements/1.1/"/>
-    <ds:schemaRef ds:uri="http://schemas.microsoft.com/office/2006/metadata/properties"/>
-    <ds:schemaRef ds:uri="http://purl.org/dc/terms/"/>
-    <ds:schemaRef ds:uri="http://schemas.microsoft.com/office/2006/documentManagement/types"/>
-    <ds:schemaRef ds:uri="http://schemas.microsoft.com/office/infopath/2007/PartnerControls"/>
-    <ds:schemaRef ds:uri="http://schemas.openxmlformats.org/package/2006/metadata/core-properties"/>
-    <ds:schemaRef ds:uri="4843f6d6-50bc-4979-bebb-2e9e902adf18"/>
-    <ds:schemaRef ds:uri="http://www.w3.org/XML/1998/namespace"/>
-  </ds:schemaRefs>
-</ds:datastoreItem>
 </file>
</xml_diff>

<commit_message>
Updated RFM analysis - choosing 3 clusters - and analysed spending behaviour within each cluster
</commit_message>
<xml_diff>
--- a/RFM Analysis of Results.pptx
+++ b/RFM Analysis of Results.pptx
@@ -10,11 +10,16 @@
     <p:sldId id="258" r:id="rId7"/>
     <p:sldId id="257" r:id="rId8"/>
     <p:sldId id="263" r:id="rId9"/>
-    <p:sldId id="264" r:id="rId10"/>
-    <p:sldId id="261" r:id="rId11"/>
-    <p:sldId id="259" r:id="rId12"/>
-    <p:sldId id="260" r:id="rId13"/>
-    <p:sldId id="265" r:id="rId14"/>
+    <p:sldId id="261" r:id="rId10"/>
+    <p:sldId id="264" r:id="rId11"/>
+    <p:sldId id="266" r:id="rId12"/>
+    <p:sldId id="265" r:id="rId13"/>
+    <p:sldId id="268" r:id="rId14"/>
+    <p:sldId id="269" r:id="rId15"/>
+    <p:sldId id="270" r:id="rId16"/>
+    <p:sldId id="271" r:id="rId17"/>
+    <p:sldId id="272" r:id="rId18"/>
+    <p:sldId id="267" r:id="rId19"/>
   </p:sldIdLst>
   <p:sldSz cx="12192000" cy="6858000"/>
   <p:notesSz cx="6858000" cy="9144000"/>
@@ -114,6 +119,37 @@
     </a:lvl9pPr>
   </p:defaultTextStyle>
   <p:extLst>
+    <p:ext uri="{521415D9-36F7-43E2-AB2F-B90AF26B5E84}">
+      <p14:sectionLst xmlns:p14="http://schemas.microsoft.com/office/powerpoint/2010/main">
+        <p14:section name="5 clusters" id="{7CB5C300-C290-4BC4-A901-5F320E98BFE7}">
+          <p14:sldIdLst>
+            <p14:sldId id="256"/>
+            <p14:sldId id="262"/>
+            <p14:sldId id="258"/>
+            <p14:sldId id="257"/>
+            <p14:sldId id="263"/>
+            <p14:sldId id="261"/>
+            <p14:sldId id="264"/>
+            <p14:sldId id="266"/>
+            <p14:sldId id="265"/>
+          </p14:sldIdLst>
+        </p14:section>
+        <p14:section name="3 clusters" id="{91317EAE-D4F3-4DD8-9DB6-0F4E5535313C}">
+          <p14:sldIdLst>
+            <p14:sldId id="268"/>
+            <p14:sldId id="269"/>
+            <p14:sldId id="270"/>
+            <p14:sldId id="271"/>
+            <p14:sldId id="272"/>
+          </p14:sldIdLst>
+        </p14:section>
+        <p14:section name="Improvements" id="{2DB75315-FECE-44B8-9574-D2150C63E351}">
+          <p14:sldIdLst>
+            <p14:sldId id="267"/>
+          </p14:sldIdLst>
+        </p14:section>
+      </p14:sectionLst>
+    </p:ext>
     <p:ext uri="{EFAFB233-063F-42B5-8137-9DF3F51BA10A}">
       <p15:sldGuideLst xmlns:p15="http://schemas.microsoft.com/office/powerpoint/2012/main"/>
     </p:ext>
@@ -124,7 +160,7 @@
 <file path=ppt/revisionInfo.xml><?xml version="1.0" encoding="utf-8"?>
 <p1510:revInfo xmlns:a="http://schemas.openxmlformats.org/drawingml/2006/main" xmlns:r="http://schemas.openxmlformats.org/officeDocument/2006/relationships" xmlns:p1510="http://schemas.microsoft.com/office/powerpoint/2015/10/main">
   <p1510:revLst>
-    <p1510:client id="{ECD254F5-8452-483E-B5C3-D5A628E50987}" v="6" dt="2024-02-22T17:19:26.087"/>
+    <p1510:client id="{6C27825B-9435-4AE8-87A0-124E92FD3AAA}" v="7" dt="2024-02-26T18:26:31.706"/>
   </p1510:revLst>
 </p1510:revInfo>
 </file>
@@ -470,6 +506,488 @@
             <pc:docMk/>
             <pc:sldMk cId="1135089603" sldId="265"/>
             <ac:picMk id="4" creationId="{5D1DCE3F-AE6E-9A79-D862-1E256A1F8657}"/>
+          </ac:picMkLst>
+        </pc:picChg>
+      </pc:sldChg>
+    </pc:docChg>
+  </pc:docChgLst>
+  <pc:docChgLst>
+    <pc:chgData name="Don Joseph" userId="01aadf7fde9797fb" providerId="LiveId" clId="{6C27825B-9435-4AE8-87A0-124E92FD3AAA}"/>
+    <pc:docChg chg="undo custSel addSld delSld modSld sldOrd addSection modSection">
+      <pc:chgData name="Don Joseph" userId="01aadf7fde9797fb" providerId="LiveId" clId="{6C27825B-9435-4AE8-87A0-124E92FD3AAA}" dt="2024-02-26T18:42:10.636" v="1428" actId="14100"/>
+      <pc:docMkLst>
+        <pc:docMk/>
+      </pc:docMkLst>
+      <pc:sldChg chg="addSp delSp modSp mod">
+        <pc:chgData name="Don Joseph" userId="01aadf7fde9797fb" providerId="LiveId" clId="{6C27825B-9435-4AE8-87A0-124E92FD3AAA}" dt="2024-02-26T15:30:59.213" v="1" actId="478"/>
+        <pc:sldMkLst>
+          <pc:docMk/>
+          <pc:sldMk cId="2247572789" sldId="256"/>
+        </pc:sldMkLst>
+        <pc:spChg chg="add del mod">
+          <ac:chgData name="Don Joseph" userId="01aadf7fde9797fb" providerId="LiveId" clId="{6C27825B-9435-4AE8-87A0-124E92FD3AAA}" dt="2024-02-26T15:30:59.213" v="1" actId="478"/>
+          <ac:spMkLst>
+            <pc:docMk/>
+            <pc:sldMk cId="2247572789" sldId="256"/>
+            <ac:spMk id="9" creationId="{F6573052-668C-16B6-4F78-4FF41B1A65CE}"/>
+          </ac:spMkLst>
+        </pc:spChg>
+      </pc:sldChg>
+      <pc:sldChg chg="del">
+        <pc:chgData name="Don Joseph" userId="01aadf7fde9797fb" providerId="LiveId" clId="{6C27825B-9435-4AE8-87A0-124E92FD3AAA}" dt="2024-02-26T17:02:17.513" v="1022" actId="2696"/>
+        <pc:sldMkLst>
+          <pc:docMk/>
+          <pc:sldMk cId="2806691247" sldId="259"/>
+        </pc:sldMkLst>
+      </pc:sldChg>
+      <pc:sldChg chg="del">
+        <pc:chgData name="Don Joseph" userId="01aadf7fde9797fb" providerId="LiveId" clId="{6C27825B-9435-4AE8-87A0-124E92FD3AAA}" dt="2024-02-26T17:02:27.148" v="1023" actId="2696"/>
+        <pc:sldMkLst>
+          <pc:docMk/>
+          <pc:sldMk cId="2041890761" sldId="260"/>
+        </pc:sldMkLst>
+      </pc:sldChg>
+      <pc:sldChg chg="addSp delSp modSp mod ord">
+        <pc:chgData name="Don Joseph" userId="01aadf7fde9797fb" providerId="LiveId" clId="{6C27825B-9435-4AE8-87A0-124E92FD3AAA}" dt="2024-02-26T18:28:41.128" v="1209" actId="478"/>
+        <pc:sldMkLst>
+          <pc:docMk/>
+          <pc:sldMk cId="3961428113" sldId="261"/>
+        </pc:sldMkLst>
+        <pc:spChg chg="mod">
+          <ac:chgData name="Don Joseph" userId="01aadf7fde9797fb" providerId="LiveId" clId="{6C27825B-9435-4AE8-87A0-124E92FD3AAA}" dt="2024-02-26T17:14:49.164" v="1080" actId="20577"/>
+          <ac:spMkLst>
+            <pc:docMk/>
+            <pc:sldMk cId="3961428113" sldId="261"/>
+            <ac:spMk id="2" creationId="{C0A6A4AE-127D-DFA1-612E-B4834CFE853F}"/>
+          </ac:spMkLst>
+        </pc:spChg>
+        <pc:picChg chg="add del mod">
+          <ac:chgData name="Don Joseph" userId="01aadf7fde9797fb" providerId="LiveId" clId="{6C27825B-9435-4AE8-87A0-124E92FD3AAA}" dt="2024-02-26T17:12:47.667" v="1033" actId="478"/>
+          <ac:picMkLst>
+            <pc:docMk/>
+            <pc:sldMk cId="3961428113" sldId="261"/>
+            <ac:picMk id="4" creationId="{58EE7C50-3BA6-0CAD-C627-585EF2D7EAC5}"/>
+          </ac:picMkLst>
+        </pc:picChg>
+        <pc:picChg chg="add del mod">
+          <ac:chgData name="Don Joseph" userId="01aadf7fde9797fb" providerId="LiveId" clId="{6C27825B-9435-4AE8-87A0-124E92FD3AAA}" dt="2024-02-26T18:28:41.128" v="1209" actId="478"/>
+          <ac:picMkLst>
+            <pc:docMk/>
+            <pc:sldMk cId="3961428113" sldId="261"/>
+            <ac:picMk id="7" creationId="{BF8A58FE-6EBF-9122-A829-9E5BE1CC8AB0}"/>
+          </ac:picMkLst>
+        </pc:picChg>
+        <pc:picChg chg="add del mod">
+          <ac:chgData name="Don Joseph" userId="01aadf7fde9797fb" providerId="LiveId" clId="{6C27825B-9435-4AE8-87A0-124E92FD3AAA}" dt="2024-02-26T18:28:40.816" v="1208" actId="22"/>
+          <ac:picMkLst>
+            <pc:docMk/>
+            <pc:sldMk cId="3961428113" sldId="261"/>
+            <ac:picMk id="9" creationId="{487D44B4-31EC-FB69-ACB6-D11F0C99FD60}"/>
+          </ac:picMkLst>
+        </pc:picChg>
+        <pc:picChg chg="del">
+          <ac:chgData name="Don Joseph" userId="01aadf7fde9797fb" providerId="LiveId" clId="{6C27825B-9435-4AE8-87A0-124E92FD3AAA}" dt="2024-02-26T15:37:47.690" v="14" actId="478"/>
+          <ac:picMkLst>
+            <pc:docMk/>
+            <pc:sldMk cId="3961428113" sldId="261"/>
+            <ac:picMk id="10" creationId="{BD4E3860-5280-76E2-AE40-CD81F35F5DED}"/>
+          </ac:picMkLst>
+        </pc:picChg>
+      </pc:sldChg>
+      <pc:sldChg chg="addSp delSp modSp mod">
+        <pc:chgData name="Don Joseph" userId="01aadf7fde9797fb" providerId="LiveId" clId="{6C27825B-9435-4AE8-87A0-124E92FD3AAA}" dt="2024-02-26T15:49:12.122" v="46" actId="1076"/>
+        <pc:sldMkLst>
+          <pc:docMk/>
+          <pc:sldMk cId="1305278635" sldId="262"/>
+        </pc:sldMkLst>
+        <pc:spChg chg="add del mod">
+          <ac:chgData name="Don Joseph" userId="01aadf7fde9797fb" providerId="LiveId" clId="{6C27825B-9435-4AE8-87A0-124E92FD3AAA}" dt="2024-02-26T15:48:55.125" v="44" actId="478"/>
+          <ac:spMkLst>
+            <pc:docMk/>
+            <pc:sldMk cId="1305278635" sldId="262"/>
+            <ac:spMk id="3" creationId="{1D0C41B1-A664-D9B9-3485-7312BC2E145D}"/>
+          </ac:spMkLst>
+        </pc:spChg>
+        <pc:picChg chg="add mod">
+          <ac:chgData name="Don Joseph" userId="01aadf7fde9797fb" providerId="LiveId" clId="{6C27825B-9435-4AE8-87A0-124E92FD3AAA}" dt="2024-02-26T15:49:12.122" v="46" actId="1076"/>
+          <ac:picMkLst>
+            <pc:docMk/>
+            <pc:sldMk cId="1305278635" sldId="262"/>
+            <ac:picMk id="5" creationId="{87905663-9F76-D190-A828-59CD2624B7A7}"/>
+          </ac:picMkLst>
+        </pc:picChg>
+        <pc:picChg chg="del mod">
+          <ac:chgData name="Don Joseph" userId="01aadf7fde9797fb" providerId="LiveId" clId="{6C27825B-9435-4AE8-87A0-124E92FD3AAA}" dt="2024-02-26T15:48:53.837" v="43" actId="478"/>
+          <ac:picMkLst>
+            <pc:docMk/>
+            <pc:sldMk cId="1305278635" sldId="262"/>
+            <ac:picMk id="7" creationId="{35973134-EA02-BD77-A7CA-6A534D78AA31}"/>
+          </ac:picMkLst>
+        </pc:picChg>
+      </pc:sldChg>
+      <pc:sldChg chg="addSp delSp modSp mod">
+        <pc:chgData name="Don Joseph" userId="01aadf7fde9797fb" providerId="LiveId" clId="{6C27825B-9435-4AE8-87A0-124E92FD3AAA}" dt="2024-02-26T17:14:22.571" v="1068" actId="114"/>
+        <pc:sldMkLst>
+          <pc:docMk/>
+          <pc:sldMk cId="1340266221" sldId="263"/>
+        </pc:sldMkLst>
+        <pc:spChg chg="mod">
+          <ac:chgData name="Don Joseph" userId="01aadf7fde9797fb" providerId="LiveId" clId="{6C27825B-9435-4AE8-87A0-124E92FD3AAA}" dt="2024-02-26T17:14:22.571" v="1068" actId="114"/>
+          <ac:spMkLst>
+            <pc:docMk/>
+            <pc:sldMk cId="1340266221" sldId="263"/>
+            <ac:spMk id="2" creationId="{C0A6A4AE-127D-DFA1-612E-B4834CFE853F}"/>
+          </ac:spMkLst>
+        </pc:spChg>
+        <pc:picChg chg="add mod">
+          <ac:chgData name="Don Joseph" userId="01aadf7fde9797fb" providerId="LiveId" clId="{6C27825B-9435-4AE8-87A0-124E92FD3AAA}" dt="2024-02-26T17:12:39.382" v="1032" actId="1076"/>
+          <ac:picMkLst>
+            <pc:docMk/>
+            <pc:sldMk cId="1340266221" sldId="263"/>
+            <ac:picMk id="4" creationId="{A9A8D9E9-0455-A8DB-57A1-2A8A8B9998D0}"/>
+          </ac:picMkLst>
+        </pc:picChg>
+        <pc:picChg chg="del">
+          <ac:chgData name="Don Joseph" userId="01aadf7fde9797fb" providerId="LiveId" clId="{6C27825B-9435-4AE8-87A0-124E92FD3AAA}" dt="2024-02-26T17:12:30.623" v="1026" actId="478"/>
+          <ac:picMkLst>
+            <pc:docMk/>
+            <pc:sldMk cId="1340266221" sldId="263"/>
+            <ac:picMk id="8" creationId="{21350F2D-D224-91D5-543D-72C51A9FEBD5}"/>
+          </ac:picMkLst>
+        </pc:picChg>
+      </pc:sldChg>
+      <pc:sldChg chg="addSp delSp modSp mod ord">
+        <pc:chgData name="Don Joseph" userId="01aadf7fde9797fb" providerId="LiveId" clId="{6C27825B-9435-4AE8-87A0-124E92FD3AAA}" dt="2024-02-26T18:28:46.957" v="1215" actId="478"/>
+        <pc:sldMkLst>
+          <pc:docMk/>
+          <pc:sldMk cId="4220258668" sldId="264"/>
+        </pc:sldMkLst>
+        <pc:spChg chg="mod">
+          <ac:chgData name="Don Joseph" userId="01aadf7fde9797fb" providerId="LiveId" clId="{6C27825B-9435-4AE8-87A0-124E92FD3AAA}" dt="2024-02-26T17:13:14.563" v="1048" actId="1076"/>
+          <ac:spMkLst>
+            <pc:docMk/>
+            <pc:sldMk cId="4220258668" sldId="264"/>
+            <ac:spMk id="2" creationId="{C0A6A4AE-127D-DFA1-612E-B4834CFE853F}"/>
+          </ac:spMkLst>
+        </pc:spChg>
+        <pc:spChg chg="del">
+          <ac:chgData name="Don Joseph" userId="01aadf7fde9797fb" providerId="LiveId" clId="{6C27825B-9435-4AE8-87A0-124E92FD3AAA}" dt="2024-02-26T16:12:16.600" v="1016" actId="478"/>
+          <ac:spMkLst>
+            <pc:docMk/>
+            <pc:sldMk cId="4220258668" sldId="264"/>
+            <ac:spMk id="11" creationId="{55796F3B-8240-346E-FCE9-81EF397A4281}"/>
+          </ac:spMkLst>
+        </pc:spChg>
+        <pc:picChg chg="del">
+          <ac:chgData name="Don Joseph" userId="01aadf7fde9797fb" providerId="LiveId" clId="{6C27825B-9435-4AE8-87A0-124E92FD3AAA}" dt="2024-02-26T16:12:08.433" v="1011" actId="478"/>
+          <ac:picMkLst>
+            <pc:docMk/>
+            <pc:sldMk cId="4220258668" sldId="264"/>
+            <ac:picMk id="4" creationId="{ED5E8741-A463-1BD5-4FCE-A0BD279975F4}"/>
+          </ac:picMkLst>
+        </pc:picChg>
+        <pc:picChg chg="add del mod">
+          <ac:chgData name="Don Joseph" userId="01aadf7fde9797fb" providerId="LiveId" clId="{6C27825B-9435-4AE8-87A0-124E92FD3AAA}" dt="2024-02-26T17:12:55.594" v="1036" actId="478"/>
+          <ac:picMkLst>
+            <pc:docMk/>
+            <pc:sldMk cId="4220258668" sldId="264"/>
+            <ac:picMk id="5" creationId="{844E811D-6963-58FF-8D6B-4B98AC080534}"/>
+          </ac:picMkLst>
+        </pc:picChg>
+        <pc:picChg chg="add del mod">
+          <ac:chgData name="Don Joseph" userId="01aadf7fde9797fb" providerId="LiveId" clId="{6C27825B-9435-4AE8-87A0-124E92FD3AAA}" dt="2024-02-26T18:28:46.957" v="1215" actId="478"/>
+          <ac:picMkLst>
+            <pc:docMk/>
+            <pc:sldMk cId="4220258668" sldId="264"/>
+            <ac:picMk id="8" creationId="{C6042E50-FBE7-A7B7-15CB-C3C05673E1C5}"/>
+          </ac:picMkLst>
+        </pc:picChg>
+        <pc:picChg chg="add del mod">
+          <ac:chgData name="Don Joseph" userId="01aadf7fde9797fb" providerId="LiveId" clId="{6C27825B-9435-4AE8-87A0-124E92FD3AAA}" dt="2024-02-26T18:28:46.431" v="1214" actId="22"/>
+          <ac:picMkLst>
+            <pc:docMk/>
+            <pc:sldMk cId="4220258668" sldId="264"/>
+            <ac:picMk id="10" creationId="{6C214997-B7FE-2DEA-8AEC-F64EDBD9CBC3}"/>
+          </ac:picMkLst>
+        </pc:picChg>
+      </pc:sldChg>
+      <pc:sldChg chg="addSp delSp modSp add mod ord">
+        <pc:chgData name="Don Joseph" userId="01aadf7fde9797fb" providerId="LiveId" clId="{6C27825B-9435-4AE8-87A0-124E92FD3AAA}" dt="2024-02-26T17:15:21.215" v="1118" actId="20577"/>
+        <pc:sldMkLst>
+          <pc:docMk/>
+          <pc:sldMk cId="756688123" sldId="266"/>
+        </pc:sldMkLst>
+        <pc:spChg chg="del mod">
+          <ac:chgData name="Don Joseph" userId="01aadf7fde9797fb" providerId="LiveId" clId="{6C27825B-9435-4AE8-87A0-124E92FD3AAA}" dt="2024-02-26T15:38:57.515" v="38" actId="478"/>
+          <ac:spMkLst>
+            <pc:docMk/>
+            <pc:sldMk cId="756688123" sldId="266"/>
+            <ac:spMk id="2" creationId="{C0A6A4AE-127D-DFA1-612E-B4834CFE853F}"/>
+          </ac:spMkLst>
+        </pc:spChg>
+        <pc:spChg chg="add del mod">
+          <ac:chgData name="Don Joseph" userId="01aadf7fde9797fb" providerId="LiveId" clId="{6C27825B-9435-4AE8-87A0-124E92FD3AAA}" dt="2024-02-26T15:40:50.772" v="42"/>
+          <ac:spMkLst>
+            <pc:docMk/>
+            <pc:sldMk cId="756688123" sldId="266"/>
+            <ac:spMk id="3" creationId="{252E14FB-735A-B5AF-B836-32C549BD6FD0}"/>
+          </ac:spMkLst>
+        </pc:spChg>
+        <pc:spChg chg="mod">
+          <ac:chgData name="Don Joseph" userId="01aadf7fde9797fb" providerId="LiveId" clId="{6C27825B-9435-4AE8-87A0-124E92FD3AAA}" dt="2024-02-26T17:15:21.215" v="1118" actId="20577"/>
+          <ac:spMkLst>
+            <pc:docMk/>
+            <pc:sldMk cId="756688123" sldId="266"/>
+            <ac:spMk id="6" creationId="{82399533-CF94-A139-F2FC-278F96C80036}"/>
+          </ac:spMkLst>
+        </pc:spChg>
+        <pc:picChg chg="del">
+          <ac:chgData name="Don Joseph" userId="01aadf7fde9797fb" providerId="LiveId" clId="{6C27825B-9435-4AE8-87A0-124E92FD3AAA}" dt="2024-02-26T15:38:40.081" v="18" actId="478"/>
+          <ac:picMkLst>
+            <pc:docMk/>
+            <pc:sldMk cId="756688123" sldId="266"/>
+            <ac:picMk id="4" creationId="{58EE7C50-3BA6-0CAD-C627-585EF2D7EAC5}"/>
+          </ac:picMkLst>
+        </pc:picChg>
+      </pc:sldChg>
+      <pc:sldChg chg="delSp modSp new mod">
+        <pc:chgData name="Don Joseph" userId="01aadf7fde9797fb" providerId="LiveId" clId="{6C27825B-9435-4AE8-87A0-124E92FD3AAA}" dt="2024-02-26T18:42:10.636" v="1428" actId="14100"/>
+        <pc:sldMkLst>
+          <pc:docMk/>
+          <pc:sldMk cId="4199166108" sldId="267"/>
+        </pc:sldMkLst>
+        <pc:spChg chg="del">
+          <ac:chgData name="Don Joseph" userId="01aadf7fde9797fb" providerId="LiveId" clId="{6C27825B-9435-4AE8-87A0-124E92FD3AAA}" dt="2024-02-26T15:50:24.078" v="48" actId="478"/>
+          <ac:spMkLst>
+            <pc:docMk/>
+            <pc:sldMk cId="4199166108" sldId="267"/>
+            <ac:spMk id="2" creationId="{E9A31C7C-1F94-65F1-FCC7-A067AB663465}"/>
+          </ac:spMkLst>
+        </pc:spChg>
+        <pc:spChg chg="mod">
+          <ac:chgData name="Don Joseph" userId="01aadf7fde9797fb" providerId="LiveId" clId="{6C27825B-9435-4AE8-87A0-124E92FD3AAA}" dt="2024-02-26T18:42:10.636" v="1428" actId="14100"/>
+          <ac:spMkLst>
+            <pc:docMk/>
+            <pc:sldMk cId="4199166108" sldId="267"/>
+            <ac:spMk id="3" creationId="{F52D78B5-F45F-9C0A-0C97-7CBE40AC76E9}"/>
+          </ac:spMkLst>
+        </pc:spChg>
+      </pc:sldChg>
+      <pc:sldChg chg="addSp delSp modSp add mod setBg">
+        <pc:chgData name="Don Joseph" userId="01aadf7fde9797fb" providerId="LiveId" clId="{6C27825B-9435-4AE8-87A0-124E92FD3AAA}" dt="2024-02-26T18:33:04.178" v="1338" actId="20577"/>
+        <pc:sldMkLst>
+          <pc:docMk/>
+          <pc:sldMk cId="2367263751" sldId="268"/>
+        </pc:sldMkLst>
+        <pc:spChg chg="mod">
+          <ac:chgData name="Don Joseph" userId="01aadf7fde9797fb" providerId="LiveId" clId="{6C27825B-9435-4AE8-87A0-124E92FD3AAA}" dt="2024-02-26T18:25:49.866" v="1156" actId="26606"/>
+          <ac:spMkLst>
+            <pc:docMk/>
+            <pc:sldMk cId="2367263751" sldId="268"/>
+            <ac:spMk id="6" creationId="{82399533-CF94-A139-F2FC-278F96C80036}"/>
+          </ac:spMkLst>
+        </pc:spChg>
+        <pc:spChg chg="mod ord">
+          <ac:chgData name="Don Joseph" userId="01aadf7fde9797fb" providerId="LiveId" clId="{6C27825B-9435-4AE8-87A0-124E92FD3AAA}" dt="2024-02-26T18:33:04.178" v="1338" actId="20577"/>
+          <ac:spMkLst>
+            <pc:docMk/>
+            <pc:sldMk cId="2367263751" sldId="268"/>
+            <ac:spMk id="7" creationId="{91207C77-A6BD-DDA8-F8D8-74BC85FC8093}"/>
+          </ac:spMkLst>
+        </pc:spChg>
+        <pc:spChg chg="add del">
+          <ac:chgData name="Don Joseph" userId="01aadf7fde9797fb" providerId="LiveId" clId="{6C27825B-9435-4AE8-87A0-124E92FD3AAA}" dt="2024-02-26T18:25:49.866" v="1156" actId="26606"/>
+          <ac:spMkLst>
+            <pc:docMk/>
+            <pc:sldMk cId="2367263751" sldId="268"/>
+            <ac:spMk id="15" creationId="{3AFE8227-C443-417B-BA91-520EB1EF4559}"/>
+          </ac:spMkLst>
+        </pc:spChg>
+        <pc:spChg chg="add del">
+          <ac:chgData name="Don Joseph" userId="01aadf7fde9797fb" providerId="LiveId" clId="{6C27825B-9435-4AE8-87A0-124E92FD3AAA}" dt="2024-02-26T18:25:49.866" v="1156" actId="26606"/>
+          <ac:spMkLst>
+            <pc:docMk/>
+            <pc:sldMk cId="2367263751" sldId="268"/>
+            <ac:spMk id="17" creationId="{907741FC-B544-4A6E-B831-6789D042333D}"/>
+          </ac:spMkLst>
+        </pc:spChg>
+        <pc:spChg chg="add del">
+          <ac:chgData name="Don Joseph" userId="01aadf7fde9797fb" providerId="LiveId" clId="{6C27825B-9435-4AE8-87A0-124E92FD3AAA}" dt="2024-02-26T18:25:49.866" v="1156" actId="26606"/>
+          <ac:spMkLst>
+            <pc:docMk/>
+            <pc:sldMk cId="2367263751" sldId="268"/>
+            <ac:spMk id="19" creationId="{3F0BE7ED-7814-4273-B18A-F26CC0380380}"/>
+          </ac:spMkLst>
+        </pc:spChg>
+        <pc:grpChg chg="del">
+          <ac:chgData name="Don Joseph" userId="01aadf7fde9797fb" providerId="LiveId" clId="{6C27825B-9435-4AE8-87A0-124E92FD3AAA}" dt="2024-02-26T18:25:15.672" v="1126" actId="478"/>
+          <ac:grpSpMkLst>
+            <pc:docMk/>
+            <pc:sldMk cId="2367263751" sldId="268"/>
+            <ac:grpSpMk id="5" creationId="{47791A88-5136-7B99-AF8D-7B7163E3FA3A}"/>
+          </ac:grpSpMkLst>
+        </pc:grpChg>
+        <pc:picChg chg="add mod">
+          <ac:chgData name="Don Joseph" userId="01aadf7fde9797fb" providerId="LiveId" clId="{6C27825B-9435-4AE8-87A0-124E92FD3AAA}" dt="2024-02-26T18:25:53.340" v="1160" actId="1076"/>
+          <ac:picMkLst>
+            <pc:docMk/>
+            <pc:sldMk cId="2367263751" sldId="268"/>
+            <ac:picMk id="10" creationId="{E204AC28-DA4F-2F92-F9D7-3ED7990315BB}"/>
+          </ac:picMkLst>
+        </pc:picChg>
+      </pc:sldChg>
+      <pc:sldChg chg="addSp delSp modSp add mod">
+        <pc:chgData name="Don Joseph" userId="01aadf7fde9797fb" providerId="LiveId" clId="{6C27825B-9435-4AE8-87A0-124E92FD3AAA}" dt="2024-02-26T18:26:11.273" v="1167" actId="1076"/>
+        <pc:sldMkLst>
+          <pc:docMk/>
+          <pc:sldMk cId="3482000773" sldId="269"/>
+        </pc:sldMkLst>
+        <pc:spChg chg="mod">
+          <ac:chgData name="Don Joseph" userId="01aadf7fde9797fb" providerId="LiveId" clId="{6C27825B-9435-4AE8-87A0-124E92FD3AAA}" dt="2024-02-26T18:26:11.273" v="1167" actId="1076"/>
+          <ac:spMkLst>
+            <pc:docMk/>
+            <pc:sldMk cId="3482000773" sldId="269"/>
+            <ac:spMk id="2" creationId="{D20C6C1B-3F2A-A938-F512-0ADD2B878896}"/>
+          </ac:spMkLst>
+        </pc:spChg>
+        <pc:picChg chg="add mod">
+          <ac:chgData name="Don Joseph" userId="01aadf7fde9797fb" providerId="LiveId" clId="{6C27825B-9435-4AE8-87A0-124E92FD3AAA}" dt="2024-02-26T18:26:08.234" v="1166" actId="1076"/>
+          <ac:picMkLst>
+            <pc:docMk/>
+            <pc:sldMk cId="3482000773" sldId="269"/>
+            <ac:picMk id="4" creationId="{874CADDD-FCE0-B7FE-5291-B8C8DA247181}"/>
+          </ac:picMkLst>
+        </pc:picChg>
+        <pc:picChg chg="del">
+          <ac:chgData name="Don Joseph" userId="01aadf7fde9797fb" providerId="LiveId" clId="{6C27825B-9435-4AE8-87A0-124E92FD3AAA}" dt="2024-02-26T18:26:02.147" v="1163" actId="478"/>
+          <ac:picMkLst>
+            <pc:docMk/>
+            <pc:sldMk cId="3482000773" sldId="269"/>
+            <ac:picMk id="5" creationId="{87905663-9F76-D190-A828-59CD2624B7A7}"/>
+          </ac:picMkLst>
+        </pc:picChg>
+      </pc:sldChg>
+      <pc:sldChg chg="addSp delSp modSp add mod">
+        <pc:chgData name="Don Joseph" userId="01aadf7fde9797fb" providerId="LiveId" clId="{6C27825B-9435-4AE8-87A0-124E92FD3AAA}" dt="2024-02-26T18:27:06.237" v="1194" actId="20577"/>
+        <pc:sldMkLst>
+          <pc:docMk/>
+          <pc:sldMk cId="1801552924" sldId="270"/>
+        </pc:sldMkLst>
+        <pc:spChg chg="mod">
+          <ac:chgData name="Don Joseph" userId="01aadf7fde9797fb" providerId="LiveId" clId="{6C27825B-9435-4AE8-87A0-124E92FD3AAA}" dt="2024-02-26T18:27:06.237" v="1194" actId="20577"/>
+          <ac:spMkLst>
+            <pc:docMk/>
+            <pc:sldMk cId="1801552924" sldId="270"/>
+            <ac:spMk id="2" creationId="{C0A6A4AE-127D-DFA1-612E-B4834CFE853F}"/>
+          </ac:spMkLst>
+        </pc:spChg>
+        <pc:picChg chg="del">
+          <ac:chgData name="Don Joseph" userId="01aadf7fde9797fb" providerId="LiveId" clId="{6C27825B-9435-4AE8-87A0-124E92FD3AAA}" dt="2024-02-26T18:26:36.531" v="1176" actId="478"/>
+          <ac:picMkLst>
+            <pc:docMk/>
+            <pc:sldMk cId="1801552924" sldId="270"/>
+            <ac:picMk id="4" creationId="{A9A8D9E9-0455-A8DB-57A1-2A8A8B9998D0}"/>
+          </ac:picMkLst>
+        </pc:picChg>
+        <pc:picChg chg="add mod">
+          <ac:chgData name="Don Joseph" userId="01aadf7fde9797fb" providerId="LiveId" clId="{6C27825B-9435-4AE8-87A0-124E92FD3AAA}" dt="2024-02-26T18:26:52.450" v="1182" actId="1076"/>
+          <ac:picMkLst>
+            <pc:docMk/>
+            <pc:sldMk cId="1801552924" sldId="270"/>
+            <ac:picMk id="5" creationId="{D78BE0E9-14F8-1CE3-07B6-4DBF0241D14B}"/>
+          </ac:picMkLst>
+        </pc:picChg>
+      </pc:sldChg>
+      <pc:sldChg chg="delSp add del mod">
+        <pc:chgData name="Don Joseph" userId="01aadf7fde9797fb" providerId="LiveId" clId="{6C27825B-9435-4AE8-87A0-124E92FD3AAA}" dt="2024-02-26T18:26:23.935" v="1171" actId="47"/>
+        <pc:sldMkLst>
+          <pc:docMk/>
+          <pc:sldMk cId="3803462155" sldId="270"/>
+        </pc:sldMkLst>
+        <pc:spChg chg="del">
+          <ac:chgData name="Don Joseph" userId="01aadf7fde9797fb" providerId="LiveId" clId="{6C27825B-9435-4AE8-87A0-124E92FD3AAA}" dt="2024-02-26T18:26:23.118" v="1170" actId="478"/>
+          <ac:spMkLst>
+            <pc:docMk/>
+            <pc:sldMk cId="3803462155" sldId="270"/>
+            <ac:spMk id="2" creationId="{D20C6C1B-3F2A-A938-F512-0ADD2B878896}"/>
+          </ac:spMkLst>
+        </pc:spChg>
+        <pc:picChg chg="del">
+          <ac:chgData name="Don Joseph" userId="01aadf7fde9797fb" providerId="LiveId" clId="{6C27825B-9435-4AE8-87A0-124E92FD3AAA}" dt="2024-02-26T18:26:19.278" v="1169" actId="478"/>
+          <ac:picMkLst>
+            <pc:docMk/>
+            <pc:sldMk cId="3803462155" sldId="270"/>
+            <ac:picMk id="4" creationId="{874CADDD-FCE0-B7FE-5291-B8C8DA247181}"/>
+          </ac:picMkLst>
+        </pc:picChg>
+      </pc:sldChg>
+      <pc:sldChg chg="addSp delSp modSp add mod">
+        <pc:chgData name="Don Joseph" userId="01aadf7fde9797fb" providerId="LiveId" clId="{6C27825B-9435-4AE8-87A0-124E92FD3AAA}" dt="2024-02-26T18:29:50.298" v="1238" actId="20577"/>
+        <pc:sldMkLst>
+          <pc:docMk/>
+          <pc:sldMk cId="3941756674" sldId="271"/>
+        </pc:sldMkLst>
+        <pc:spChg chg="mod">
+          <ac:chgData name="Don Joseph" userId="01aadf7fde9797fb" providerId="LiveId" clId="{6C27825B-9435-4AE8-87A0-124E92FD3AAA}" dt="2024-02-26T18:29:50.298" v="1238" actId="20577"/>
+          <ac:spMkLst>
+            <pc:docMk/>
+            <pc:sldMk cId="3941756674" sldId="271"/>
+            <ac:spMk id="2" creationId="{C0A6A4AE-127D-DFA1-612E-B4834CFE853F}"/>
+          </ac:spMkLst>
+        </pc:spChg>
+        <pc:spChg chg="mod">
+          <ac:chgData name="Don Joseph" userId="01aadf7fde9797fb" providerId="LiveId" clId="{6C27825B-9435-4AE8-87A0-124E92FD3AAA}" dt="2024-02-26T18:29:03.462" v="1219" actId="20577"/>
+          <ac:spMkLst>
+            <pc:docMk/>
+            <pc:sldMk cId="3941756674" sldId="271"/>
+            <ac:spMk id="6" creationId="{82399533-CF94-A139-F2FC-278F96C80036}"/>
+          </ac:spMkLst>
+        </pc:spChg>
+        <pc:picChg chg="add mod">
+          <ac:chgData name="Don Joseph" userId="01aadf7fde9797fb" providerId="LiveId" clId="{6C27825B-9435-4AE8-87A0-124E92FD3AAA}" dt="2024-02-26T18:29:01.077" v="1217" actId="1076"/>
+          <ac:picMkLst>
+            <pc:docMk/>
+            <pc:sldMk cId="3941756674" sldId="271"/>
+            <ac:picMk id="4" creationId="{AC3E61C7-8FCD-5C66-DFB7-9D6EB485AB52}"/>
+          </ac:picMkLst>
+        </pc:picChg>
+        <pc:picChg chg="del">
+          <ac:chgData name="Don Joseph" userId="01aadf7fde9797fb" providerId="LiveId" clId="{6C27825B-9435-4AE8-87A0-124E92FD3AAA}" dt="2024-02-26T18:26:33.497" v="1174" actId="478"/>
+          <ac:picMkLst>
+            <pc:docMk/>
+            <pc:sldMk cId="3941756674" sldId="271"/>
+            <ac:picMk id="7" creationId="{BF8A58FE-6EBF-9122-A829-9E5BE1CC8AB0}"/>
+          </ac:picMkLst>
+        </pc:picChg>
+      </pc:sldChg>
+      <pc:sldChg chg="addSp delSp modSp add mod">
+        <pc:chgData name="Don Joseph" userId="01aadf7fde9797fb" providerId="LiveId" clId="{6C27825B-9435-4AE8-87A0-124E92FD3AAA}" dt="2024-02-26T18:29:13.792" v="1225" actId="1076"/>
+        <pc:sldMkLst>
+          <pc:docMk/>
+          <pc:sldMk cId="2482075166" sldId="272"/>
+        </pc:sldMkLst>
+        <pc:spChg chg="mod">
+          <ac:chgData name="Don Joseph" userId="01aadf7fde9797fb" providerId="LiveId" clId="{6C27825B-9435-4AE8-87A0-124E92FD3AAA}" dt="2024-02-26T18:29:06.823" v="1221" actId="20577"/>
+          <ac:spMkLst>
+            <pc:docMk/>
+            <pc:sldMk cId="2482075166" sldId="272"/>
+            <ac:spMk id="6" creationId="{82399533-CF94-A139-F2FC-278F96C80036}"/>
+          </ac:spMkLst>
+        </pc:spChg>
+        <pc:picChg chg="add mod">
+          <ac:chgData name="Don Joseph" userId="01aadf7fde9797fb" providerId="LiveId" clId="{6C27825B-9435-4AE8-87A0-124E92FD3AAA}" dt="2024-02-26T18:29:13.792" v="1225" actId="1076"/>
+          <ac:picMkLst>
+            <pc:docMk/>
+            <pc:sldMk cId="2482075166" sldId="272"/>
+            <ac:picMk id="4" creationId="{B9264DEF-5AEE-9E60-978A-3E5C8554768E}"/>
+          </ac:picMkLst>
+        </pc:picChg>
+        <pc:picChg chg="del">
+          <ac:chgData name="Don Joseph" userId="01aadf7fde9797fb" providerId="LiveId" clId="{6C27825B-9435-4AE8-87A0-124E92FD3AAA}" dt="2024-02-26T18:26:34.721" v="1175" actId="478"/>
+          <ac:picMkLst>
+            <pc:docMk/>
+            <pc:sldMk cId="2482075166" sldId="272"/>
+            <ac:picMk id="8" creationId="{C6042E50-FBE7-A7B7-15CB-C3C05673E1C5}"/>
           </ac:picMkLst>
         </pc:picChg>
       </pc:sldChg>
@@ -847,7 +1365,7 @@
           <a:p>
             <a:fld id="{D350CF16-44E2-4DB4-97A3-237468F9ABC0}" type="datetimeFigureOut">
               <a:rPr lang="en-GB" smtClean="0"/>
-              <a:t>22/02/2024</a:t>
+              <a:t>26/02/2024</a:t>
             </a:fld>
             <a:endParaRPr lang="en-GB"/>
           </a:p>
@@ -1047,7 +1565,7 @@
           <a:p>
             <a:fld id="{D350CF16-44E2-4DB4-97A3-237468F9ABC0}" type="datetimeFigureOut">
               <a:rPr lang="en-GB" smtClean="0"/>
-              <a:t>22/02/2024</a:t>
+              <a:t>26/02/2024</a:t>
             </a:fld>
             <a:endParaRPr lang="en-GB"/>
           </a:p>
@@ -1257,7 +1775,7 @@
           <a:p>
             <a:fld id="{D350CF16-44E2-4DB4-97A3-237468F9ABC0}" type="datetimeFigureOut">
               <a:rPr lang="en-GB" smtClean="0"/>
-              <a:t>22/02/2024</a:t>
+              <a:t>26/02/2024</a:t>
             </a:fld>
             <a:endParaRPr lang="en-GB"/>
           </a:p>
@@ -1457,7 +1975,7 @@
           <a:p>
             <a:fld id="{D350CF16-44E2-4DB4-97A3-237468F9ABC0}" type="datetimeFigureOut">
               <a:rPr lang="en-GB" smtClean="0"/>
-              <a:t>22/02/2024</a:t>
+              <a:t>26/02/2024</a:t>
             </a:fld>
             <a:endParaRPr lang="en-GB"/>
           </a:p>
@@ -1733,7 +2251,7 @@
           <a:p>
             <a:fld id="{D350CF16-44E2-4DB4-97A3-237468F9ABC0}" type="datetimeFigureOut">
               <a:rPr lang="en-GB" smtClean="0"/>
-              <a:t>22/02/2024</a:t>
+              <a:t>26/02/2024</a:t>
             </a:fld>
             <a:endParaRPr lang="en-GB"/>
           </a:p>
@@ -2001,7 +2519,7 @@
           <a:p>
             <a:fld id="{D350CF16-44E2-4DB4-97A3-237468F9ABC0}" type="datetimeFigureOut">
               <a:rPr lang="en-GB" smtClean="0"/>
-              <a:t>22/02/2024</a:t>
+              <a:t>26/02/2024</a:t>
             </a:fld>
             <a:endParaRPr lang="en-GB"/>
           </a:p>
@@ -2416,7 +2934,7 @@
           <a:p>
             <a:fld id="{D350CF16-44E2-4DB4-97A3-237468F9ABC0}" type="datetimeFigureOut">
               <a:rPr lang="en-GB" smtClean="0"/>
-              <a:t>22/02/2024</a:t>
+              <a:t>26/02/2024</a:t>
             </a:fld>
             <a:endParaRPr lang="en-GB"/>
           </a:p>
@@ -2558,7 +3076,7 @@
           <a:p>
             <a:fld id="{D350CF16-44E2-4DB4-97A3-237468F9ABC0}" type="datetimeFigureOut">
               <a:rPr lang="en-GB" smtClean="0"/>
-              <a:t>22/02/2024</a:t>
+              <a:t>26/02/2024</a:t>
             </a:fld>
             <a:endParaRPr lang="en-GB"/>
           </a:p>
@@ -2671,7 +3189,7 @@
           <a:p>
             <a:fld id="{D350CF16-44E2-4DB4-97A3-237468F9ABC0}" type="datetimeFigureOut">
               <a:rPr lang="en-GB" smtClean="0"/>
-              <a:t>22/02/2024</a:t>
+              <a:t>26/02/2024</a:t>
             </a:fld>
             <a:endParaRPr lang="en-GB"/>
           </a:p>
@@ -2984,7 +3502,7 @@
           <a:p>
             <a:fld id="{D350CF16-44E2-4DB4-97A3-237468F9ABC0}" type="datetimeFigureOut">
               <a:rPr lang="en-GB" smtClean="0"/>
-              <a:t>22/02/2024</a:t>
+              <a:t>26/02/2024</a:t>
             </a:fld>
             <a:endParaRPr lang="en-GB"/>
           </a:p>
@@ -3273,7 +3791,7 @@
           <a:p>
             <a:fld id="{D350CF16-44E2-4DB4-97A3-237468F9ABC0}" type="datetimeFigureOut">
               <a:rPr lang="en-GB" smtClean="0"/>
-              <a:t>22/02/2024</a:t>
+              <a:t>26/02/2024</a:t>
             </a:fld>
             <a:endParaRPr lang="en-GB"/>
           </a:p>
@@ -3516,7 +4034,7 @@
           <a:p>
             <a:fld id="{D350CF16-44E2-4DB4-97A3-237468F9ABC0}" type="datetimeFigureOut">
               <a:rPr lang="en-GB" smtClean="0"/>
-              <a:t>22/02/2024</a:t>
+              <a:t>26/02/2024</a:t>
             </a:fld>
             <a:endParaRPr lang="en-GB"/>
           </a:p>
@@ -4344,7 +4862,7 @@
         <p:spPr>
           <a:xfrm>
             <a:off x="811763" y="317240"/>
-            <a:ext cx="5945217" cy="369332"/>
+            <a:ext cx="3525645" cy="369332"/>
           </a:xfrm>
           <a:prstGeom prst="rect">
             <a:avLst/>
@@ -4358,18 +4876,242 @@
           <a:lstStyle/>
           <a:p>
             <a:r>
-              <a:rPr lang="en-GB" b="1" u="sng" dirty="0"/>
-              <a:t>Spending behaviours for each customer segment – 5 clusters</a:t>
-            </a:r>
+              <a:rPr lang="en-GB" b="1" u="sng"/>
+              <a:t>Clustering Evaluation – Elbow plots</a:t>
+            </a:r>
+            <a:endParaRPr lang="en-GB" b="1" u="sng" dirty="0"/>
+          </a:p>
+        </p:txBody>
+      </p:sp>
+      <p:sp>
+        <p:nvSpPr>
+          <p:cNvPr id="7" name="TextBox 6">
+            <a:extLst>
+              <a:ext uri="{FF2B5EF4-FFF2-40B4-BE49-F238E27FC236}">
+                <a16:creationId xmlns:a16="http://schemas.microsoft.com/office/drawing/2014/main" id="{91207C77-A6BD-DDA8-F8D8-74BC85FC8093}"/>
+              </a:ext>
+            </a:extLst>
+          </p:cNvPr>
+          <p:cNvSpPr txBox="1"/>
+          <p:nvPr/>
+        </p:nvSpPr>
+        <p:spPr>
+          <a:xfrm>
+            <a:off x="7468896" y="1441839"/>
+            <a:ext cx="4618653" cy="3093154"/>
+          </a:xfrm>
+          <a:prstGeom prst="rect">
+            <a:avLst/>
+          </a:prstGeom>
+          <a:noFill/>
+        </p:spPr>
+        <p:txBody>
+          <a:bodyPr wrap="square" rtlCol="0">
+            <a:spAutoFit/>
+          </a:bodyPr>
+          <a:lstStyle/>
+          <a:p>
+            <a:pPr marL="285750" indent="-285750">
+              <a:buFont typeface="Arial" panose="020B0604020202020204" pitchFamily="34" charset="0"/>
+              <a:buChar char="•"/>
+            </a:pPr>
+            <a:r>
+              <a:rPr lang="en-GB" sz="1500" i="0" dirty="0">
+                <a:solidFill>
+                  <a:srgbClr val="000000"/>
+                </a:solidFill>
+                <a:effectLst/>
+                <a:latin typeface="Arial" panose="020B0604020202020204" pitchFamily="34" charset="0"/>
+                <a:cs typeface="Arial" panose="020B0604020202020204" pitchFamily="34" charset="0"/>
+              </a:rPr>
+              <a:t>Optimal clusters are at the point in which the knee "bends" or in </a:t>
+            </a:r>
+            <a:r>
+              <a:rPr lang="en-GB" sz="1500" i="0" dirty="0" err="1">
+                <a:solidFill>
+                  <a:srgbClr val="000000"/>
+                </a:solidFill>
+                <a:effectLst/>
+                <a:latin typeface="Arial" panose="020B0604020202020204" pitchFamily="34" charset="0"/>
+                <a:cs typeface="Arial" panose="020B0604020202020204" pitchFamily="34" charset="0"/>
+              </a:rPr>
+              <a:t>mathemetical</a:t>
+            </a:r>
+            <a:r>
+              <a:rPr lang="en-GB" sz="1500" i="0" dirty="0">
+                <a:solidFill>
+                  <a:srgbClr val="000000"/>
+                </a:solidFill>
+                <a:effectLst/>
+                <a:latin typeface="Arial" panose="020B0604020202020204" pitchFamily="34" charset="0"/>
+                <a:cs typeface="Arial" panose="020B0604020202020204" pitchFamily="34" charset="0"/>
+              </a:rPr>
+              <a:t> terms when the marginal total within sum of squares ("</a:t>
+            </a:r>
+            <a:r>
+              <a:rPr lang="en-GB" sz="1500" i="0" dirty="0" err="1">
+                <a:solidFill>
+                  <a:srgbClr val="000000"/>
+                </a:solidFill>
+                <a:effectLst/>
+                <a:latin typeface="Arial" panose="020B0604020202020204" pitchFamily="34" charset="0"/>
+                <a:cs typeface="Arial" panose="020B0604020202020204" pitchFamily="34" charset="0"/>
+              </a:rPr>
+              <a:t>wss</a:t>
+            </a:r>
+            <a:r>
+              <a:rPr lang="en-GB" sz="1500" i="0" dirty="0">
+                <a:solidFill>
+                  <a:srgbClr val="000000"/>
+                </a:solidFill>
+                <a:effectLst/>
+                <a:latin typeface="Arial" panose="020B0604020202020204" pitchFamily="34" charset="0"/>
+                <a:cs typeface="Arial" panose="020B0604020202020204" pitchFamily="34" charset="0"/>
+              </a:rPr>
+              <a:t>") for an additional cluster begins to decrease at a linear rate.</a:t>
+            </a:r>
+          </a:p>
+          <a:p>
+            <a:pPr marL="285750" indent="-285750">
+              <a:buFont typeface="Arial" panose="020B0604020202020204" pitchFamily="34" charset="0"/>
+              <a:buChar char="•"/>
+            </a:pPr>
+            <a:endParaRPr lang="en-GB" sz="1500" i="0" dirty="0">
+              <a:solidFill>
+                <a:srgbClr val="000000"/>
+              </a:solidFill>
+              <a:effectLst/>
+              <a:latin typeface="Arial" panose="020B0604020202020204" pitchFamily="34" charset="0"/>
+              <a:cs typeface="Arial" panose="020B0604020202020204" pitchFamily="34" charset="0"/>
+            </a:endParaRPr>
+          </a:p>
+          <a:p>
+            <a:pPr marL="285750" indent="-285750">
+              <a:buFont typeface="Arial" panose="020B0604020202020204" pitchFamily="34" charset="0"/>
+              <a:buChar char="•"/>
+            </a:pPr>
+            <a:r>
+              <a:rPr lang="en-GB" sz="1500" dirty="0">
+                <a:solidFill>
+                  <a:srgbClr val="000000"/>
+                </a:solidFill>
+                <a:latin typeface="Arial" panose="020B0604020202020204" pitchFamily="34" charset="0"/>
+                <a:cs typeface="Arial" panose="020B0604020202020204" pitchFamily="34" charset="0"/>
+              </a:rPr>
+              <a:t>Probably 3 clusters.</a:t>
+            </a:r>
+          </a:p>
+          <a:p>
+            <a:pPr marL="285750" indent="-285750">
+              <a:buFont typeface="Arial" panose="020B0604020202020204" pitchFamily="34" charset="0"/>
+              <a:buChar char="•"/>
+            </a:pPr>
+            <a:endParaRPr lang="en-GB" sz="1500" dirty="0">
+              <a:solidFill>
+                <a:srgbClr val="000000"/>
+              </a:solidFill>
+              <a:latin typeface="Arial" panose="020B0604020202020204" pitchFamily="34" charset="0"/>
+              <a:cs typeface="Arial" panose="020B0604020202020204" pitchFamily="34" charset="0"/>
+            </a:endParaRPr>
+          </a:p>
+          <a:p>
+            <a:pPr marL="285750" indent="-285750">
+              <a:buFont typeface="Arial" panose="020B0604020202020204" pitchFamily="34" charset="0"/>
+              <a:buChar char="•"/>
+            </a:pPr>
+            <a:endParaRPr lang="en-GB" sz="1500" dirty="0">
+              <a:solidFill>
+                <a:srgbClr val="000000"/>
+              </a:solidFill>
+              <a:latin typeface="Arial" panose="020B0604020202020204" pitchFamily="34" charset="0"/>
+              <a:cs typeface="Arial" panose="020B0604020202020204" pitchFamily="34" charset="0"/>
+            </a:endParaRPr>
+          </a:p>
+          <a:p>
+            <a:r>
+              <a:rPr lang="en-GB" sz="1500" b="1" dirty="0">
+                <a:solidFill>
+                  <a:srgbClr val="000000"/>
+                </a:solidFill>
+                <a:latin typeface="Arial" panose="020B0604020202020204" pitchFamily="34" charset="0"/>
+                <a:cs typeface="Arial" panose="020B0604020202020204" pitchFamily="34" charset="0"/>
+              </a:rPr>
+              <a:t>Hyperparameters</a:t>
+            </a:r>
+          </a:p>
+          <a:p>
+            <a:endParaRPr lang="en-GB" sz="1500" b="1" dirty="0">
+              <a:solidFill>
+                <a:srgbClr val="000000"/>
+              </a:solidFill>
+              <a:latin typeface="Arial" panose="020B0604020202020204" pitchFamily="34" charset="0"/>
+              <a:cs typeface="Arial" panose="020B0604020202020204" pitchFamily="34" charset="0"/>
+            </a:endParaRPr>
+          </a:p>
+          <a:p>
+            <a:pPr marL="285750" indent="-285750">
+              <a:buFont typeface="Arial" panose="020B0604020202020204" pitchFamily="34" charset="0"/>
+              <a:buChar char="•"/>
+            </a:pPr>
+            <a:r>
+              <a:rPr lang="en-GB" sz="1500" dirty="0" err="1">
+                <a:solidFill>
+                  <a:srgbClr val="000000"/>
+                </a:solidFill>
+                <a:latin typeface="Arial" panose="020B0604020202020204" pitchFamily="34" charset="0"/>
+                <a:cs typeface="Arial" panose="020B0604020202020204" pitchFamily="34" charset="0"/>
+              </a:rPr>
+              <a:t>n_init</a:t>
+            </a:r>
+            <a:r>
+              <a:rPr lang="en-GB" sz="1500" dirty="0">
+                <a:solidFill>
+                  <a:srgbClr val="000000"/>
+                </a:solidFill>
+                <a:latin typeface="Arial" panose="020B0604020202020204" pitchFamily="34" charset="0"/>
+                <a:cs typeface="Arial" panose="020B0604020202020204" pitchFamily="34" charset="0"/>
+              </a:rPr>
+              <a:t>: ‘Auto’ [Default]</a:t>
+            </a:r>
+          </a:p>
+          <a:p>
+            <a:pPr marL="285750" indent="-285750">
+              <a:buFont typeface="Arial" panose="020B0604020202020204" pitchFamily="34" charset="0"/>
+              <a:buChar char="•"/>
+            </a:pPr>
+            <a:r>
+              <a:rPr lang="en-GB" sz="1500" dirty="0" err="1">
+                <a:solidFill>
+                  <a:srgbClr val="000000"/>
+                </a:solidFill>
+                <a:latin typeface="Arial" panose="020B0604020202020204" pitchFamily="34" charset="0"/>
+                <a:cs typeface="Arial" panose="020B0604020202020204" pitchFamily="34" charset="0"/>
+              </a:rPr>
+              <a:t>Max_iter</a:t>
+            </a:r>
+            <a:r>
+              <a:rPr lang="en-GB" sz="1500" dirty="0">
+                <a:solidFill>
+                  <a:srgbClr val="000000"/>
+                </a:solidFill>
+                <a:latin typeface="Arial" panose="020B0604020202020204" pitchFamily="34" charset="0"/>
+                <a:cs typeface="Arial" panose="020B0604020202020204" pitchFamily="34" charset="0"/>
+              </a:rPr>
+              <a:t> = ‘300’ [Default]</a:t>
+            </a:r>
+            <a:endParaRPr lang="en-GB" sz="1500" dirty="0">
+              <a:latin typeface="Arial" panose="020B0604020202020204" pitchFamily="34" charset="0"/>
+              <a:cs typeface="Arial" panose="020B0604020202020204" pitchFamily="34" charset="0"/>
+            </a:endParaRPr>
           </a:p>
         </p:txBody>
       </p:sp>
       <p:pic>
         <p:nvPicPr>
-          <p:cNvPr id="3" name="Picture 2">
-            <a:extLst>
-              <a:ext uri="{FF2B5EF4-FFF2-40B4-BE49-F238E27FC236}">
-                <a16:creationId xmlns:a16="http://schemas.microsoft.com/office/drawing/2014/main" id="{3A896A68-633D-5E20-6A04-3CA136241A91}"/>
+          <p:cNvPr id="10" name="Picture 9">
+            <a:extLst>
+              <a:ext uri="{FF2B5EF4-FFF2-40B4-BE49-F238E27FC236}">
+                <a16:creationId xmlns:a16="http://schemas.microsoft.com/office/drawing/2014/main" id="{E204AC28-DA4F-2F92-F9D7-3ED7990315BB}"/>
               </a:ext>
             </a:extLst>
           </p:cNvPr>
@@ -4386,8 +5128,8 @@
         </p:blipFill>
         <p:spPr>
           <a:xfrm>
-            <a:off x="546375" y="1439883"/>
-            <a:ext cx="11099249" cy="4754224"/>
+            <a:off x="595863" y="1162838"/>
+            <a:ext cx="6291732" cy="4856962"/>
           </a:xfrm>
           <a:prstGeom prst="rect">
             <a:avLst/>
@@ -4397,7 +5139,973 @@
     </p:spTree>
     <p:extLst>
       <p:ext uri="{BB962C8B-B14F-4D97-AF65-F5344CB8AC3E}">
-        <p14:creationId xmlns:p14="http://schemas.microsoft.com/office/powerpoint/2010/main" val="1135089603"/>
+        <p14:creationId xmlns:p14="http://schemas.microsoft.com/office/powerpoint/2010/main" val="2367263751"/>
+      </p:ext>
+    </p:extLst>
+  </p:cSld>
+  <p:clrMapOvr>
+    <a:masterClrMapping/>
+  </p:clrMapOvr>
+</p:sld>
+</file>
+
+<file path=ppt/slides/slide11.xml><?xml version="1.0" encoding="utf-8"?>
+<p:sld xmlns:a="http://schemas.openxmlformats.org/drawingml/2006/main" xmlns:r="http://schemas.openxmlformats.org/officeDocument/2006/relationships" xmlns:p="http://schemas.openxmlformats.org/presentationml/2006/main">
+  <p:cSld>
+    <p:spTree>
+      <p:nvGrpSpPr>
+        <p:cNvPr id="1" name=""/>
+        <p:cNvGrpSpPr/>
+        <p:nvPr/>
+      </p:nvGrpSpPr>
+      <p:grpSpPr>
+        <a:xfrm>
+          <a:off x="0" y="0"/>
+          <a:ext cx="0" cy="0"/>
+          <a:chOff x="0" y="0"/>
+          <a:chExt cx="0" cy="0"/>
+        </a:xfrm>
+      </p:grpSpPr>
+      <p:sp>
+        <p:nvSpPr>
+          <p:cNvPr id="6" name="TextBox 5">
+            <a:extLst>
+              <a:ext uri="{FF2B5EF4-FFF2-40B4-BE49-F238E27FC236}">
+                <a16:creationId xmlns:a16="http://schemas.microsoft.com/office/drawing/2014/main" id="{82399533-CF94-A139-F2FC-278F96C80036}"/>
+              </a:ext>
+            </a:extLst>
+          </p:cNvPr>
+          <p:cNvSpPr txBox="1"/>
+          <p:nvPr/>
+        </p:nvSpPr>
+        <p:spPr>
+          <a:xfrm>
+            <a:off x="811763" y="317240"/>
+            <a:ext cx="3944862" cy="369332"/>
+          </a:xfrm>
+          <a:prstGeom prst="rect">
+            <a:avLst/>
+          </a:prstGeom>
+          <a:noFill/>
+        </p:spPr>
+        <p:txBody>
+          <a:bodyPr wrap="none" rtlCol="0">
+            <a:spAutoFit/>
+          </a:bodyPr>
+          <a:lstStyle/>
+          <a:p>
+            <a:r>
+              <a:rPr lang="en-GB" b="1" u="sng" dirty="0"/>
+              <a:t>Clustering Evaluation – Silhouette score</a:t>
+            </a:r>
+          </a:p>
+        </p:txBody>
+      </p:sp>
+      <p:sp>
+        <p:nvSpPr>
+          <p:cNvPr id="2" name="TextBox 1">
+            <a:extLst>
+              <a:ext uri="{FF2B5EF4-FFF2-40B4-BE49-F238E27FC236}">
+                <a16:creationId xmlns:a16="http://schemas.microsoft.com/office/drawing/2014/main" id="{D20C6C1B-3F2A-A938-F512-0ADD2B878896}"/>
+              </a:ext>
+            </a:extLst>
+          </p:cNvPr>
+          <p:cNvSpPr txBox="1"/>
+          <p:nvPr/>
+        </p:nvSpPr>
+        <p:spPr>
+          <a:xfrm>
+            <a:off x="6698863" y="1695839"/>
+            <a:ext cx="4432040" cy="1477328"/>
+          </a:xfrm>
+          <a:prstGeom prst="rect">
+            <a:avLst/>
+          </a:prstGeom>
+          <a:noFill/>
+        </p:spPr>
+        <p:txBody>
+          <a:bodyPr wrap="square" rtlCol="0">
+            <a:spAutoFit/>
+          </a:bodyPr>
+          <a:lstStyle/>
+          <a:p>
+            <a:pPr marL="285750" indent="-285750">
+              <a:buFont typeface="Arial" panose="020B0604020202020204" pitchFamily="34" charset="0"/>
+              <a:buChar char="•"/>
+            </a:pPr>
+            <a:r>
+              <a:rPr lang="en-GB" sz="1500" i="0" dirty="0">
+                <a:solidFill>
+                  <a:srgbClr val="000000"/>
+                </a:solidFill>
+                <a:effectLst/>
+                <a:latin typeface="Arial" panose="020B0604020202020204" pitchFamily="34" charset="0"/>
+                <a:cs typeface="Arial" panose="020B0604020202020204" pitchFamily="34" charset="0"/>
+              </a:rPr>
+              <a:t>Ratio of intra-cluster distances to inter-cluster distances.</a:t>
+            </a:r>
+          </a:p>
+          <a:p>
+            <a:pPr marL="285750" indent="-285750">
+              <a:buFont typeface="Arial" panose="020B0604020202020204" pitchFamily="34" charset="0"/>
+              <a:buChar char="•"/>
+            </a:pPr>
+            <a:endParaRPr lang="en-GB" sz="1500" i="0" dirty="0">
+              <a:solidFill>
+                <a:srgbClr val="000000"/>
+              </a:solidFill>
+              <a:effectLst/>
+              <a:latin typeface="Arial" panose="020B0604020202020204" pitchFamily="34" charset="0"/>
+              <a:cs typeface="Arial" panose="020B0604020202020204" pitchFamily="34" charset="0"/>
+            </a:endParaRPr>
+          </a:p>
+          <a:p>
+            <a:pPr marL="285750" indent="-285750">
+              <a:buFont typeface="Arial" panose="020B0604020202020204" pitchFamily="34" charset="0"/>
+              <a:buChar char="•"/>
+            </a:pPr>
+            <a:r>
+              <a:rPr lang="en-GB" sz="1500" dirty="0">
+                <a:solidFill>
+                  <a:srgbClr val="000000"/>
+                </a:solidFill>
+                <a:latin typeface="Arial" panose="020B0604020202020204" pitchFamily="34" charset="0"/>
+                <a:cs typeface="Arial" panose="020B0604020202020204" pitchFamily="34" charset="0"/>
+              </a:rPr>
+              <a:t>Silhouette indices closer to 1 indicate points are well-matched and similar to other points in the cluster.</a:t>
+            </a:r>
+            <a:endParaRPr lang="en-GB" sz="1500" dirty="0">
+              <a:latin typeface="Arial" panose="020B0604020202020204" pitchFamily="34" charset="0"/>
+              <a:cs typeface="Arial" panose="020B0604020202020204" pitchFamily="34" charset="0"/>
+            </a:endParaRPr>
+          </a:p>
+        </p:txBody>
+      </p:sp>
+      <p:pic>
+        <p:nvPicPr>
+          <p:cNvPr id="4" name="Picture 3">
+            <a:extLst>
+              <a:ext uri="{FF2B5EF4-FFF2-40B4-BE49-F238E27FC236}">
+                <a16:creationId xmlns:a16="http://schemas.microsoft.com/office/drawing/2014/main" id="{874CADDD-FCE0-B7FE-5291-B8C8DA247181}"/>
+              </a:ext>
+            </a:extLst>
+          </p:cNvPr>
+          <p:cNvPicPr>
+            <a:picLocks noChangeAspect="1"/>
+          </p:cNvPicPr>
+          <p:nvPr/>
+        </p:nvPicPr>
+        <p:blipFill>
+          <a:blip r:embed="rId2"/>
+          <a:stretch>
+            <a:fillRect/>
+          </a:stretch>
+        </p:blipFill>
+        <p:spPr>
+          <a:xfrm>
+            <a:off x="426097" y="1352939"/>
+            <a:ext cx="5600700" cy="4352925"/>
+          </a:xfrm>
+          <a:prstGeom prst="rect">
+            <a:avLst/>
+          </a:prstGeom>
+        </p:spPr>
+      </p:pic>
+    </p:spTree>
+    <p:extLst>
+      <p:ext uri="{BB962C8B-B14F-4D97-AF65-F5344CB8AC3E}">
+        <p14:creationId xmlns:p14="http://schemas.microsoft.com/office/powerpoint/2010/main" val="3482000773"/>
+      </p:ext>
+    </p:extLst>
+  </p:cSld>
+  <p:clrMapOvr>
+    <a:masterClrMapping/>
+  </p:clrMapOvr>
+</p:sld>
+</file>
+
+<file path=ppt/slides/slide12.xml><?xml version="1.0" encoding="utf-8"?>
+<p:sld xmlns:a="http://schemas.openxmlformats.org/drawingml/2006/main" xmlns:r="http://schemas.openxmlformats.org/officeDocument/2006/relationships" xmlns:p="http://schemas.openxmlformats.org/presentationml/2006/main">
+  <p:cSld>
+    <p:spTree>
+      <p:nvGrpSpPr>
+        <p:cNvPr id="1" name=""/>
+        <p:cNvGrpSpPr/>
+        <p:nvPr/>
+      </p:nvGrpSpPr>
+      <p:grpSpPr>
+        <a:xfrm>
+          <a:off x="0" y="0"/>
+          <a:ext cx="0" cy="0"/>
+          <a:chOff x="0" y="0"/>
+          <a:chExt cx="0" cy="0"/>
+        </a:xfrm>
+      </p:grpSpPr>
+      <p:sp>
+        <p:nvSpPr>
+          <p:cNvPr id="6" name="TextBox 5">
+            <a:extLst>
+              <a:ext uri="{FF2B5EF4-FFF2-40B4-BE49-F238E27FC236}">
+                <a16:creationId xmlns:a16="http://schemas.microsoft.com/office/drawing/2014/main" id="{82399533-CF94-A139-F2FC-278F96C80036}"/>
+              </a:ext>
+            </a:extLst>
+          </p:cNvPr>
+          <p:cNvSpPr txBox="1"/>
+          <p:nvPr/>
+        </p:nvSpPr>
+        <p:spPr>
+          <a:xfrm>
+            <a:off x="811763" y="317240"/>
+            <a:ext cx="1107804" cy="369332"/>
+          </a:xfrm>
+          <a:prstGeom prst="rect">
+            <a:avLst/>
+          </a:prstGeom>
+          <a:noFill/>
+        </p:spPr>
+        <p:txBody>
+          <a:bodyPr wrap="none" rtlCol="0">
+            <a:spAutoFit/>
+          </a:bodyPr>
+          <a:lstStyle/>
+          <a:p>
+            <a:r>
+              <a:rPr lang="en-GB" b="1" u="sng" dirty="0"/>
+              <a:t>5 Clusters</a:t>
+            </a:r>
+          </a:p>
+        </p:txBody>
+      </p:sp>
+      <p:sp>
+        <p:nvSpPr>
+          <p:cNvPr id="11" name="TextBox 10">
+            <a:extLst>
+              <a:ext uri="{FF2B5EF4-FFF2-40B4-BE49-F238E27FC236}">
+                <a16:creationId xmlns:a16="http://schemas.microsoft.com/office/drawing/2014/main" id="{55796F3B-8240-346E-FCE9-81EF397A4281}"/>
+              </a:ext>
+            </a:extLst>
+          </p:cNvPr>
+          <p:cNvSpPr txBox="1"/>
+          <p:nvPr/>
+        </p:nvSpPr>
+        <p:spPr>
+          <a:xfrm>
+            <a:off x="7265820" y="929371"/>
+            <a:ext cx="4492367" cy="646331"/>
+          </a:xfrm>
+          <a:prstGeom prst="rect">
+            <a:avLst/>
+          </a:prstGeom>
+          <a:noFill/>
+        </p:spPr>
+        <p:txBody>
+          <a:bodyPr wrap="square" rtlCol="0">
+            <a:spAutoFit/>
+          </a:bodyPr>
+          <a:lstStyle/>
+          <a:p>
+            <a:endParaRPr lang="en-GB" dirty="0"/>
+          </a:p>
+          <a:p>
+            <a:pPr marL="285750" indent="-285750">
+              <a:buFont typeface="Arial" panose="020B0604020202020204" pitchFamily="34" charset="0"/>
+              <a:buChar char="•"/>
+            </a:pPr>
+            <a:endParaRPr lang="en-GB" dirty="0"/>
+          </a:p>
+        </p:txBody>
+      </p:sp>
+      <p:sp>
+        <p:nvSpPr>
+          <p:cNvPr id="2" name="TextBox 1">
+            <a:extLst>
+              <a:ext uri="{FF2B5EF4-FFF2-40B4-BE49-F238E27FC236}">
+                <a16:creationId xmlns:a16="http://schemas.microsoft.com/office/drawing/2014/main" id="{C0A6A4AE-127D-DFA1-612E-B4834CFE853F}"/>
+              </a:ext>
+            </a:extLst>
+          </p:cNvPr>
+          <p:cNvSpPr txBox="1"/>
+          <p:nvPr/>
+        </p:nvSpPr>
+        <p:spPr>
+          <a:xfrm>
+            <a:off x="7265820" y="1081771"/>
+            <a:ext cx="4492367" cy="2031325"/>
+          </a:xfrm>
+          <a:prstGeom prst="rect">
+            <a:avLst/>
+          </a:prstGeom>
+          <a:noFill/>
+        </p:spPr>
+        <p:txBody>
+          <a:bodyPr wrap="square" rtlCol="0">
+            <a:spAutoFit/>
+          </a:bodyPr>
+          <a:lstStyle/>
+          <a:p>
+            <a:pPr marL="285750" indent="-285750">
+              <a:buFont typeface="Arial" panose="020B0604020202020204" pitchFamily="34" charset="0"/>
+              <a:buChar char="•"/>
+            </a:pPr>
+            <a:r>
+              <a:rPr lang="en-GB" dirty="0"/>
+              <a:t>Most individuals in core clusters 1 and 2.</a:t>
+            </a:r>
+          </a:p>
+          <a:p>
+            <a:pPr marL="285750" indent="-285750">
+              <a:buFont typeface="Arial" panose="020B0604020202020204" pitchFamily="34" charset="0"/>
+              <a:buChar char="•"/>
+            </a:pPr>
+            <a:endParaRPr lang="en-GB" dirty="0"/>
+          </a:p>
+          <a:p>
+            <a:pPr marL="285750" indent="-285750">
+              <a:buFont typeface="Arial" panose="020B0604020202020204" pitchFamily="34" charset="0"/>
+              <a:buChar char="•"/>
+            </a:pPr>
+            <a:r>
+              <a:rPr lang="en-GB" dirty="0"/>
+              <a:t>Minor clusters in 3.</a:t>
+            </a:r>
+          </a:p>
+          <a:p>
+            <a:pPr marL="285750" indent="-285750">
+              <a:buFont typeface="Arial" panose="020B0604020202020204" pitchFamily="34" charset="0"/>
+              <a:buChar char="•"/>
+            </a:pPr>
+            <a:endParaRPr lang="en-GB" dirty="0"/>
+          </a:p>
+          <a:p>
+            <a:pPr marL="285750" indent="-285750">
+              <a:buFont typeface="Arial" panose="020B0604020202020204" pitchFamily="34" charset="0"/>
+              <a:buChar char="•"/>
+            </a:pPr>
+            <a:r>
+              <a:rPr lang="en-GB" i="1" dirty="0"/>
+              <a:t>2 core clusters and 1 minor clusters.</a:t>
+            </a:r>
+          </a:p>
+          <a:p>
+            <a:pPr marL="285750" indent="-285750">
+              <a:buFont typeface="Arial" panose="020B0604020202020204" pitchFamily="34" charset="0"/>
+              <a:buChar char="•"/>
+            </a:pPr>
+            <a:endParaRPr lang="en-GB" dirty="0"/>
+          </a:p>
+          <a:p>
+            <a:pPr marL="285750" indent="-285750">
+              <a:buFont typeface="Arial" panose="020B0604020202020204" pitchFamily="34" charset="0"/>
+              <a:buChar char="•"/>
+            </a:pPr>
+            <a:endParaRPr lang="en-GB" dirty="0"/>
+          </a:p>
+        </p:txBody>
+      </p:sp>
+      <p:pic>
+        <p:nvPicPr>
+          <p:cNvPr id="5" name="Picture 4">
+            <a:extLst>
+              <a:ext uri="{FF2B5EF4-FFF2-40B4-BE49-F238E27FC236}">
+                <a16:creationId xmlns:a16="http://schemas.microsoft.com/office/drawing/2014/main" id="{D78BE0E9-14F8-1CE3-07B6-4DBF0241D14B}"/>
+              </a:ext>
+            </a:extLst>
+          </p:cNvPr>
+          <p:cNvPicPr>
+            <a:picLocks noChangeAspect="1"/>
+          </p:cNvPicPr>
+          <p:nvPr/>
+        </p:nvPicPr>
+        <p:blipFill>
+          <a:blip r:embed="rId2"/>
+          <a:stretch>
+            <a:fillRect/>
+          </a:stretch>
+        </p:blipFill>
+        <p:spPr>
+          <a:xfrm>
+            <a:off x="584200" y="1235690"/>
+            <a:ext cx="5638800" cy="4386620"/>
+          </a:xfrm>
+          <a:prstGeom prst="rect">
+            <a:avLst/>
+          </a:prstGeom>
+        </p:spPr>
+      </p:pic>
+    </p:spTree>
+    <p:extLst>
+      <p:ext uri="{BB962C8B-B14F-4D97-AF65-F5344CB8AC3E}">
+        <p14:creationId xmlns:p14="http://schemas.microsoft.com/office/powerpoint/2010/main" val="1801552924"/>
+      </p:ext>
+    </p:extLst>
+  </p:cSld>
+  <p:clrMapOvr>
+    <a:masterClrMapping/>
+  </p:clrMapOvr>
+</p:sld>
+</file>
+
+<file path=ppt/slides/slide13.xml><?xml version="1.0" encoding="utf-8"?>
+<p:sld xmlns:a="http://schemas.openxmlformats.org/drawingml/2006/main" xmlns:r="http://schemas.openxmlformats.org/officeDocument/2006/relationships" xmlns:p="http://schemas.openxmlformats.org/presentationml/2006/main">
+  <p:cSld>
+    <p:spTree>
+      <p:nvGrpSpPr>
+        <p:cNvPr id="1" name=""/>
+        <p:cNvGrpSpPr/>
+        <p:nvPr/>
+      </p:nvGrpSpPr>
+      <p:grpSpPr>
+        <a:xfrm>
+          <a:off x="0" y="0"/>
+          <a:ext cx="0" cy="0"/>
+          <a:chOff x="0" y="0"/>
+          <a:chExt cx="0" cy="0"/>
+        </a:xfrm>
+      </p:grpSpPr>
+      <p:sp>
+        <p:nvSpPr>
+          <p:cNvPr id="6" name="TextBox 5">
+            <a:extLst>
+              <a:ext uri="{FF2B5EF4-FFF2-40B4-BE49-F238E27FC236}">
+                <a16:creationId xmlns:a16="http://schemas.microsoft.com/office/drawing/2014/main" id="{82399533-CF94-A139-F2FC-278F96C80036}"/>
+              </a:ext>
+            </a:extLst>
+          </p:cNvPr>
+          <p:cNvSpPr txBox="1"/>
+          <p:nvPr/>
+        </p:nvSpPr>
+        <p:spPr>
+          <a:xfrm>
+            <a:off x="811763" y="317240"/>
+            <a:ext cx="1107804" cy="369332"/>
+          </a:xfrm>
+          <a:prstGeom prst="rect">
+            <a:avLst/>
+          </a:prstGeom>
+          <a:noFill/>
+        </p:spPr>
+        <p:txBody>
+          <a:bodyPr wrap="none" rtlCol="0">
+            <a:spAutoFit/>
+          </a:bodyPr>
+          <a:lstStyle/>
+          <a:p>
+            <a:r>
+              <a:rPr lang="en-GB" b="1" u="sng" dirty="0"/>
+              <a:t>3 Clusters</a:t>
+            </a:r>
+          </a:p>
+        </p:txBody>
+      </p:sp>
+      <p:sp>
+        <p:nvSpPr>
+          <p:cNvPr id="11" name="TextBox 10">
+            <a:extLst>
+              <a:ext uri="{FF2B5EF4-FFF2-40B4-BE49-F238E27FC236}">
+                <a16:creationId xmlns:a16="http://schemas.microsoft.com/office/drawing/2014/main" id="{55796F3B-8240-346E-FCE9-81EF397A4281}"/>
+              </a:ext>
+            </a:extLst>
+          </p:cNvPr>
+          <p:cNvSpPr txBox="1"/>
+          <p:nvPr/>
+        </p:nvSpPr>
+        <p:spPr>
+          <a:xfrm>
+            <a:off x="7377580" y="606206"/>
+            <a:ext cx="4492367" cy="646331"/>
+          </a:xfrm>
+          <a:prstGeom prst="rect">
+            <a:avLst/>
+          </a:prstGeom>
+          <a:noFill/>
+        </p:spPr>
+        <p:txBody>
+          <a:bodyPr wrap="square" rtlCol="0">
+            <a:spAutoFit/>
+          </a:bodyPr>
+          <a:lstStyle/>
+          <a:p>
+            <a:endParaRPr lang="en-GB" dirty="0"/>
+          </a:p>
+          <a:p>
+            <a:pPr marL="285750" indent="-285750">
+              <a:buFont typeface="Arial" panose="020B0604020202020204" pitchFamily="34" charset="0"/>
+              <a:buChar char="•"/>
+            </a:pPr>
+            <a:endParaRPr lang="en-GB" dirty="0"/>
+          </a:p>
+        </p:txBody>
+      </p:sp>
+      <p:sp>
+        <p:nvSpPr>
+          <p:cNvPr id="2" name="TextBox 1">
+            <a:extLst>
+              <a:ext uri="{FF2B5EF4-FFF2-40B4-BE49-F238E27FC236}">
+                <a16:creationId xmlns:a16="http://schemas.microsoft.com/office/drawing/2014/main" id="{C0A6A4AE-127D-DFA1-612E-B4834CFE853F}"/>
+              </a:ext>
+            </a:extLst>
+          </p:cNvPr>
+          <p:cNvSpPr txBox="1"/>
+          <p:nvPr/>
+        </p:nvSpPr>
+        <p:spPr>
+          <a:xfrm>
+            <a:off x="7093000" y="1084586"/>
+            <a:ext cx="4492367" cy="3323987"/>
+          </a:xfrm>
+          <a:prstGeom prst="rect">
+            <a:avLst/>
+          </a:prstGeom>
+          <a:noFill/>
+        </p:spPr>
+        <p:txBody>
+          <a:bodyPr wrap="square" rtlCol="0">
+            <a:spAutoFit/>
+          </a:bodyPr>
+          <a:lstStyle/>
+          <a:p>
+            <a:r>
+              <a:rPr lang="en-GB" sz="1500" b="1" u="sng" dirty="0"/>
+              <a:t>Major clusters (1,2)</a:t>
+            </a:r>
+          </a:p>
+          <a:p>
+            <a:endParaRPr lang="en-GB" sz="1500" b="1" dirty="0"/>
+          </a:p>
+          <a:p>
+            <a:pPr marL="285750" indent="-285750">
+              <a:buFont typeface="Arial" panose="020B0604020202020204" pitchFamily="34" charset="0"/>
+              <a:buChar char="•"/>
+            </a:pPr>
+            <a:r>
+              <a:rPr lang="en-GB" sz="1500" b="1" dirty="0"/>
+              <a:t>2</a:t>
+            </a:r>
+            <a:r>
+              <a:rPr lang="en-GB" sz="1500" dirty="0"/>
+              <a:t>: Below average on all metrics.</a:t>
+            </a:r>
+          </a:p>
+          <a:p>
+            <a:pPr marL="285750" indent="-285750">
+              <a:buFont typeface="Arial" panose="020B0604020202020204" pitchFamily="34" charset="0"/>
+              <a:buChar char="•"/>
+            </a:pPr>
+            <a:r>
+              <a:rPr lang="en-GB" sz="1500" b="1" dirty="0"/>
+              <a:t>1</a:t>
+            </a:r>
+            <a:r>
+              <a:rPr lang="en-GB" sz="1500" dirty="0"/>
+              <a:t>: Above average frequency and monetary spend, low recency.</a:t>
+            </a:r>
+          </a:p>
+          <a:p>
+            <a:endParaRPr lang="en-GB" sz="1500" dirty="0"/>
+          </a:p>
+          <a:p>
+            <a:r>
+              <a:rPr lang="en-GB" sz="1500" b="1" u="sng" dirty="0"/>
+              <a:t>Minor clusters (3,4)</a:t>
+            </a:r>
+          </a:p>
+          <a:p>
+            <a:endParaRPr lang="en-GB" sz="1500" dirty="0"/>
+          </a:p>
+          <a:p>
+            <a:pPr marL="285750" indent="-285750">
+              <a:buFont typeface="Arial" panose="020B0604020202020204" pitchFamily="34" charset="0"/>
+              <a:buChar char="•"/>
+            </a:pPr>
+            <a:r>
+              <a:rPr lang="en-GB" sz="1500" b="1" dirty="0"/>
+              <a:t>3</a:t>
+            </a:r>
+            <a:r>
+              <a:rPr lang="en-GB" sz="1500" dirty="0"/>
+              <a:t>: Below-average frequency, average monetary spend </a:t>
+            </a:r>
+            <a:r>
+              <a:rPr lang="en-GB" sz="1500" i="1" dirty="0"/>
+              <a:t>and high recency.</a:t>
+            </a:r>
+          </a:p>
+          <a:p>
+            <a:endParaRPr lang="en-GB" sz="1500" dirty="0"/>
+          </a:p>
+          <a:p>
+            <a:r>
+              <a:rPr lang="en-GB" sz="1500" dirty="0"/>
+              <a:t>Minor clusters are quite similar apart from the fact that they differ on how recently they have made transactions.</a:t>
+            </a:r>
+          </a:p>
+        </p:txBody>
+      </p:sp>
+      <p:pic>
+        <p:nvPicPr>
+          <p:cNvPr id="4" name="Picture 3">
+            <a:extLst>
+              <a:ext uri="{FF2B5EF4-FFF2-40B4-BE49-F238E27FC236}">
+                <a16:creationId xmlns:a16="http://schemas.microsoft.com/office/drawing/2014/main" id="{AC3E61C7-8FCD-5C66-DFB7-9D6EB485AB52}"/>
+              </a:ext>
+            </a:extLst>
+          </p:cNvPr>
+          <p:cNvPicPr>
+            <a:picLocks noChangeAspect="1"/>
+          </p:cNvPicPr>
+          <p:nvPr/>
+        </p:nvPicPr>
+        <p:blipFill>
+          <a:blip r:embed="rId2"/>
+          <a:stretch>
+            <a:fillRect/>
+          </a:stretch>
+        </p:blipFill>
+        <p:spPr>
+          <a:xfrm>
+            <a:off x="425450" y="1440642"/>
+            <a:ext cx="6210300" cy="4352925"/>
+          </a:xfrm>
+          <a:prstGeom prst="rect">
+            <a:avLst/>
+          </a:prstGeom>
+        </p:spPr>
+      </p:pic>
+    </p:spTree>
+    <p:extLst>
+      <p:ext uri="{BB962C8B-B14F-4D97-AF65-F5344CB8AC3E}">
+        <p14:creationId xmlns:p14="http://schemas.microsoft.com/office/powerpoint/2010/main" val="3941756674"/>
+      </p:ext>
+    </p:extLst>
+  </p:cSld>
+  <p:clrMapOvr>
+    <a:masterClrMapping/>
+  </p:clrMapOvr>
+</p:sld>
+</file>
+
+<file path=ppt/slides/slide14.xml><?xml version="1.0" encoding="utf-8"?>
+<p:sld xmlns:a="http://schemas.openxmlformats.org/drawingml/2006/main" xmlns:r="http://schemas.openxmlformats.org/officeDocument/2006/relationships" xmlns:p="http://schemas.openxmlformats.org/presentationml/2006/main">
+  <p:cSld>
+    <p:spTree>
+      <p:nvGrpSpPr>
+        <p:cNvPr id="1" name=""/>
+        <p:cNvGrpSpPr/>
+        <p:nvPr/>
+      </p:nvGrpSpPr>
+      <p:grpSpPr>
+        <a:xfrm>
+          <a:off x="0" y="0"/>
+          <a:ext cx="0" cy="0"/>
+          <a:chOff x="0" y="0"/>
+          <a:chExt cx="0" cy="0"/>
+        </a:xfrm>
+      </p:grpSpPr>
+      <p:sp>
+        <p:nvSpPr>
+          <p:cNvPr id="6" name="TextBox 5">
+            <a:extLst>
+              <a:ext uri="{FF2B5EF4-FFF2-40B4-BE49-F238E27FC236}">
+                <a16:creationId xmlns:a16="http://schemas.microsoft.com/office/drawing/2014/main" id="{82399533-CF94-A139-F2FC-278F96C80036}"/>
+              </a:ext>
+            </a:extLst>
+          </p:cNvPr>
+          <p:cNvSpPr txBox="1"/>
+          <p:nvPr/>
+        </p:nvSpPr>
+        <p:spPr>
+          <a:xfrm>
+            <a:off x="811763" y="317240"/>
+            <a:ext cx="1107804" cy="369332"/>
+          </a:xfrm>
+          <a:prstGeom prst="rect">
+            <a:avLst/>
+          </a:prstGeom>
+          <a:noFill/>
+        </p:spPr>
+        <p:txBody>
+          <a:bodyPr wrap="none" rtlCol="0">
+            <a:spAutoFit/>
+          </a:bodyPr>
+          <a:lstStyle/>
+          <a:p>
+            <a:r>
+              <a:rPr lang="en-GB" b="1" u="sng" dirty="0"/>
+              <a:t>3 Clusters</a:t>
+            </a:r>
+          </a:p>
+        </p:txBody>
+      </p:sp>
+      <p:sp>
+        <p:nvSpPr>
+          <p:cNvPr id="2" name="TextBox 1">
+            <a:extLst>
+              <a:ext uri="{FF2B5EF4-FFF2-40B4-BE49-F238E27FC236}">
+                <a16:creationId xmlns:a16="http://schemas.microsoft.com/office/drawing/2014/main" id="{C0A6A4AE-127D-DFA1-612E-B4834CFE853F}"/>
+              </a:ext>
+            </a:extLst>
+          </p:cNvPr>
+          <p:cNvSpPr txBox="1"/>
+          <p:nvPr/>
+        </p:nvSpPr>
+        <p:spPr>
+          <a:xfrm>
+            <a:off x="811763" y="4285266"/>
+            <a:ext cx="10604054" cy="2031325"/>
+          </a:xfrm>
+          <a:prstGeom prst="rect">
+            <a:avLst/>
+          </a:prstGeom>
+          <a:noFill/>
+        </p:spPr>
+        <p:txBody>
+          <a:bodyPr wrap="square" rtlCol="0">
+            <a:spAutoFit/>
+          </a:bodyPr>
+          <a:lstStyle/>
+          <a:p>
+            <a:pPr marL="285750" indent="-285750">
+              <a:buFont typeface="Arial" panose="020B0604020202020204" pitchFamily="34" charset="0"/>
+              <a:buChar char="•"/>
+            </a:pPr>
+            <a:r>
+              <a:rPr lang="en-GB" dirty="0"/>
+              <a:t>Low variance around monetary spend.</a:t>
+            </a:r>
+          </a:p>
+          <a:p>
+            <a:pPr marL="285750" indent="-285750">
+              <a:buFont typeface="Arial" panose="020B0604020202020204" pitchFamily="34" charset="0"/>
+              <a:buChar char="•"/>
+            </a:pPr>
+            <a:endParaRPr lang="en-GB" dirty="0"/>
+          </a:p>
+          <a:p>
+            <a:pPr marL="285750" indent="-285750">
+              <a:buFont typeface="Arial" panose="020B0604020202020204" pitchFamily="34" charset="0"/>
+              <a:buChar char="•"/>
+            </a:pPr>
+            <a:r>
+              <a:rPr lang="en-GB" dirty="0"/>
+              <a:t>Many customers are relatively infrequent spenders with one cluster where frequency of transactions is high.</a:t>
+            </a:r>
+          </a:p>
+          <a:p>
+            <a:pPr marL="285750" indent="-285750">
+              <a:buFont typeface="Arial" panose="020B0604020202020204" pitchFamily="34" charset="0"/>
+              <a:buChar char="•"/>
+            </a:pPr>
+            <a:endParaRPr lang="en-GB" dirty="0"/>
+          </a:p>
+          <a:p>
+            <a:pPr marL="285750" indent="-285750">
+              <a:buFont typeface="Arial" panose="020B0604020202020204" pitchFamily="34" charset="0"/>
+              <a:buChar char="•"/>
+            </a:pPr>
+            <a:r>
+              <a:rPr lang="en-GB" dirty="0"/>
+              <a:t>2 Clusters with highly above average recency – spending very close up until the end of the year. </a:t>
+            </a:r>
+          </a:p>
+          <a:p>
+            <a:pPr marL="285750" indent="-285750">
+              <a:buFont typeface="Arial" panose="020B0604020202020204" pitchFamily="34" charset="0"/>
+              <a:buChar char="•"/>
+            </a:pPr>
+            <a:endParaRPr lang="en-GB" dirty="0"/>
+          </a:p>
+          <a:p>
+            <a:pPr marL="285750" indent="-285750">
+              <a:buFont typeface="Arial" panose="020B0604020202020204" pitchFamily="34" charset="0"/>
+              <a:buChar char="•"/>
+            </a:pPr>
+            <a:endParaRPr lang="en-GB" dirty="0"/>
+          </a:p>
+        </p:txBody>
+      </p:sp>
+      <p:pic>
+        <p:nvPicPr>
+          <p:cNvPr id="4" name="Picture 3">
+            <a:extLst>
+              <a:ext uri="{FF2B5EF4-FFF2-40B4-BE49-F238E27FC236}">
+                <a16:creationId xmlns:a16="http://schemas.microsoft.com/office/drawing/2014/main" id="{B9264DEF-5AEE-9E60-978A-3E5C8554768E}"/>
+              </a:ext>
+            </a:extLst>
+          </p:cNvPr>
+          <p:cNvPicPr>
+            <a:picLocks noChangeAspect="1"/>
+          </p:cNvPicPr>
+          <p:nvPr/>
+        </p:nvPicPr>
+        <p:blipFill>
+          <a:blip r:embed="rId2"/>
+          <a:stretch>
+            <a:fillRect/>
+          </a:stretch>
+        </p:blipFill>
+        <p:spPr>
+          <a:xfrm>
+            <a:off x="1244599" y="928687"/>
+            <a:ext cx="8634565" cy="2944813"/>
+          </a:xfrm>
+          <a:prstGeom prst="rect">
+            <a:avLst/>
+          </a:prstGeom>
+        </p:spPr>
+      </p:pic>
+    </p:spTree>
+    <p:extLst>
+      <p:ext uri="{BB962C8B-B14F-4D97-AF65-F5344CB8AC3E}">
+        <p14:creationId xmlns:p14="http://schemas.microsoft.com/office/powerpoint/2010/main" val="2482075166"/>
+      </p:ext>
+    </p:extLst>
+  </p:cSld>
+  <p:clrMapOvr>
+    <a:masterClrMapping/>
+  </p:clrMapOvr>
+</p:sld>
+</file>
+
+<file path=ppt/slides/slide15.xml><?xml version="1.0" encoding="utf-8"?>
+<p:sld xmlns:a="http://schemas.openxmlformats.org/drawingml/2006/main" xmlns:r="http://schemas.openxmlformats.org/officeDocument/2006/relationships" xmlns:p="http://schemas.openxmlformats.org/presentationml/2006/main">
+  <p:cSld>
+    <p:spTree>
+      <p:nvGrpSpPr>
+        <p:cNvPr id="1" name=""/>
+        <p:cNvGrpSpPr/>
+        <p:nvPr/>
+      </p:nvGrpSpPr>
+      <p:grpSpPr>
+        <a:xfrm>
+          <a:off x="0" y="0"/>
+          <a:ext cx="0" cy="0"/>
+          <a:chOff x="0" y="0"/>
+          <a:chExt cx="0" cy="0"/>
+        </a:xfrm>
+      </p:grpSpPr>
+      <p:sp>
+        <p:nvSpPr>
+          <p:cNvPr id="3" name="Content Placeholder 2">
+            <a:extLst>
+              <a:ext uri="{FF2B5EF4-FFF2-40B4-BE49-F238E27FC236}">
+                <a16:creationId xmlns:a16="http://schemas.microsoft.com/office/drawing/2014/main" id="{F52D78B5-F45F-9C0A-0C97-7CBE40AC76E9}"/>
+              </a:ext>
+            </a:extLst>
+          </p:cNvPr>
+          <p:cNvSpPr>
+            <a:spLocks noGrp="1"/>
+          </p:cNvSpPr>
+          <p:nvPr>
+            <p:ph idx="1"/>
+          </p:nvPr>
+        </p:nvSpPr>
+        <p:spPr>
+          <a:xfrm>
+            <a:off x="723900" y="289560"/>
+            <a:ext cx="10629900" cy="5887403"/>
+          </a:xfrm>
+        </p:spPr>
+        <p:txBody>
+          <a:bodyPr>
+            <a:normAutofit/>
+          </a:bodyPr>
+          <a:lstStyle/>
+          <a:p>
+            <a:pPr marL="0" indent="0">
+              <a:buNone/>
+            </a:pPr>
+            <a:r>
+              <a:rPr lang="en-GB" sz="2000" u="sng" dirty="0"/>
+              <a:t>Potential issues with this approach</a:t>
+            </a:r>
+          </a:p>
+          <a:p>
+            <a:pPr marL="0" indent="0">
+              <a:buNone/>
+            </a:pPr>
+            <a:endParaRPr lang="en-GB" sz="2000" u="sng" dirty="0"/>
+          </a:p>
+          <a:p>
+            <a:pPr marL="0" indent="0">
+              <a:buNone/>
+            </a:pPr>
+            <a:r>
+              <a:rPr lang="en-GB" sz="1500" b="1" dirty="0"/>
+              <a:t>K-Means</a:t>
+            </a:r>
+          </a:p>
+          <a:p>
+            <a:r>
+              <a:rPr lang="en-GB" sz="1500" dirty="0"/>
+              <a:t>Heavily dependant on random initialisation of centroids in order to converge to an optimal solution – </a:t>
+            </a:r>
+            <a:r>
+              <a:rPr lang="en-GB" sz="1500" i="1" dirty="0"/>
+              <a:t>k-means++ algorithm</a:t>
+            </a:r>
+            <a:r>
+              <a:rPr lang="en-GB" sz="1500" dirty="0"/>
+              <a:t> solves this.</a:t>
+            </a:r>
+          </a:p>
+          <a:p>
+            <a:r>
+              <a:rPr lang="en-GB" sz="1500" dirty="0"/>
+              <a:t>Assumes clusters belong within a radial distance from a centroid – ‘spherical’ clusters.</a:t>
+            </a:r>
+          </a:p>
+          <a:p>
+            <a:r>
+              <a:rPr lang="en-GB" sz="1500" dirty="0"/>
+              <a:t>Ignores density of clusters. E.g. disparate clusters with a high densities of points may be drawn into a single cluster with a centroid between them.</a:t>
+            </a:r>
+          </a:p>
+          <a:p>
+            <a:r>
+              <a:rPr lang="en-GB" sz="1500" dirty="0"/>
+              <a:t>No mechanism for detecting outliers or uncertainties for points in overlapping clusters.</a:t>
+            </a:r>
+          </a:p>
+          <a:p>
+            <a:r>
+              <a:rPr lang="en-GB" sz="1500" dirty="0"/>
+              <a:t>Have to interpret the clusters numbers and almost manually select the number of clusters.</a:t>
+            </a:r>
+          </a:p>
+          <a:p>
+            <a:endParaRPr lang="en-GB" sz="1500" dirty="0"/>
+          </a:p>
+          <a:p>
+            <a:endParaRPr lang="en-GB" sz="1500" dirty="0"/>
+          </a:p>
+          <a:p>
+            <a:pPr marL="0" indent="0">
+              <a:buNone/>
+            </a:pPr>
+            <a:r>
+              <a:rPr lang="en-GB" sz="1500" b="1" dirty="0"/>
+              <a:t>RFM Analysis</a:t>
+            </a:r>
+          </a:p>
+          <a:p>
+            <a:r>
+              <a:rPr lang="en-GB" sz="1500" dirty="0"/>
+              <a:t>Clustering RFM scores was unable to infer in differences per category spend amongst the accounts available </a:t>
+            </a:r>
+            <a:r>
+              <a:rPr lang="en-GB" sz="1500" dirty="0">
+                <a:sym typeface="Wingdings" panose="05000000000000000000" pitchFamily="2" charset="2"/>
+              </a:rPr>
+              <a:t> Need another approach to be able to understand consumer behaviour in order to create targeted approaches.</a:t>
+            </a:r>
+            <a:endParaRPr lang="en-GB" sz="1500" dirty="0"/>
+          </a:p>
+        </p:txBody>
+      </p:sp>
+    </p:spTree>
+    <p:extLst>
+      <p:ext uri="{BB962C8B-B14F-4D97-AF65-F5344CB8AC3E}">
+        <p14:creationId xmlns:p14="http://schemas.microsoft.com/office/powerpoint/2010/main" val="4199166108"/>
       </p:ext>
     </p:extLst>
   </p:cSld>
@@ -4459,12 +6167,92 @@
           </a:p>
         </p:txBody>
       </p:sp>
+      <p:sp>
+        <p:nvSpPr>
+          <p:cNvPr id="2" name="TextBox 1">
+            <a:extLst>
+              <a:ext uri="{FF2B5EF4-FFF2-40B4-BE49-F238E27FC236}">
+                <a16:creationId xmlns:a16="http://schemas.microsoft.com/office/drawing/2014/main" id="{D20C6C1B-3F2A-A938-F512-0ADD2B878896}"/>
+              </a:ext>
+            </a:extLst>
+          </p:cNvPr>
+          <p:cNvSpPr txBox="1"/>
+          <p:nvPr/>
+        </p:nvSpPr>
+        <p:spPr>
+          <a:xfrm>
+            <a:off x="7333863" y="1352939"/>
+            <a:ext cx="4432040" cy="1477328"/>
+          </a:xfrm>
+          <a:prstGeom prst="rect">
+            <a:avLst/>
+          </a:prstGeom>
+          <a:noFill/>
+        </p:spPr>
+        <p:txBody>
+          <a:bodyPr wrap="square" rtlCol="0">
+            <a:spAutoFit/>
+          </a:bodyPr>
+          <a:lstStyle/>
+          <a:p>
+            <a:pPr marL="285750" indent="-285750">
+              <a:buFont typeface="Arial" panose="020B0604020202020204" pitchFamily="34" charset="0"/>
+              <a:buChar char="•"/>
+            </a:pPr>
+            <a:r>
+              <a:rPr lang="en-GB" sz="1500" i="0" dirty="0">
+                <a:solidFill>
+                  <a:srgbClr val="000000"/>
+                </a:solidFill>
+                <a:effectLst/>
+                <a:latin typeface="Arial" panose="020B0604020202020204" pitchFamily="34" charset="0"/>
+                <a:cs typeface="Arial" panose="020B0604020202020204" pitchFamily="34" charset="0"/>
+              </a:rPr>
+              <a:t>Ratio of intra-cluster distances to inter-cluster distances.</a:t>
+            </a:r>
+          </a:p>
+          <a:p>
+            <a:pPr marL="285750" indent="-285750">
+              <a:buFont typeface="Arial" panose="020B0604020202020204" pitchFamily="34" charset="0"/>
+              <a:buChar char="•"/>
+            </a:pPr>
+            <a:endParaRPr lang="en-GB" sz="1500" i="0" dirty="0">
+              <a:solidFill>
+                <a:srgbClr val="000000"/>
+              </a:solidFill>
+              <a:effectLst/>
+              <a:latin typeface="Arial" panose="020B0604020202020204" pitchFamily="34" charset="0"/>
+              <a:cs typeface="Arial" panose="020B0604020202020204" pitchFamily="34" charset="0"/>
+            </a:endParaRPr>
+          </a:p>
+          <a:p>
+            <a:pPr marL="285750" indent="-285750">
+              <a:buFont typeface="Arial" panose="020B0604020202020204" pitchFamily="34" charset="0"/>
+              <a:buChar char="•"/>
+            </a:pPr>
+            <a:r>
+              <a:rPr lang="en-GB" sz="1500" dirty="0">
+                <a:solidFill>
+                  <a:srgbClr val="000000"/>
+                </a:solidFill>
+                <a:latin typeface="Arial" panose="020B0604020202020204" pitchFamily="34" charset="0"/>
+                <a:cs typeface="Arial" panose="020B0604020202020204" pitchFamily="34" charset="0"/>
+              </a:rPr>
+              <a:t>Silhouette indices closer to 1 indicate points are well-matched and similar to other points in the cluster.</a:t>
+            </a:r>
+            <a:endParaRPr lang="en-GB" sz="1500" dirty="0">
+              <a:latin typeface="Arial" panose="020B0604020202020204" pitchFamily="34" charset="0"/>
+              <a:cs typeface="Arial" panose="020B0604020202020204" pitchFamily="34" charset="0"/>
+            </a:endParaRPr>
+          </a:p>
+        </p:txBody>
+      </p:sp>
       <p:pic>
         <p:nvPicPr>
-          <p:cNvPr id="7" name="Picture 6">
-            <a:extLst>
-              <a:ext uri="{FF2B5EF4-FFF2-40B4-BE49-F238E27FC236}">
-                <a16:creationId xmlns:a16="http://schemas.microsoft.com/office/drawing/2014/main" id="{35973134-EA02-BD77-A7CA-6A534D78AA31}"/>
+          <p:cNvPr id="5" name="Picture 4">
+            <a:extLst>
+              <a:ext uri="{FF2B5EF4-FFF2-40B4-BE49-F238E27FC236}">
+                <a16:creationId xmlns:a16="http://schemas.microsoft.com/office/drawing/2014/main" id="{87905663-9F76-D190-A828-59CD2624B7A7}"/>
               </a:ext>
             </a:extLst>
           </p:cNvPr>
@@ -4481,94 +6269,14 @@
         </p:blipFill>
         <p:spPr>
           <a:xfrm>
-            <a:off x="655087" y="1140570"/>
-            <a:ext cx="6380194" cy="4958756"/>
+            <a:off x="811763" y="1252537"/>
+            <a:ext cx="5514975" cy="4352925"/>
           </a:xfrm>
           <a:prstGeom prst="rect">
             <a:avLst/>
           </a:prstGeom>
         </p:spPr>
       </p:pic>
-      <p:sp>
-        <p:nvSpPr>
-          <p:cNvPr id="2" name="TextBox 1">
-            <a:extLst>
-              <a:ext uri="{FF2B5EF4-FFF2-40B4-BE49-F238E27FC236}">
-                <a16:creationId xmlns:a16="http://schemas.microsoft.com/office/drawing/2014/main" id="{D20C6C1B-3F2A-A938-F512-0ADD2B878896}"/>
-              </a:ext>
-            </a:extLst>
-          </p:cNvPr>
-          <p:cNvSpPr txBox="1"/>
-          <p:nvPr/>
-        </p:nvSpPr>
-        <p:spPr>
-          <a:xfrm>
-            <a:off x="7333863" y="1352939"/>
-            <a:ext cx="4432040" cy="1477328"/>
-          </a:xfrm>
-          <a:prstGeom prst="rect">
-            <a:avLst/>
-          </a:prstGeom>
-          <a:noFill/>
-        </p:spPr>
-        <p:txBody>
-          <a:bodyPr wrap="square" rtlCol="0">
-            <a:spAutoFit/>
-          </a:bodyPr>
-          <a:lstStyle/>
-          <a:p>
-            <a:pPr marL="285750" indent="-285750">
-              <a:buFont typeface="Arial" panose="020B0604020202020204" pitchFamily="34" charset="0"/>
-              <a:buChar char="•"/>
-            </a:pPr>
-            <a:r>
-              <a:rPr lang="en-GB" sz="1500" i="0" dirty="0">
-                <a:solidFill>
-                  <a:srgbClr val="000000"/>
-                </a:solidFill>
-                <a:effectLst/>
-                <a:latin typeface="Arial" panose="020B0604020202020204" pitchFamily="34" charset="0"/>
-                <a:cs typeface="Arial" panose="020B0604020202020204" pitchFamily="34" charset="0"/>
-              </a:rPr>
-              <a:t>Ratio of intra-cluster distances to inter-cluster distances.</a:t>
-            </a:r>
-          </a:p>
-          <a:p>
-            <a:pPr marL="285750" indent="-285750">
-              <a:buFont typeface="Arial" panose="020B0604020202020204" pitchFamily="34" charset="0"/>
-              <a:buChar char="•"/>
-            </a:pPr>
-            <a:endParaRPr lang="en-GB" sz="1500" i="0" dirty="0">
-              <a:solidFill>
-                <a:srgbClr val="000000"/>
-              </a:solidFill>
-              <a:effectLst/>
-              <a:latin typeface="Arial" panose="020B0604020202020204" pitchFamily="34" charset="0"/>
-              <a:cs typeface="Arial" panose="020B0604020202020204" pitchFamily="34" charset="0"/>
-            </a:endParaRPr>
-          </a:p>
-          <a:p>
-            <a:pPr marL="285750" indent="-285750">
-              <a:buFont typeface="Arial" panose="020B0604020202020204" pitchFamily="34" charset="0"/>
-              <a:buChar char="•"/>
-            </a:pPr>
-            <a:r>
-              <a:rPr lang="en-GB" sz="1500" dirty="0">
-                <a:solidFill>
-                  <a:srgbClr val="000000"/>
-                </a:solidFill>
-                <a:latin typeface="Arial" panose="020B0604020202020204" pitchFamily="34" charset="0"/>
-                <a:cs typeface="Arial" panose="020B0604020202020204" pitchFamily="34" charset="0"/>
-              </a:rPr>
-              <a:t>Silhouette indices closer to 1 indicate points are well-matched and similar to other points in the cluster.</a:t>
-            </a:r>
-            <a:endParaRPr lang="en-GB" sz="1500" dirty="0">
-              <a:latin typeface="Arial" panose="020B0604020202020204" pitchFamily="34" charset="0"/>
-              <a:cs typeface="Arial" panose="020B0604020202020204" pitchFamily="34" charset="0"/>
-            </a:endParaRPr>
-          </a:p>
-        </p:txBody>
-      </p:sp>
     </p:spTree>
     <p:extLst>
       <p:ext uri="{BB962C8B-B14F-4D97-AF65-F5344CB8AC3E}">
@@ -4994,7 +6702,7 @@
             </a:pPr>
             <a:r>
               <a:rPr lang="en-GB" dirty="0"/>
-              <a:t>Most individuals in core clusters 0, 2 and 3.</a:t>
+              <a:t>Most individuals in core clusters 5, 1 and 2.</a:t>
             </a:r>
           </a:p>
           <a:p>
@@ -5011,7 +6719,7 @@
             </a:pPr>
             <a:r>
               <a:rPr lang="en-GB" dirty="0"/>
-              <a:t>Minor clusters in 2 and 4.</a:t>
+              <a:t>Minor clusters in 3 and 4.</a:t>
             </a:r>
           </a:p>
           <a:p>
@@ -5027,7 +6735,7 @@
               <a:buChar char="•"/>
             </a:pPr>
             <a:r>
-              <a:rPr lang="en-GB" dirty="0"/>
+              <a:rPr lang="en-GB" i="1" dirty="0"/>
               <a:t>2 core clusters and 2 minor clusters.</a:t>
             </a:r>
           </a:p>
@@ -5049,10 +6757,10 @@
       </p:sp>
       <p:pic>
         <p:nvPicPr>
-          <p:cNvPr id="8" name="Picture 7">
-            <a:extLst>
-              <a:ext uri="{FF2B5EF4-FFF2-40B4-BE49-F238E27FC236}">
-                <a16:creationId xmlns:a16="http://schemas.microsoft.com/office/drawing/2014/main" id="{21350F2D-D224-91D5-543D-72C51A9FEBD5}"/>
+          <p:cNvPr id="4" name="Picture 3">
+            <a:extLst>
+              <a:ext uri="{FF2B5EF4-FFF2-40B4-BE49-F238E27FC236}">
+                <a16:creationId xmlns:a16="http://schemas.microsoft.com/office/drawing/2014/main" id="{A9A8D9E9-0455-A8DB-57A1-2A8A8B9998D0}"/>
               </a:ext>
             </a:extLst>
           </p:cNvPr>
@@ -5069,8 +6777,8 @@
         </p:blipFill>
         <p:spPr>
           <a:xfrm>
-            <a:off x="636735" y="1371599"/>
-            <a:ext cx="5894240" cy="4585335"/>
+            <a:off x="684265" y="1447800"/>
+            <a:ext cx="5516510" cy="4291486"/>
           </a:xfrm>
           <a:prstGeom prst="rect">
             <a:avLst/>
@@ -5195,8 +6903,8 @@
         </p:nvSpPr>
         <p:spPr>
           <a:xfrm>
-            <a:off x="7023546" y="1001511"/>
-            <a:ext cx="4846401" cy="3139321"/>
+            <a:off x="7093000" y="1084586"/>
+            <a:ext cx="4492367" cy="4708981"/>
           </a:xfrm>
           <a:prstGeom prst="rect">
             <a:avLst/>
@@ -5209,13 +6917,26 @@
           </a:bodyPr>
           <a:lstStyle/>
           <a:p>
+            <a:r>
+              <a:rPr lang="en-GB" sz="1500" b="1" u="sng" dirty="0"/>
+              <a:t>Major clusters (5,1,2)</a:t>
+            </a:r>
+          </a:p>
+          <a:p>
+            <a:endParaRPr lang="en-GB" sz="1500" b="1" dirty="0"/>
+          </a:p>
+          <a:p>
             <a:pPr marL="285750" indent="-285750">
               <a:buFont typeface="Arial" panose="020B0604020202020204" pitchFamily="34" charset="0"/>
               <a:buChar char="•"/>
             </a:pPr>
             <a:r>
-              <a:rPr lang="en-GB" dirty="0"/>
-              <a:t>Low spread around monetary spend.</a:t>
+              <a:rPr lang="en-GB" sz="1500" b="1" dirty="0"/>
+              <a:t>5</a:t>
+            </a:r>
+            <a:r>
+              <a:rPr lang="en-GB" sz="1500" dirty="0"/>
+              <a:t>: Below average on all metrics.</a:t>
             </a:r>
           </a:p>
           <a:p>
@@ -5223,7 +6944,14 @@
               <a:buFont typeface="Arial" panose="020B0604020202020204" pitchFamily="34" charset="0"/>
               <a:buChar char="•"/>
             </a:pPr>
-            <a:endParaRPr lang="en-GB" dirty="0"/>
+            <a:r>
+              <a:rPr lang="en-GB" sz="1500" b="1" dirty="0"/>
+              <a:t>1</a:t>
+            </a:r>
+            <a:r>
+              <a:rPr lang="en-GB" sz="1500" dirty="0"/>
+              <a:t>: Above average frequency and monetary spend, low recency.</a:t>
+            </a:r>
           </a:p>
           <a:p>
             <a:pPr marL="285750" indent="-285750">
@@ -5231,16 +6959,52 @@
               <a:buChar char="•"/>
             </a:pPr>
             <a:r>
-              <a:rPr lang="en-GB" dirty="0"/>
-              <a:t>Many customers are relatively infrequent spenders with one cluster where frequency of transactions is high.</a:t>
-            </a:r>
+              <a:rPr lang="en-GB" sz="1500" b="1" dirty="0"/>
+              <a:t>2</a:t>
+            </a:r>
+            <a:r>
+              <a:rPr lang="en-GB" sz="1500" dirty="0"/>
+              <a:t>: Below average recency and frequency and average/slightly above average monetary spend.</a:t>
+            </a:r>
+          </a:p>
+          <a:p>
+            <a:endParaRPr lang="en-GB" sz="1500" dirty="0"/>
+          </a:p>
+          <a:p>
+            <a:r>
+              <a:rPr lang="en-GB" sz="1500" dirty="0"/>
+              <a:t>Very large group of people.</a:t>
+            </a:r>
+          </a:p>
+          <a:p>
+            <a:endParaRPr lang="en-GB" sz="1500" dirty="0"/>
+          </a:p>
+          <a:p>
+            <a:r>
+              <a:rPr lang="en-GB" sz="1500" b="1" u="sng" dirty="0"/>
+              <a:t>Minor clusters (3,4)</a:t>
+            </a:r>
+          </a:p>
+          <a:p>
+            <a:endParaRPr lang="en-GB" sz="1500" dirty="0"/>
           </a:p>
           <a:p>
             <a:pPr marL="285750" indent="-285750">
               <a:buFont typeface="Arial" panose="020B0604020202020204" pitchFamily="34" charset="0"/>
               <a:buChar char="•"/>
             </a:pPr>
-            <a:endParaRPr lang="en-GB" dirty="0"/>
+            <a:r>
+              <a:rPr lang="en-GB" sz="1500" b="1" dirty="0"/>
+              <a:t>4</a:t>
+            </a:r>
+            <a:r>
+              <a:rPr lang="en-GB" sz="1500" dirty="0"/>
+              <a:t>: Below-average frequency, average monetary spend </a:t>
+            </a:r>
+            <a:r>
+              <a:rPr lang="en-GB" sz="1500" i="1" dirty="0"/>
+              <a:t>and high recency.</a:t>
+            </a:r>
           </a:p>
           <a:p>
             <a:pPr marL="285750" indent="-285750">
@@ -5248,32 +7012,36 @@
               <a:buChar char="•"/>
             </a:pPr>
             <a:r>
-              <a:rPr lang="en-GB" dirty="0"/>
-              <a:t>2 Clusters with highly above average recency – spending very close up until the end of the year. </a:t>
-            </a:r>
-          </a:p>
-          <a:p>
-            <a:pPr marL="285750" indent="-285750">
-              <a:buFont typeface="Arial" panose="020B0604020202020204" pitchFamily="34" charset="0"/>
-              <a:buChar char="•"/>
-            </a:pPr>
-            <a:endParaRPr lang="en-GB" dirty="0"/>
-          </a:p>
-          <a:p>
-            <a:pPr marL="285750" indent="-285750">
-              <a:buFont typeface="Arial" panose="020B0604020202020204" pitchFamily="34" charset="0"/>
-              <a:buChar char="•"/>
-            </a:pPr>
-            <a:endParaRPr lang="en-GB" dirty="0"/>
+              <a:rPr lang="en-GB" sz="1500" b="1" dirty="0"/>
+              <a:t>3: </a:t>
+            </a:r>
+            <a:r>
+              <a:rPr lang="en-GB" sz="1500" dirty="0"/>
+              <a:t>Below average frequency, average monetary spend </a:t>
+            </a:r>
+            <a:r>
+              <a:rPr lang="en-GB" sz="1500" i="1" dirty="0"/>
+              <a:t>but low recency.</a:t>
+            </a:r>
+            <a:endParaRPr lang="en-GB" sz="1500" b="1" i="1" dirty="0"/>
+          </a:p>
+          <a:p>
+            <a:endParaRPr lang="en-GB" sz="1500" dirty="0"/>
+          </a:p>
+          <a:p>
+            <a:r>
+              <a:rPr lang="en-GB" sz="1500" dirty="0"/>
+              <a:t>Minor clusters are quite similar apart from the fact that they differ on how recently they have made transactions.</a:t>
+            </a:r>
           </a:p>
         </p:txBody>
       </p:sp>
       <p:pic>
         <p:nvPicPr>
-          <p:cNvPr id="4" name="Picture 3">
-            <a:extLst>
-              <a:ext uri="{FF2B5EF4-FFF2-40B4-BE49-F238E27FC236}">
-                <a16:creationId xmlns:a16="http://schemas.microsoft.com/office/drawing/2014/main" id="{ED5E8741-A463-1BD5-4FCE-A0BD279975F4}"/>
+          <p:cNvPr id="7" name="Picture 6">
+            <a:extLst>
+              <a:ext uri="{FF2B5EF4-FFF2-40B4-BE49-F238E27FC236}">
+                <a16:creationId xmlns:a16="http://schemas.microsoft.com/office/drawing/2014/main" id="{BF8A58FE-6EBF-9122-A829-9E5BE1CC8AB0}"/>
               </a:ext>
             </a:extLst>
           </p:cNvPr>
@@ -5290,8 +7058,8 @@
         </p:blipFill>
         <p:spPr>
           <a:xfrm>
-            <a:off x="322053" y="1953534"/>
-            <a:ext cx="6051151" cy="2102680"/>
+            <a:off x="127000" y="1252537"/>
+            <a:ext cx="6565900" cy="4602172"/>
           </a:xfrm>
           <a:prstGeom prst="rect">
             <a:avLst/>
@@ -5301,7 +7069,7 @@
     </p:spTree>
     <p:extLst>
       <p:ext uri="{BB962C8B-B14F-4D97-AF65-F5344CB8AC3E}">
-        <p14:creationId xmlns:p14="http://schemas.microsoft.com/office/powerpoint/2010/main" val="4220258668"/>
+        <p14:creationId xmlns:p14="http://schemas.microsoft.com/office/powerpoint/2010/main" val="3961428113"/>
       </p:ext>
     </p:extLst>
   </p:cSld>
@@ -5365,10 +7133,10 @@
       </p:sp>
       <p:sp>
         <p:nvSpPr>
-          <p:cNvPr id="11" name="TextBox 10">
-            <a:extLst>
-              <a:ext uri="{FF2B5EF4-FFF2-40B4-BE49-F238E27FC236}">
-                <a16:creationId xmlns:a16="http://schemas.microsoft.com/office/drawing/2014/main" id="{55796F3B-8240-346E-FCE9-81EF397A4281}"/>
+          <p:cNvPr id="2" name="TextBox 1">
+            <a:extLst>
+              <a:ext uri="{FF2B5EF4-FFF2-40B4-BE49-F238E27FC236}">
+                <a16:creationId xmlns:a16="http://schemas.microsoft.com/office/drawing/2014/main" id="{C0A6A4AE-127D-DFA1-612E-B4834CFE853F}"/>
               </a:ext>
             </a:extLst>
           </p:cNvPr>
@@ -5377,8 +7145,8 @@
         </p:nvSpPr>
         <p:spPr>
           <a:xfrm>
-            <a:off x="7377580" y="606206"/>
-            <a:ext cx="4492367" cy="646331"/>
+            <a:off x="811763" y="4285266"/>
+            <a:ext cx="10604054" cy="2031325"/>
           </a:xfrm>
           <a:prstGeom prst="rect">
             <a:avLst/>
@@ -5391,7 +7159,14 @@
           </a:bodyPr>
           <a:lstStyle/>
           <a:p>
-            <a:endParaRPr lang="en-GB" dirty="0"/>
+            <a:pPr marL="285750" indent="-285750">
+              <a:buFont typeface="Arial" panose="020B0604020202020204" pitchFamily="34" charset="0"/>
+              <a:buChar char="•"/>
+            </a:pPr>
+            <a:r>
+              <a:rPr lang="en-GB" dirty="0"/>
+              <a:t>Low variance around monetary spend.</a:t>
+            </a:r>
           </a:p>
           <a:p>
             <a:pPr marL="285750" indent="-285750">
@@ -5400,56 +7175,14 @@
             </a:pPr>
             <a:endParaRPr lang="en-GB" dirty="0"/>
           </a:p>
-        </p:txBody>
-      </p:sp>
-      <p:sp>
-        <p:nvSpPr>
-          <p:cNvPr id="2" name="TextBox 1">
-            <a:extLst>
-              <a:ext uri="{FF2B5EF4-FFF2-40B4-BE49-F238E27FC236}">
-                <a16:creationId xmlns:a16="http://schemas.microsoft.com/office/drawing/2014/main" id="{C0A6A4AE-127D-DFA1-612E-B4834CFE853F}"/>
-              </a:ext>
-            </a:extLst>
-          </p:cNvPr>
-          <p:cNvSpPr txBox="1"/>
-          <p:nvPr/>
-        </p:nvSpPr>
-        <p:spPr>
-          <a:xfrm>
-            <a:off x="7093000" y="1084586"/>
-            <a:ext cx="4492367" cy="4708981"/>
-          </a:xfrm>
-          <a:prstGeom prst="rect">
-            <a:avLst/>
-          </a:prstGeom>
-          <a:noFill/>
-        </p:spPr>
-        <p:txBody>
-          <a:bodyPr wrap="square" rtlCol="0">
-            <a:spAutoFit/>
-          </a:bodyPr>
-          <a:lstStyle/>
-          <a:p>
-            <a:r>
-              <a:rPr lang="en-GB" sz="1500" b="1" u="sng" dirty="0"/>
-              <a:t>Major clusters (0,1,3)</a:t>
-            </a:r>
-          </a:p>
-          <a:p>
-            <a:endParaRPr lang="en-GB" sz="1500" b="1" dirty="0"/>
-          </a:p>
           <a:p>
             <a:pPr marL="285750" indent="-285750">
               <a:buFont typeface="Arial" panose="020B0604020202020204" pitchFamily="34" charset="0"/>
               <a:buChar char="•"/>
             </a:pPr>
             <a:r>
-              <a:rPr lang="en-GB" sz="1500" b="1" dirty="0"/>
-              <a:t>0</a:t>
-            </a:r>
-            <a:r>
-              <a:rPr lang="en-GB" sz="1500" dirty="0"/>
-              <a:t>: Below average on all metrics.</a:t>
+              <a:rPr lang="en-GB" dirty="0"/>
+              <a:t>Many customers are relatively infrequent spenders with one cluster where frequency of transactions is high.</a:t>
             </a:r>
           </a:p>
           <a:p>
@@ -5457,14 +7190,7 @@
               <a:buFont typeface="Arial" panose="020B0604020202020204" pitchFamily="34" charset="0"/>
               <a:buChar char="•"/>
             </a:pPr>
-            <a:r>
-              <a:rPr lang="en-GB" sz="1500" b="1" dirty="0"/>
-              <a:t>1</a:t>
-            </a:r>
-            <a:r>
-              <a:rPr lang="en-GB" sz="1500" dirty="0"/>
-              <a:t>: Above average frequency and monetary spend, low recency.</a:t>
-            </a:r>
+            <a:endParaRPr lang="en-GB" dirty="0"/>
           </a:p>
           <a:p>
             <a:pPr marL="285750" indent="-285750">
@@ -5472,94 +7198,32 @@
               <a:buChar char="•"/>
             </a:pPr>
             <a:r>
-              <a:rPr lang="en-GB" sz="1500" b="1" dirty="0"/>
-              <a:t>3</a:t>
-            </a:r>
-            <a:r>
-              <a:rPr lang="en-GB" sz="1500" dirty="0"/>
-              <a:t>: Below average recency and frequency and average/slightly above average monetary spend.</a:t>
-            </a:r>
-          </a:p>
-          <a:p>
-            <a:endParaRPr lang="en-GB" sz="1500" dirty="0"/>
-          </a:p>
-          <a:p>
-            <a:r>
-              <a:rPr lang="en-GB" sz="1500" dirty="0"/>
-              <a:t>Very large group of people.</a:t>
-            </a:r>
-          </a:p>
-          <a:p>
-            <a:endParaRPr lang="en-GB" sz="1500" dirty="0"/>
-          </a:p>
-          <a:p>
-            <a:r>
-              <a:rPr lang="en-GB" sz="1500" b="1" u="sng" dirty="0"/>
-              <a:t>Minor </a:t>
-            </a:r>
-            <a:r>
-              <a:rPr lang="en-GB" sz="1500" b="1" u="sng"/>
-              <a:t>clusters (2,4)</a:t>
-            </a:r>
-            <a:endParaRPr lang="en-GB" sz="1500" b="1" u="sng" dirty="0"/>
-          </a:p>
-          <a:p>
-            <a:endParaRPr lang="en-GB" sz="1500" dirty="0"/>
+              <a:rPr lang="en-GB" dirty="0"/>
+              <a:t>2 Clusters with highly above average recency – spending very close up until the end of the year. </a:t>
+            </a:r>
           </a:p>
           <a:p>
             <a:pPr marL="285750" indent="-285750">
               <a:buFont typeface="Arial" panose="020B0604020202020204" pitchFamily="34" charset="0"/>
               <a:buChar char="•"/>
             </a:pPr>
-            <a:r>
-              <a:rPr lang="en-GB" sz="1500" b="1" dirty="0"/>
-              <a:t>2</a:t>
-            </a:r>
-            <a:r>
-              <a:rPr lang="en-GB" sz="1500" dirty="0"/>
-              <a:t>: Below-average frequency, average monetary spend </a:t>
-            </a:r>
-            <a:r>
-              <a:rPr lang="en-GB" sz="1500" i="1" dirty="0"/>
-              <a:t>and high recency.</a:t>
-            </a:r>
+            <a:endParaRPr lang="en-GB" dirty="0"/>
           </a:p>
           <a:p>
             <a:pPr marL="285750" indent="-285750">
               <a:buFont typeface="Arial" panose="020B0604020202020204" pitchFamily="34" charset="0"/>
               <a:buChar char="•"/>
             </a:pPr>
-            <a:r>
-              <a:rPr lang="en-GB" sz="1500" b="1" dirty="0"/>
-              <a:t>4: </a:t>
-            </a:r>
-            <a:r>
-              <a:rPr lang="en-GB" sz="1500" dirty="0"/>
-              <a:t>Below average frequency, average monetary spend </a:t>
-            </a:r>
-            <a:r>
-              <a:rPr lang="en-GB" sz="1500" i="1" dirty="0"/>
-              <a:t>but low recency.</a:t>
-            </a:r>
-            <a:endParaRPr lang="en-GB" sz="1500" b="1" i="1" dirty="0"/>
-          </a:p>
-          <a:p>
-            <a:endParaRPr lang="en-GB" sz="1500" dirty="0"/>
-          </a:p>
-          <a:p>
-            <a:r>
-              <a:rPr lang="en-GB" sz="1500" dirty="0"/>
-              <a:t>Minor clusters are quite similar apart from the fact that they differ on how recently they have made transactions.</a:t>
-            </a:r>
+            <a:endParaRPr lang="en-GB" dirty="0"/>
           </a:p>
         </p:txBody>
       </p:sp>
       <p:pic>
         <p:nvPicPr>
-          <p:cNvPr id="10" name="Picture 9">
-            <a:extLst>
-              <a:ext uri="{FF2B5EF4-FFF2-40B4-BE49-F238E27FC236}">
-                <a16:creationId xmlns:a16="http://schemas.microsoft.com/office/drawing/2014/main" id="{BD4E3860-5280-76E2-AE40-CD81F35F5DED}"/>
+          <p:cNvPr id="8" name="Picture 7">
+            <a:extLst>
+              <a:ext uri="{FF2B5EF4-FFF2-40B4-BE49-F238E27FC236}">
+                <a16:creationId xmlns:a16="http://schemas.microsoft.com/office/drawing/2014/main" id="{C6042E50-FBE7-A7B7-15CB-C3C05673E1C5}"/>
               </a:ext>
             </a:extLst>
           </p:cNvPr>
@@ -5576,8 +7240,8 @@
         </p:blipFill>
         <p:spPr>
           <a:xfrm>
-            <a:off x="322053" y="1084586"/>
-            <a:ext cx="6210300" cy="4352925"/>
+            <a:off x="2106569" y="782709"/>
+            <a:ext cx="8014442" cy="2806960"/>
           </a:xfrm>
           <a:prstGeom prst="rect">
             <a:avLst/>
@@ -5587,7 +7251,7 @@
     </p:spTree>
     <p:extLst>
       <p:ext uri="{BB962C8B-B14F-4D97-AF65-F5344CB8AC3E}">
-        <p14:creationId xmlns:p14="http://schemas.microsoft.com/office/powerpoint/2010/main" val="3961428113"/>
+        <p14:creationId xmlns:p14="http://schemas.microsoft.com/office/powerpoint/2010/main" val="4220258668"/>
       </p:ext>
     </p:extLst>
   </p:cSld>
@@ -5628,8 +7292,8 @@
         </p:nvSpPr>
         <p:spPr>
           <a:xfrm>
-            <a:off x="811763" y="317240"/>
-            <a:ext cx="4826514" cy="369332"/>
+            <a:off x="552683" y="421540"/>
+            <a:ext cx="3588418" cy="369332"/>
           </a:xfrm>
           <a:prstGeom prst="rect">
             <a:avLst/>
@@ -5644,45 +7308,54 @@
           <a:p>
             <a:r>
               <a:rPr lang="en-GB" b="1" u="sng" dirty="0"/>
-              <a:t>Spending behaviours for each customer segment</a:t>
-            </a:r>
-          </a:p>
-        </p:txBody>
-      </p:sp>
-      <p:pic>
-        <p:nvPicPr>
-          <p:cNvPr id="3" name="Picture 2">
-            <a:extLst>
-              <a:ext uri="{FF2B5EF4-FFF2-40B4-BE49-F238E27FC236}">
-                <a16:creationId xmlns:a16="http://schemas.microsoft.com/office/drawing/2014/main" id="{396091F3-3FE6-9FBE-3C86-9887E486F55A}"/>
-              </a:ext>
-            </a:extLst>
-          </p:cNvPr>
-          <p:cNvPicPr>
-            <a:picLocks noChangeAspect="1"/>
-          </p:cNvPicPr>
+              <a:t>Most frequent spenders – Cluster 1 </a:t>
+            </a:r>
+          </a:p>
+        </p:txBody>
+      </p:sp>
+      <p:sp>
+        <p:nvSpPr>
+          <p:cNvPr id="11" name="TextBox 10">
+            <a:extLst>
+              <a:ext uri="{FF2B5EF4-FFF2-40B4-BE49-F238E27FC236}">
+                <a16:creationId xmlns:a16="http://schemas.microsoft.com/office/drawing/2014/main" id="{55796F3B-8240-346E-FCE9-81EF397A4281}"/>
+              </a:ext>
+            </a:extLst>
+          </p:cNvPr>
+          <p:cNvSpPr txBox="1"/>
           <p:nvPr/>
-        </p:nvPicPr>
-        <p:blipFill>
-          <a:blip r:embed="rId2"/>
-          <a:stretch>
-            <a:fillRect/>
-          </a:stretch>
-        </p:blipFill>
+        </p:nvSpPr>
         <p:spPr>
           <a:xfrm>
-            <a:off x="621506" y="1241284"/>
-            <a:ext cx="10948987" cy="4721365"/>
+            <a:off x="7377580" y="606206"/>
+            <a:ext cx="4492367" cy="646331"/>
           </a:xfrm>
           <a:prstGeom prst="rect">
             <a:avLst/>
           </a:prstGeom>
+          <a:noFill/>
         </p:spPr>
-      </p:pic>
+        <p:txBody>
+          <a:bodyPr wrap="square" rtlCol="0">
+            <a:spAutoFit/>
+          </a:bodyPr>
+          <a:lstStyle/>
+          <a:p>
+            <a:endParaRPr lang="en-GB" dirty="0"/>
+          </a:p>
+          <a:p>
+            <a:pPr marL="285750" indent="-285750">
+              <a:buFont typeface="Arial" panose="020B0604020202020204" pitchFamily="34" charset="0"/>
+              <a:buChar char="•"/>
+            </a:pPr>
+            <a:endParaRPr lang="en-GB" dirty="0"/>
+          </a:p>
+        </p:txBody>
+      </p:sp>
     </p:spTree>
     <p:extLst>
       <p:ext uri="{BB962C8B-B14F-4D97-AF65-F5344CB8AC3E}">
-        <p14:creationId xmlns:p14="http://schemas.microsoft.com/office/powerpoint/2010/main" val="2806691247"/>
+        <p14:creationId xmlns:p14="http://schemas.microsoft.com/office/powerpoint/2010/main" val="756688123"/>
       </p:ext>
     </p:extLst>
   </p:cSld>
@@ -5739,17 +7412,17 @@
           <a:p>
             <a:r>
               <a:rPr lang="en-GB" b="1" u="sng" dirty="0"/>
-              <a:t>Spending behaviours for each customer segment – 4 clusters</a:t>
+              <a:t>Spending behaviours for each customer segment – 5 clusters</a:t>
             </a:r>
           </a:p>
         </p:txBody>
       </p:sp>
       <p:pic>
         <p:nvPicPr>
-          <p:cNvPr id="4" name="Picture 3">
-            <a:extLst>
-              <a:ext uri="{FF2B5EF4-FFF2-40B4-BE49-F238E27FC236}">
-                <a16:creationId xmlns:a16="http://schemas.microsoft.com/office/drawing/2014/main" id="{5D1DCE3F-AE6E-9A79-D862-1E256A1F8657}"/>
+          <p:cNvPr id="3" name="Picture 2">
+            <a:extLst>
+              <a:ext uri="{FF2B5EF4-FFF2-40B4-BE49-F238E27FC236}">
+                <a16:creationId xmlns:a16="http://schemas.microsoft.com/office/drawing/2014/main" id="{3A896A68-633D-5E20-6A04-3CA136241A91}"/>
               </a:ext>
             </a:extLst>
           </p:cNvPr>
@@ -5766,8 +7439,8 @@
         </p:blipFill>
         <p:spPr>
           <a:xfrm>
-            <a:off x="721519" y="1419225"/>
-            <a:ext cx="10748962" cy="4357687"/>
+            <a:off x="546375" y="1439883"/>
+            <a:ext cx="11099249" cy="4754224"/>
           </a:xfrm>
           <a:prstGeom prst="rect">
             <a:avLst/>
@@ -5777,7 +7450,7 @@
     </p:spTree>
     <p:extLst>
       <p:ext uri="{BB962C8B-B14F-4D97-AF65-F5344CB8AC3E}">
-        <p14:creationId xmlns:p14="http://schemas.microsoft.com/office/powerpoint/2010/main" val="2041890761"/>
+        <p14:creationId xmlns:p14="http://schemas.microsoft.com/office/powerpoint/2010/main" val="1135089603"/>
       </p:ext>
     </p:extLst>
   </p:cSld>
@@ -6083,23 +7756,6 @@
 </file>
 
 <file path=customXml/item1.xml><?xml version="1.0" encoding="utf-8"?>
-<p:properties xmlns:p="http://schemas.microsoft.com/office/2006/metadata/properties" xmlns:xsi="http://www.w3.org/2001/XMLSchema-instance" xmlns:pc="http://schemas.microsoft.com/office/infopath/2007/PartnerControls">
-  <documentManagement>
-    <_activity xmlns="d727c9a1-4cc8-4dae-b26f-3016540a6122" xsi:nil="true"/>
-  </documentManagement>
-</p:properties>
-</file>
-
-<file path=customXml/item2.xml><?xml version="1.0" encoding="utf-8"?>
-<?mso-contentType ?>
-<FormTemplates xmlns="http://schemas.microsoft.com/sharepoint/v3/contenttype/forms">
-  <Display>DocumentLibraryForm</Display>
-  <Edit>DocumentLibraryForm</Edit>
-  <New>DocumentLibraryForm</New>
-</FormTemplates>
-</file>
-
-<file path=customXml/item3.xml><?xml version="1.0" encoding="utf-8"?>
 <ct:contentTypeSchema xmlns:ct="http://schemas.microsoft.com/office/2006/metadata/contentType" xmlns:ma="http://schemas.microsoft.com/office/2006/metadata/properties/metaAttributes" ct:_="" ma:_="" ma:contentTypeName="Document" ma:contentTypeID="0x01010029DDE852DE9DAB4A97E6F8A357786F31" ma:contentTypeVersion="16" ma:contentTypeDescription="Create a new document." ma:contentTypeScope="" ma:versionID="edbe17029275bc321119e343b4a1c8ce">
   <xsd:schema xmlns:xsd="http://www.w3.org/2001/XMLSchema" xmlns:xs="http://www.w3.org/2001/XMLSchema" xmlns:p="http://schemas.microsoft.com/office/2006/metadata/properties" xmlns:ns3="d727c9a1-4cc8-4dae-b26f-3016540a6122" xmlns:ns4="4843f6d6-50bc-4979-bebb-2e9e902adf18" targetNamespace="http://schemas.microsoft.com/office/2006/metadata/properties" ma:root="true" ma:fieldsID="e65c90bde7c6b9821291a0ba3a2a0498" ns3:_="" ns4:_="">
     <xsd:import namespace="d727c9a1-4cc8-4dae-b26f-3016540a6122"/>
@@ -6340,32 +7996,24 @@
 </ct:contentTypeSchema>
 </file>
 
-<file path=customXml/itemProps1.xml><?xml version="1.0" encoding="utf-8"?>
-<ds:datastoreItem xmlns:ds="http://schemas.openxmlformats.org/officeDocument/2006/customXml" ds:itemID="{B5DE8817-F03C-49C7-8044-3B3F3F2BC66E}">
-  <ds:schemaRefs>
-    <ds:schemaRef ds:uri="d727c9a1-4cc8-4dae-b26f-3016540a6122"/>
-    <ds:schemaRef ds:uri="http://purl.org/dc/dcmitype/"/>
-    <ds:schemaRef ds:uri="http://purl.org/dc/elements/1.1/"/>
-    <ds:schemaRef ds:uri="http://schemas.microsoft.com/office/2006/metadata/properties"/>
-    <ds:schemaRef ds:uri="http://purl.org/dc/terms/"/>
-    <ds:schemaRef ds:uri="http://schemas.microsoft.com/office/2006/documentManagement/types"/>
-    <ds:schemaRef ds:uri="http://schemas.microsoft.com/office/infopath/2007/PartnerControls"/>
-    <ds:schemaRef ds:uri="http://schemas.openxmlformats.org/package/2006/metadata/core-properties"/>
-    <ds:schemaRef ds:uri="4843f6d6-50bc-4979-bebb-2e9e902adf18"/>
-    <ds:schemaRef ds:uri="http://www.w3.org/XML/1998/namespace"/>
-  </ds:schemaRefs>
-</ds:datastoreItem>
+<file path=customXml/item2.xml><?xml version="1.0" encoding="utf-8"?>
+<?mso-contentType ?>
+<FormTemplates xmlns="http://schemas.microsoft.com/sharepoint/v3/contenttype/forms">
+  <Display>DocumentLibraryForm</Display>
+  <Edit>DocumentLibraryForm</Edit>
+  <New>DocumentLibraryForm</New>
+</FormTemplates>
 </file>
 
-<file path=customXml/itemProps2.xml><?xml version="1.0" encoding="utf-8"?>
-<ds:datastoreItem xmlns:ds="http://schemas.openxmlformats.org/officeDocument/2006/customXml" ds:itemID="{43285F8E-73FA-4723-92C7-3AC049FD41DE}">
-  <ds:schemaRefs>
-    <ds:schemaRef ds:uri="http://schemas.microsoft.com/sharepoint/v3/contenttype/forms"/>
-  </ds:schemaRefs>
-</ds:datastoreItem>
+<file path=customXml/item3.xml><?xml version="1.0" encoding="utf-8"?>
+<p:properties xmlns:p="http://schemas.microsoft.com/office/2006/metadata/properties" xmlns:xsi="http://www.w3.org/2001/XMLSchema-instance" xmlns:pc="http://schemas.microsoft.com/office/infopath/2007/PartnerControls">
+  <documentManagement>
+    <_activity xmlns="d727c9a1-4cc8-4dae-b26f-3016540a6122" xsi:nil="true"/>
+  </documentManagement>
+</p:properties>
 </file>
 
-<file path=customXml/itemProps3.xml><?xml version="1.0" encoding="utf-8"?>
+<file path=customXml/itemProps1.xml><?xml version="1.0" encoding="utf-8"?>
 <ds:datastoreItem xmlns:ds="http://schemas.openxmlformats.org/officeDocument/2006/customXml" ds:itemID="{77F9B306-1F2F-4886-A740-26896DD4F80E}">
   <ds:schemaRefs>
     <ds:schemaRef ds:uri="http://schemas.microsoft.com/office/2006/metadata/contentType"/>
@@ -6382,4 +8030,29 @@
     <ds:schemaRef ds:uri="http://schemas.microsoft.com/internal/obd"/>
   </ds:schemaRefs>
 </ds:datastoreItem>
+</file>
+
+<file path=customXml/itemProps2.xml><?xml version="1.0" encoding="utf-8"?>
+<ds:datastoreItem xmlns:ds="http://schemas.openxmlformats.org/officeDocument/2006/customXml" ds:itemID="{43285F8E-73FA-4723-92C7-3AC049FD41DE}">
+  <ds:schemaRefs>
+    <ds:schemaRef ds:uri="http://schemas.microsoft.com/sharepoint/v3/contenttype/forms"/>
+  </ds:schemaRefs>
+</ds:datastoreItem>
+</file>
+
+<file path=customXml/itemProps3.xml><?xml version="1.0" encoding="utf-8"?>
+<ds:datastoreItem xmlns:ds="http://schemas.openxmlformats.org/officeDocument/2006/customXml" ds:itemID="{B5DE8817-F03C-49C7-8044-3B3F3F2BC66E}">
+  <ds:schemaRefs>
+    <ds:schemaRef ds:uri="d727c9a1-4cc8-4dae-b26f-3016540a6122"/>
+    <ds:schemaRef ds:uri="http://purl.org/dc/dcmitype/"/>
+    <ds:schemaRef ds:uri="http://purl.org/dc/elements/1.1/"/>
+    <ds:schemaRef ds:uri="http://schemas.microsoft.com/office/2006/metadata/properties"/>
+    <ds:schemaRef ds:uri="http://purl.org/dc/terms/"/>
+    <ds:schemaRef ds:uri="http://schemas.microsoft.com/office/2006/documentManagement/types"/>
+    <ds:schemaRef ds:uri="http://schemas.microsoft.com/office/infopath/2007/PartnerControls"/>
+    <ds:schemaRef ds:uri="http://schemas.openxmlformats.org/package/2006/metadata/core-properties"/>
+    <ds:schemaRef ds:uri="4843f6d6-50bc-4979-bebb-2e9e902adf18"/>
+    <ds:schemaRef ds:uri="http://www.w3.org/XML/1998/namespace"/>
+  </ds:schemaRefs>
+</ds:datastoreItem>
 </file>
</xml_diff>